<commit_message>
type checker bug fixes, K presentation updated, elastic initial attempt, k2latex improvements
</commit_message>
<xml_diff>
--- a/presentations/K.pptx
+++ b/presentations/K.pptx
@@ -152,86 +152,75 @@
 </file>
 
 <file path=ppt/diagrams/colors1.xml><?xml version="1.0" encoding="utf-8"?>
-<dgm:colorsDef xmlns:dgm="http://schemas.openxmlformats.org/drawingml/2006/diagram" xmlns:a="http://schemas.openxmlformats.org/drawingml/2006/main" uniqueId="urn:microsoft.com/office/officeart/2005/8/colors/accent1_1">
+<dgm:colorsDef xmlns:dgm="http://schemas.openxmlformats.org/drawingml/2006/diagram" xmlns:a="http://schemas.openxmlformats.org/drawingml/2006/main" uniqueId="urn:microsoft.com/office/officeart/2005/8/colors/colorful2">
   <dgm:title val=""/>
   <dgm:desc val=""/>
   <dgm:catLst>
-    <dgm:cat type="accent1" pri="11100"/>
+    <dgm:cat type="colorful" pri="10200"/>
   </dgm:catLst>
   <dgm:styleLbl name="node0">
     <dgm:fillClrLst meth="repeat">
-      <a:schemeClr val="lt1"/>
+      <a:schemeClr val="accent1"/>
     </dgm:fillClrLst>
     <dgm:linClrLst meth="repeat">
-      <a:schemeClr val="accent1">
-        <a:shade val="80000"/>
-      </a:schemeClr>
+      <a:schemeClr val="lt1"/>
     </dgm:linClrLst>
     <dgm:effectClrLst/>
     <dgm:txLinClrLst/>
-    <dgm:txFillClrLst meth="repeat">
-      <a:schemeClr val="dk1"/>
-    </dgm:txFillClrLst>
+    <dgm:txFillClrLst/>
+    <dgm:txEffectClrLst/>
+  </dgm:styleLbl>
+  <dgm:styleLbl name="node1">
+    <dgm:fillClrLst>
+      <a:schemeClr val="accent2"/>
+      <a:schemeClr val="accent3"/>
+    </dgm:fillClrLst>
+    <dgm:linClrLst meth="repeat">
+      <a:schemeClr val="lt1"/>
+    </dgm:linClrLst>
+    <dgm:effectClrLst/>
+    <dgm:txLinClrLst/>
+    <dgm:txFillClrLst/>
     <dgm:txEffectClrLst/>
   </dgm:styleLbl>
   <dgm:styleLbl name="alignNode1">
-    <dgm:fillClrLst meth="repeat">
-      <a:schemeClr val="lt1"/>
+    <dgm:fillClrLst>
+      <a:schemeClr val="accent2"/>
+      <a:schemeClr val="accent3"/>
     </dgm:fillClrLst>
-    <dgm:linClrLst meth="repeat">
-      <a:schemeClr val="accent1">
-        <a:shade val="80000"/>
-      </a:schemeClr>
+    <dgm:linClrLst>
+      <a:schemeClr val="accent2"/>
+      <a:schemeClr val="accent3"/>
     </dgm:linClrLst>
     <dgm:effectClrLst/>
     <dgm:txLinClrLst/>
-    <dgm:txFillClrLst meth="repeat">
-      <a:schemeClr val="dk1"/>
-    </dgm:txFillClrLst>
+    <dgm:txFillClrLst/>
     <dgm:txEffectClrLst/>
   </dgm:styleLbl>
-  <dgm:styleLbl name="node1">
-    <dgm:fillClrLst meth="repeat">
-      <a:schemeClr val="lt1"/>
+  <dgm:styleLbl name="lnNode1">
+    <dgm:fillClrLst>
+      <a:schemeClr val="accent2"/>
+      <a:schemeClr val="accent3"/>
     </dgm:fillClrLst>
     <dgm:linClrLst meth="repeat">
-      <a:schemeClr val="accent1">
-        <a:shade val="80000"/>
-      </a:schemeClr>
+      <a:schemeClr val="lt1"/>
     </dgm:linClrLst>
     <dgm:effectClrLst/>
     <dgm:txLinClrLst/>
-    <dgm:txFillClrLst meth="repeat">
-      <a:schemeClr val="dk1"/>
-    </dgm:txFillClrLst>
-    <dgm:txEffectClrLst/>
-  </dgm:styleLbl>
-  <dgm:styleLbl name="lnNode1">
-    <dgm:fillClrLst meth="repeat">
-      <a:schemeClr val="lt1"/>
-    </dgm:fillClrLst>
-    <dgm:linClrLst meth="repeat">
-      <a:schemeClr val="accent1">
-        <a:shade val="80000"/>
-      </a:schemeClr>
-    </dgm:linClrLst>
-    <dgm:effectClrLst/>
-    <dgm:txLinClrLst/>
-    <dgm:txFillClrLst meth="repeat">
-      <a:schemeClr val="dk1"/>
-    </dgm:txFillClrLst>
+    <dgm:txFillClrLst/>
     <dgm:txEffectClrLst/>
   </dgm:styleLbl>
   <dgm:styleLbl name="vennNode1">
-    <dgm:fillClrLst meth="repeat">
-      <a:schemeClr val="lt1">
+    <dgm:fillClrLst>
+      <a:schemeClr val="accent2">
+        <a:alpha val="50000"/>
+      </a:schemeClr>
+      <a:schemeClr val="accent3">
         <a:alpha val="50000"/>
       </a:schemeClr>
     </dgm:fillClrLst>
     <dgm:linClrLst meth="repeat">
-      <a:schemeClr val="accent1">
-        <a:shade val="80000"/>
-      </a:schemeClr>
+      <a:schemeClr val="lt1"/>
     </dgm:linClrLst>
     <dgm:effectClrLst/>
     <dgm:txLinClrLst/>
@@ -239,63 +228,52 @@
     <dgm:txEffectClrLst/>
   </dgm:styleLbl>
   <dgm:styleLbl name="node2">
-    <dgm:fillClrLst meth="repeat">
-      <a:schemeClr val="lt1"/>
+    <dgm:fillClrLst>
+      <a:schemeClr val="accent3"/>
     </dgm:fillClrLst>
     <dgm:linClrLst meth="repeat">
-      <a:schemeClr val="accent1">
-        <a:shade val="80000"/>
-      </a:schemeClr>
+      <a:schemeClr val="lt1"/>
     </dgm:linClrLst>
     <dgm:effectClrLst/>
     <dgm:txLinClrLst/>
-    <dgm:txFillClrLst meth="repeat">
-      <a:schemeClr val="dk1"/>
-    </dgm:txFillClrLst>
+    <dgm:txFillClrLst/>
     <dgm:txEffectClrLst/>
   </dgm:styleLbl>
   <dgm:styleLbl name="node3">
-    <dgm:fillClrLst meth="repeat">
-      <a:schemeClr val="lt1"/>
+    <dgm:fillClrLst>
+      <a:schemeClr val="accent4"/>
     </dgm:fillClrLst>
     <dgm:linClrLst meth="repeat">
-      <a:schemeClr val="accent1">
-        <a:shade val="80000"/>
-      </a:schemeClr>
+      <a:schemeClr val="lt1"/>
     </dgm:linClrLst>
     <dgm:effectClrLst/>
     <dgm:txLinClrLst/>
-    <dgm:txFillClrLst meth="repeat">
-      <a:schemeClr val="dk1"/>
-    </dgm:txFillClrLst>
+    <dgm:txFillClrLst/>
     <dgm:txEffectClrLst/>
   </dgm:styleLbl>
   <dgm:styleLbl name="node4">
-    <dgm:fillClrLst meth="repeat">
-      <a:schemeClr val="lt1"/>
+    <dgm:fillClrLst>
+      <a:schemeClr val="accent5"/>
     </dgm:fillClrLst>
     <dgm:linClrLst meth="repeat">
-      <a:schemeClr val="accent1">
-        <a:shade val="80000"/>
-      </a:schemeClr>
+      <a:schemeClr val="lt1"/>
     </dgm:linClrLst>
     <dgm:effectClrLst/>
     <dgm:txLinClrLst/>
-    <dgm:txFillClrLst meth="repeat">
-      <a:schemeClr val="dk1"/>
-    </dgm:txFillClrLst>
+    <dgm:txFillClrLst/>
     <dgm:txEffectClrLst/>
   </dgm:styleLbl>
   <dgm:styleLbl name="fgImgPlace1">
-    <dgm:fillClrLst meth="repeat">
-      <a:schemeClr val="accent1">
-        <a:tint val="40000"/>
+    <dgm:fillClrLst>
+      <a:schemeClr val="accent2">
+        <a:tint val="50000"/>
+      </a:schemeClr>
+      <a:schemeClr val="accent3">
+        <a:tint val="50000"/>
       </a:schemeClr>
     </dgm:fillClrLst>
     <dgm:linClrLst meth="repeat">
-      <a:schemeClr val="accent1">
-        <a:shade val="80000"/>
-      </a:schemeClr>
+      <a:schemeClr val="lt1"/>
     </dgm:linClrLst>
     <dgm:effectClrLst/>
     <dgm:txLinClrLst/>
@@ -305,15 +283,16 @@
     <dgm:txEffectClrLst/>
   </dgm:styleLbl>
   <dgm:styleLbl name="alignImgPlace1">
-    <dgm:fillClrLst meth="repeat">
-      <a:schemeClr val="accent1">
-        <a:tint val="40000"/>
+    <dgm:fillClrLst>
+      <a:schemeClr val="accent2">
+        <a:tint val="50000"/>
+      </a:schemeClr>
+      <a:schemeClr val="accent3">
+        <a:tint val="20000"/>
       </a:schemeClr>
     </dgm:fillClrLst>
     <dgm:linClrLst meth="repeat">
-      <a:schemeClr val="accent1">
-        <a:shade val="80000"/>
-      </a:schemeClr>
+      <a:schemeClr val="lt1"/>
     </dgm:linClrLst>
     <dgm:effectClrLst/>
     <dgm:txLinClrLst/>
@@ -323,15 +302,16 @@
     <dgm:txEffectClrLst/>
   </dgm:styleLbl>
   <dgm:styleLbl name="bgImgPlace1">
-    <dgm:fillClrLst meth="repeat">
-      <a:schemeClr val="accent1">
-        <a:tint val="40000"/>
+    <dgm:fillClrLst>
+      <a:schemeClr val="accent2">
+        <a:tint val="50000"/>
+      </a:schemeClr>
+      <a:schemeClr val="accent3">
+        <a:tint val="20000"/>
       </a:schemeClr>
     </dgm:fillClrLst>
     <dgm:linClrLst meth="repeat">
-      <a:schemeClr val="accent1">
-        <a:shade val="80000"/>
-      </a:schemeClr>
+      <a:schemeClr val="lt1"/>
     </dgm:linClrLst>
     <dgm:effectClrLst/>
     <dgm:txLinClrLst/>
@@ -341,65 +321,53 @@
     <dgm:txEffectClrLst/>
   </dgm:styleLbl>
   <dgm:styleLbl name="sibTrans2D1">
-    <dgm:fillClrLst meth="repeat">
-      <a:schemeClr val="accent1">
-        <a:tint val="60000"/>
-      </a:schemeClr>
+    <dgm:fillClrLst>
+      <a:schemeClr val="accent2"/>
+      <a:schemeClr val="accent3"/>
     </dgm:fillClrLst>
     <dgm:linClrLst meth="repeat">
-      <a:schemeClr val="accent1">
-        <a:tint val="60000"/>
-      </a:schemeClr>
+      <a:schemeClr val="lt1"/>
+    </dgm:linClrLst>
+    <dgm:effectClrLst/>
+    <dgm:txLinClrLst/>
+    <dgm:txFillClrLst/>
+    <dgm:txEffectClrLst/>
+  </dgm:styleLbl>
+  <dgm:styleLbl name="fgSibTrans2D1">
+    <dgm:fillClrLst>
+      <a:schemeClr val="accent2"/>
+      <a:schemeClr val="accent3"/>
+    </dgm:fillClrLst>
+    <dgm:linClrLst meth="repeat">
+      <a:schemeClr val="lt1"/>
     </dgm:linClrLst>
     <dgm:effectClrLst/>
     <dgm:txLinClrLst/>
     <dgm:txFillClrLst meth="repeat">
-      <a:schemeClr val="dk1"/>
+      <a:schemeClr val="lt1"/>
     </dgm:txFillClrLst>
     <dgm:txEffectClrLst/>
   </dgm:styleLbl>
-  <dgm:styleLbl name="fgSibTrans2D1">
-    <dgm:fillClrLst meth="repeat">
-      <a:schemeClr val="accent1">
-        <a:tint val="60000"/>
-      </a:schemeClr>
+  <dgm:styleLbl name="bgSibTrans2D1">
+    <dgm:fillClrLst>
+      <a:schemeClr val="accent2"/>
+      <a:schemeClr val="accent3"/>
     </dgm:fillClrLst>
     <dgm:linClrLst meth="repeat">
-      <a:schemeClr val="accent1">
-        <a:tint val="60000"/>
-      </a:schemeClr>
+      <a:schemeClr val="lt1"/>
     </dgm:linClrLst>
     <dgm:effectClrLst/>
     <dgm:txLinClrLst/>
     <dgm:txFillClrLst meth="repeat">
-      <a:schemeClr val="dk1"/>
-    </dgm:txFillClrLst>
-    <dgm:txEffectClrLst/>
-  </dgm:styleLbl>
-  <dgm:styleLbl name="bgSibTrans2D1">
-    <dgm:fillClrLst meth="repeat">
-      <a:schemeClr val="accent1">
-        <a:tint val="60000"/>
-      </a:schemeClr>
-    </dgm:fillClrLst>
-    <dgm:linClrLst meth="repeat">
-      <a:schemeClr val="accent1">
-        <a:tint val="60000"/>
-      </a:schemeClr>
-    </dgm:linClrLst>
-    <dgm:effectClrLst/>
-    <dgm:txLinClrLst/>
-    <dgm:txFillClrLst meth="repeat">
-      <a:schemeClr val="dk1"/>
+      <a:schemeClr val="lt1"/>
     </dgm:txFillClrLst>
     <dgm:txEffectClrLst/>
   </dgm:styleLbl>
   <dgm:styleLbl name="sibTrans1D1">
-    <dgm:fillClrLst meth="repeat">
-      <a:schemeClr val="accent1"/>
-    </dgm:fillClrLst>
-    <dgm:linClrLst meth="repeat">
-      <a:schemeClr val="accent1"/>
+    <dgm:fillClrLst/>
+    <dgm:linClrLst>
+      <a:schemeClr val="accent2"/>
+      <a:schemeClr val="accent3"/>
     </dgm:linClrLst>
     <dgm:effectClrLst/>
     <dgm:txLinClrLst/>
@@ -410,10 +378,12 @@
   </dgm:styleLbl>
   <dgm:styleLbl name="callout">
     <dgm:fillClrLst meth="repeat">
-      <a:schemeClr val="accent1"/>
+      <a:schemeClr val="accent2"/>
     </dgm:fillClrLst>
     <dgm:linClrLst meth="repeat">
-      <a:schemeClr val="accent1"/>
+      <a:schemeClr val="accent2">
+        <a:tint val="50000"/>
+      </a:schemeClr>
     </dgm:linClrLst>
     <dgm:effectClrLst/>
     <dgm:txLinClrLst/>
@@ -424,93 +394,11 @@
   </dgm:styleLbl>
   <dgm:styleLbl name="asst0">
     <dgm:fillClrLst meth="repeat">
-      <a:schemeClr val="lt1"/>
+      <a:schemeClr val="accent2"/>
     </dgm:fillClrLst>
     <dgm:linClrLst meth="repeat">
-      <a:schemeClr val="accent1">
+      <a:schemeClr val="lt1">
         <a:shade val="80000"/>
-      </a:schemeClr>
-    </dgm:linClrLst>
-    <dgm:effectClrLst/>
-    <dgm:txLinClrLst/>
-    <dgm:txFillClrLst meth="repeat">
-      <a:schemeClr val="dk1"/>
-    </dgm:txFillClrLst>
-    <dgm:txEffectClrLst/>
-  </dgm:styleLbl>
-  <dgm:styleLbl name="asst1">
-    <dgm:fillClrLst meth="repeat">
-      <a:schemeClr val="lt1"/>
-    </dgm:fillClrLst>
-    <dgm:linClrLst meth="repeat">
-      <a:schemeClr val="accent1">
-        <a:shade val="80000"/>
-      </a:schemeClr>
-    </dgm:linClrLst>
-    <dgm:effectClrLst/>
-    <dgm:txLinClrLst/>
-    <dgm:txFillClrLst meth="repeat">
-      <a:schemeClr val="dk1"/>
-    </dgm:txFillClrLst>
-    <dgm:txEffectClrLst/>
-  </dgm:styleLbl>
-  <dgm:styleLbl name="asst2">
-    <dgm:fillClrLst meth="repeat">
-      <a:schemeClr val="lt1"/>
-    </dgm:fillClrLst>
-    <dgm:linClrLst meth="repeat">
-      <a:schemeClr val="accent1">
-        <a:shade val="80000"/>
-      </a:schemeClr>
-    </dgm:linClrLst>
-    <dgm:effectClrLst/>
-    <dgm:txLinClrLst/>
-    <dgm:txFillClrLst meth="repeat">
-      <a:schemeClr val="dk1"/>
-    </dgm:txFillClrLst>
-    <dgm:txEffectClrLst/>
-  </dgm:styleLbl>
-  <dgm:styleLbl name="asst3">
-    <dgm:fillClrLst meth="repeat">
-      <a:schemeClr val="lt1"/>
-    </dgm:fillClrLst>
-    <dgm:linClrLst meth="repeat">
-      <a:schemeClr val="accent1">
-        <a:shade val="80000"/>
-      </a:schemeClr>
-    </dgm:linClrLst>
-    <dgm:effectClrLst/>
-    <dgm:txLinClrLst/>
-    <dgm:txFillClrLst meth="repeat">
-      <a:schemeClr val="dk1"/>
-    </dgm:txFillClrLst>
-    <dgm:txEffectClrLst/>
-  </dgm:styleLbl>
-  <dgm:styleLbl name="asst4">
-    <dgm:fillClrLst meth="repeat">
-      <a:schemeClr val="lt1"/>
-    </dgm:fillClrLst>
-    <dgm:linClrLst meth="repeat">
-      <a:schemeClr val="accent1">
-        <a:shade val="80000"/>
-      </a:schemeClr>
-    </dgm:linClrLst>
-    <dgm:effectClrLst/>
-    <dgm:txLinClrLst/>
-    <dgm:txFillClrLst meth="repeat">
-      <a:schemeClr val="dk1"/>
-    </dgm:txFillClrLst>
-    <dgm:txEffectClrLst/>
-  </dgm:styleLbl>
-  <dgm:styleLbl name="parChTrans2D1">
-    <dgm:fillClrLst meth="repeat">
-      <a:schemeClr val="accent1">
-        <a:tint val="60000"/>
-      </a:schemeClr>
-    </dgm:fillClrLst>
-    <dgm:linClrLst meth="repeat">
-      <a:schemeClr val="accent1">
-        <a:tint val="60000"/>
       </a:schemeClr>
     </dgm:linClrLst>
     <dgm:effectClrLst/>
@@ -518,12 +406,76 @@
     <dgm:txFillClrLst/>
     <dgm:txEffectClrLst/>
   </dgm:styleLbl>
+  <dgm:styleLbl name="asst1">
+    <dgm:fillClrLst meth="repeat">
+      <a:schemeClr val="accent3"/>
+    </dgm:fillClrLst>
+    <dgm:linClrLst meth="repeat">
+      <a:schemeClr val="lt1">
+        <a:shade val="80000"/>
+      </a:schemeClr>
+    </dgm:linClrLst>
+    <dgm:effectClrLst/>
+    <dgm:txLinClrLst/>
+    <dgm:txFillClrLst/>
+    <dgm:txEffectClrLst/>
+  </dgm:styleLbl>
+  <dgm:styleLbl name="asst2">
+    <dgm:fillClrLst>
+      <a:schemeClr val="accent4"/>
+    </dgm:fillClrLst>
+    <dgm:linClrLst meth="repeat">
+      <a:schemeClr val="lt1"/>
+    </dgm:linClrLst>
+    <dgm:effectClrLst/>
+    <dgm:txLinClrLst/>
+    <dgm:txFillClrLst/>
+    <dgm:txEffectClrLst/>
+  </dgm:styleLbl>
+  <dgm:styleLbl name="asst3">
+    <dgm:fillClrLst>
+      <a:schemeClr val="accent5"/>
+    </dgm:fillClrLst>
+    <dgm:linClrLst meth="repeat">
+      <a:schemeClr val="lt1"/>
+    </dgm:linClrLst>
+    <dgm:effectClrLst/>
+    <dgm:txLinClrLst/>
+    <dgm:txFillClrLst/>
+    <dgm:txEffectClrLst/>
+  </dgm:styleLbl>
+  <dgm:styleLbl name="asst4">
+    <dgm:fillClrLst>
+      <a:schemeClr val="accent6"/>
+    </dgm:fillClrLst>
+    <dgm:linClrLst meth="repeat">
+      <a:schemeClr val="lt1"/>
+    </dgm:linClrLst>
+    <dgm:effectClrLst/>
+    <dgm:txLinClrLst/>
+    <dgm:txFillClrLst/>
+    <dgm:txEffectClrLst/>
+  </dgm:styleLbl>
+  <dgm:styleLbl name="parChTrans2D1">
+    <dgm:fillClrLst meth="repeat">
+      <a:schemeClr val="accent2"/>
+    </dgm:fillClrLst>
+    <dgm:linClrLst meth="repeat">
+      <a:schemeClr val="lt1"/>
+    </dgm:linClrLst>
+    <dgm:effectClrLst/>
+    <dgm:txLinClrLst/>
+    <dgm:txFillClrLst meth="repeat">
+      <a:schemeClr val="lt1"/>
+    </dgm:txFillClrLst>
+    <dgm:txEffectClrLst/>
+  </dgm:styleLbl>
   <dgm:styleLbl name="parChTrans2D2">
     <dgm:fillClrLst meth="repeat">
-      <a:schemeClr val="accent1"/>
+      <a:schemeClr val="accent3"/>
     </dgm:fillClrLst>
     <dgm:linClrLst meth="repeat">
-      <a:schemeClr val="accent1"/>
+      <a:schemeClr val="lt1"/>
     </dgm:linClrLst>
     <dgm:effectClrLst/>
     <dgm:txLinClrLst/>
@@ -532,10 +484,10 @@
   </dgm:styleLbl>
   <dgm:styleLbl name="parChTrans2D3">
     <dgm:fillClrLst meth="repeat">
-      <a:schemeClr val="accent1"/>
+      <a:schemeClr val="accent4"/>
     </dgm:fillClrLst>
     <dgm:linClrLst meth="repeat">
-      <a:schemeClr val="accent1"/>
+      <a:schemeClr val="lt1"/>
     </dgm:linClrLst>
     <dgm:effectClrLst/>
     <dgm:txLinClrLst/>
@@ -544,10 +496,10 @@
   </dgm:styleLbl>
   <dgm:styleLbl name="parChTrans2D4">
     <dgm:fillClrLst meth="repeat">
-      <a:schemeClr val="accent1"/>
+      <a:schemeClr val="accent5"/>
     </dgm:fillClrLst>
     <dgm:linClrLst meth="repeat">
-      <a:schemeClr val="accent1"/>
+      <a:schemeClr val="lt1"/>
     </dgm:linClrLst>
     <dgm:effectClrLst/>
     <dgm:txLinClrLst/>
@@ -558,12 +510,10 @@
   </dgm:styleLbl>
   <dgm:styleLbl name="parChTrans1D1">
     <dgm:fillClrLst meth="repeat">
-      <a:schemeClr val="accent1"/>
+      <a:schemeClr val="accent2"/>
     </dgm:fillClrLst>
     <dgm:linClrLst meth="repeat">
-      <a:schemeClr val="accent1">
-        <a:shade val="60000"/>
-      </a:schemeClr>
+      <a:schemeClr val="accent2"/>
     </dgm:linClrLst>
     <dgm:effectClrLst/>
     <dgm:txLinClrLst/>
@@ -574,12 +524,12 @@
   </dgm:styleLbl>
   <dgm:styleLbl name="parChTrans1D2">
     <dgm:fillClrLst meth="repeat">
-      <a:schemeClr val="accent1"/>
+      <a:schemeClr val="accent2">
+        <a:tint val="90000"/>
+      </a:schemeClr>
     </dgm:fillClrLst>
     <dgm:linClrLst meth="repeat">
-      <a:schemeClr val="accent1">
-        <a:shade val="60000"/>
-      </a:schemeClr>
+      <a:schemeClr val="accent3"/>
     </dgm:linClrLst>
     <dgm:effectClrLst/>
     <dgm:txLinClrLst/>
@@ -590,12 +540,12 @@
   </dgm:styleLbl>
   <dgm:styleLbl name="parChTrans1D3">
     <dgm:fillClrLst meth="repeat">
-      <a:schemeClr val="accent1"/>
+      <a:schemeClr val="accent2">
+        <a:tint val="70000"/>
+      </a:schemeClr>
     </dgm:fillClrLst>
     <dgm:linClrLst meth="repeat">
-      <a:schemeClr val="accent1">
-        <a:shade val="80000"/>
-      </a:schemeClr>
+      <a:schemeClr val="accent4"/>
     </dgm:linClrLst>
     <dgm:effectClrLst/>
     <dgm:txLinClrLst/>
@@ -606,12 +556,12 @@
   </dgm:styleLbl>
   <dgm:styleLbl name="parChTrans1D4">
     <dgm:fillClrLst meth="repeat">
-      <a:schemeClr val="accent1"/>
+      <a:schemeClr val="accent2">
+        <a:tint val="50000"/>
+      </a:schemeClr>
     </dgm:fillClrLst>
     <dgm:linClrLst meth="repeat">
-      <a:schemeClr val="accent1">
-        <a:shade val="80000"/>
-      </a:schemeClr>
+      <a:schemeClr val="accent5"/>
     </dgm:linClrLst>
     <dgm:effectClrLst/>
     <dgm:txLinClrLst/>
@@ -622,13 +572,13 @@
   </dgm:styleLbl>
   <dgm:styleLbl name="fgAcc1">
     <dgm:fillClrLst meth="repeat">
-      <a:schemeClr val="accent1">
+      <a:schemeClr val="lt1">
         <a:alpha val="90000"/>
-        <a:tint val="40000"/>
       </a:schemeClr>
     </dgm:fillClrLst>
-    <dgm:linClrLst meth="repeat">
-      <a:schemeClr val="accent1"/>
+    <dgm:linClrLst>
+      <a:schemeClr val="accent2"/>
+      <a:schemeClr val="accent3"/>
     </dgm:linClrLst>
     <dgm:effectClrLst/>
     <dgm:txLinClrLst/>
@@ -639,13 +589,13 @@
   </dgm:styleLbl>
   <dgm:styleLbl name="conFgAcc1">
     <dgm:fillClrLst meth="repeat">
-      <a:schemeClr val="accent1">
+      <a:schemeClr val="lt1">
         <a:alpha val="90000"/>
-        <a:tint val="40000"/>
       </a:schemeClr>
     </dgm:fillClrLst>
-    <dgm:linClrLst meth="repeat">
-      <a:schemeClr val="accent1"/>
+    <dgm:linClrLst>
+      <a:schemeClr val="accent2"/>
+      <a:schemeClr val="accent3"/>
     </dgm:linClrLst>
     <dgm:effectClrLst/>
     <dgm:txLinClrLst/>
@@ -656,13 +606,13 @@
   </dgm:styleLbl>
   <dgm:styleLbl name="alignAcc1">
     <dgm:fillClrLst meth="repeat">
-      <a:schemeClr val="accent1">
+      <a:schemeClr val="lt1">
         <a:alpha val="90000"/>
-        <a:tint val="40000"/>
       </a:schemeClr>
     </dgm:fillClrLst>
-    <dgm:linClrLst meth="repeat">
-      <a:schemeClr val="accent1"/>
+    <dgm:linClrLst>
+      <a:schemeClr val="accent2"/>
+      <a:schemeClr val="accent3"/>
     </dgm:linClrLst>
     <dgm:effectClrLst/>
     <dgm:txLinClrLst/>
@@ -673,13 +623,12 @@
   </dgm:styleLbl>
   <dgm:styleLbl name="trAlignAcc1">
     <dgm:fillClrLst meth="repeat">
-      <a:schemeClr val="accent1">
+      <a:schemeClr val="lt1">
         <a:alpha val="40000"/>
-        <a:tint val="40000"/>
       </a:schemeClr>
     </dgm:fillClrLst>
     <dgm:linClrLst meth="repeat">
-      <a:schemeClr val="accent1"/>
+      <a:schemeClr val="accent2"/>
     </dgm:linClrLst>
     <dgm:effectClrLst/>
     <dgm:txLinClrLst/>
@@ -690,13 +639,13 @@
   </dgm:styleLbl>
   <dgm:styleLbl name="bgAcc1">
     <dgm:fillClrLst meth="repeat">
-      <a:schemeClr val="accent1">
+      <a:schemeClr val="lt1">
         <a:alpha val="90000"/>
-        <a:tint val="40000"/>
       </a:schemeClr>
     </dgm:fillClrLst>
-    <dgm:linClrLst meth="repeat">
-      <a:schemeClr val="accent1"/>
+    <dgm:linClrLst>
+      <a:schemeClr val="accent2"/>
+      <a:schemeClr val="accent3"/>
     </dgm:linClrLst>
     <dgm:effectClrLst/>
     <dgm:txLinClrLst/>
@@ -709,8 +658,9 @@
     <dgm:fillClrLst meth="repeat">
       <a:schemeClr val="lt1"/>
     </dgm:fillClrLst>
-    <dgm:linClrLst meth="repeat">
-      <a:schemeClr val="accent1"/>
+    <dgm:linClrLst>
+      <a:schemeClr val="accent2"/>
+      <a:schemeClr val="accent3"/>
     </dgm:linClrLst>
     <dgm:effectClrLst/>
     <dgm:txLinClrLst/>
@@ -723,8 +673,9 @@
     <dgm:fillClrLst meth="repeat">
       <a:schemeClr val="lt1"/>
     </dgm:fillClrLst>
-    <dgm:linClrLst meth="repeat">
-      <a:schemeClr val="accent1"/>
+    <dgm:linClrLst>
+      <a:schemeClr val="accent2"/>
+      <a:schemeClr val="accent3"/>
     </dgm:linClrLst>
     <dgm:effectClrLst/>
     <dgm:txLinClrLst/>
@@ -737,8 +688,9 @@
     <dgm:fillClrLst meth="repeat">
       <a:schemeClr val="lt1"/>
     </dgm:fillClrLst>
-    <dgm:linClrLst meth="repeat">
-      <a:schemeClr val="accent1"/>
+    <dgm:linClrLst>
+      <a:schemeClr val="accent2"/>
+      <a:schemeClr val="accent3"/>
     </dgm:linClrLst>
     <dgm:effectClrLst/>
     <dgm:txLinClrLst/>
@@ -748,14 +700,23 @@
     <dgm:txEffectClrLst/>
   </dgm:styleLbl>
   <dgm:styleLbl name="fgAccFollowNode1">
-    <dgm:fillClrLst meth="repeat">
-      <a:schemeClr val="lt1">
+    <dgm:fillClrLst>
+      <a:schemeClr val="accent2">
+        <a:tint val="40000"/>
         <a:alpha val="90000"/>
+      </a:schemeClr>
+      <a:schemeClr val="accent3">
         <a:tint val="40000"/>
+        <a:alpha val="90000"/>
       </a:schemeClr>
     </dgm:fillClrLst>
-    <dgm:linClrLst meth="repeat">
-      <a:schemeClr val="accent1">
+    <dgm:linClrLst>
+      <a:schemeClr val="accent2">
+        <a:tint val="40000"/>
+        <a:alpha val="90000"/>
+      </a:schemeClr>
+      <a:schemeClr val="accent3">
+        <a:tint val="40000"/>
         <a:alpha val="90000"/>
       </a:schemeClr>
     </dgm:linClrLst>
@@ -767,14 +728,23 @@
     <dgm:txEffectClrLst/>
   </dgm:styleLbl>
   <dgm:styleLbl name="alignAccFollowNode1">
-    <dgm:fillClrLst meth="repeat">
-      <a:schemeClr val="lt1">
+    <dgm:fillClrLst>
+      <a:schemeClr val="accent2">
+        <a:tint val="40000"/>
         <a:alpha val="90000"/>
+      </a:schemeClr>
+      <a:schemeClr val="accent3">
         <a:tint val="40000"/>
+        <a:alpha val="90000"/>
       </a:schemeClr>
     </dgm:fillClrLst>
-    <dgm:linClrLst meth="repeat">
-      <a:schemeClr val="accent1">
+    <dgm:linClrLst>
+      <a:schemeClr val="accent2">
+        <a:tint val="40000"/>
+        <a:alpha val="90000"/>
+      </a:schemeClr>
+      <a:schemeClr val="accent3">
+        <a:tint val="40000"/>
         <a:alpha val="90000"/>
       </a:schemeClr>
     </dgm:linClrLst>
@@ -786,14 +756,23 @@
     <dgm:txEffectClrLst/>
   </dgm:styleLbl>
   <dgm:styleLbl name="bgAccFollowNode1">
-    <dgm:fillClrLst meth="repeat">
-      <a:schemeClr val="lt1">
+    <dgm:fillClrLst>
+      <a:schemeClr val="accent2">
+        <a:tint val="40000"/>
         <a:alpha val="90000"/>
+      </a:schemeClr>
+      <a:schemeClr val="accent3">
         <a:tint val="40000"/>
+        <a:alpha val="90000"/>
       </a:schemeClr>
     </dgm:fillClrLst>
-    <dgm:linClrLst meth="repeat">
-      <a:schemeClr val="accent1">
+    <dgm:linClrLst>
+      <a:schemeClr val="accent2">
+        <a:tint val="40000"/>
+        <a:alpha val="90000"/>
+      </a:schemeClr>
+      <a:schemeClr val="accent3">
+        <a:tint val="40000"/>
         <a:alpha val="90000"/>
       </a:schemeClr>
     </dgm:linClrLst>
@@ -806,12 +785,11 @@
   </dgm:styleLbl>
   <dgm:styleLbl name="fgAcc0">
     <dgm:fillClrLst meth="repeat">
-      <a:schemeClr val="accent1">
+      <a:schemeClr val="lt1">
         <a:alpha val="90000"/>
-        <a:tint val="40000"/>
       </a:schemeClr>
     </dgm:fillClrLst>
-    <dgm:linClrLst meth="repeat">
+    <dgm:linClrLst>
       <a:schemeClr val="accent1"/>
     </dgm:linClrLst>
     <dgm:effectClrLst/>
@@ -823,13 +801,12 @@
   </dgm:styleLbl>
   <dgm:styleLbl name="fgAcc2">
     <dgm:fillClrLst meth="repeat">
-      <a:schemeClr val="accent1">
+      <a:schemeClr val="lt1">
         <a:alpha val="90000"/>
-        <a:tint val="40000"/>
       </a:schemeClr>
     </dgm:fillClrLst>
-    <dgm:linClrLst meth="repeat">
-      <a:schemeClr val="accent1"/>
+    <dgm:linClrLst>
+      <a:schemeClr val="accent3"/>
     </dgm:linClrLst>
     <dgm:effectClrLst/>
     <dgm:txLinClrLst/>
@@ -840,13 +817,12 @@
   </dgm:styleLbl>
   <dgm:styleLbl name="fgAcc3">
     <dgm:fillClrLst meth="repeat">
-      <a:schemeClr val="accent1">
+      <a:schemeClr val="lt1">
         <a:alpha val="90000"/>
-        <a:tint val="40000"/>
       </a:schemeClr>
     </dgm:fillClrLst>
-    <dgm:linClrLst meth="repeat">
-      <a:schemeClr val="accent1"/>
+    <dgm:linClrLst>
+      <a:schemeClr val="accent4"/>
     </dgm:linClrLst>
     <dgm:effectClrLst/>
     <dgm:txLinClrLst/>
@@ -857,13 +833,12 @@
   </dgm:styleLbl>
   <dgm:styleLbl name="fgAcc4">
     <dgm:fillClrLst meth="repeat">
-      <a:schemeClr val="accent1">
+      <a:schemeClr val="lt1">
         <a:alpha val="90000"/>
-        <a:tint val="40000"/>
       </a:schemeClr>
     </dgm:fillClrLst>
-    <dgm:linClrLst meth="repeat">
-      <a:schemeClr val="accent1"/>
+    <dgm:linClrLst>
+      <a:schemeClr val="accent5"/>
     </dgm:linClrLst>
     <dgm:effectClrLst/>
     <dgm:txLinClrLst/>
@@ -874,12 +849,12 @@
   </dgm:styleLbl>
   <dgm:styleLbl name="bgShp">
     <dgm:fillClrLst meth="repeat">
-      <a:schemeClr val="accent1">
+      <a:schemeClr val="accent2">
         <a:tint val="40000"/>
       </a:schemeClr>
     </dgm:fillClrLst>
     <dgm:linClrLst meth="repeat">
-      <a:schemeClr val="accent1"/>
+      <a:schemeClr val="dk1"/>
     </dgm:linClrLst>
     <dgm:effectClrLst/>
     <dgm:txLinClrLst/>
@@ -890,12 +865,12 @@
   </dgm:styleLbl>
   <dgm:styleLbl name="dkBgShp">
     <dgm:fillClrLst meth="repeat">
-      <a:schemeClr val="accent1">
-        <a:shade val="80000"/>
+      <a:schemeClr val="accent2">
+        <a:shade val="90000"/>
       </a:schemeClr>
     </dgm:fillClrLst>
     <dgm:linClrLst meth="repeat">
-      <a:schemeClr val="accent1"/>
+      <a:schemeClr val="dk1"/>
     </dgm:linClrLst>
     <dgm:effectClrLst/>
     <dgm:txLinClrLst/>
@@ -906,13 +881,13 @@
   </dgm:styleLbl>
   <dgm:styleLbl name="trBgShp">
     <dgm:fillClrLst meth="repeat">
-      <a:schemeClr val="accent1">
+      <a:schemeClr val="accent2">
         <a:tint val="50000"/>
         <a:alpha val="40000"/>
       </a:schemeClr>
     </dgm:fillClrLst>
     <dgm:linClrLst meth="repeat">
-      <a:schemeClr val="accent1"/>
+      <a:schemeClr val="accent2"/>
     </dgm:linClrLst>
     <dgm:effectClrLst/>
     <dgm:txLinClrLst/>
@@ -923,8 +898,8 @@
   </dgm:styleLbl>
   <dgm:styleLbl name="fgShp">
     <dgm:fillClrLst meth="repeat">
-      <a:schemeClr val="accent1">
-        <a:tint val="60000"/>
+      <a:schemeClr val="accent2">
+        <a:tint val="40000"/>
       </a:schemeClr>
     </dgm:fillClrLst>
     <dgm:linClrLst meth="repeat">
@@ -962,7 +937,7 @@
 <dgm:dataModel xmlns:dgm="http://schemas.openxmlformats.org/drawingml/2006/diagram" xmlns:a="http://schemas.openxmlformats.org/drawingml/2006/main">
   <dgm:ptLst>
     <dgm:pt modelId="{0EA680EF-1CA6-4CDD-98AC-9858A5EA3EF7}" type="doc">
-      <dgm:prSet loTypeId="urn:microsoft.com/office/officeart/2008/layout/HalfCircleOrganizationChart" loCatId="hierarchy" qsTypeId="urn:microsoft.com/office/officeart/2005/8/quickstyle/3d1" qsCatId="3D" csTypeId="urn:microsoft.com/office/officeart/2005/8/colors/accent1_1" csCatId="accent1" phldr="1"/>
+      <dgm:prSet loTypeId="urn:microsoft.com/office/officeart/2008/layout/HalfCircleOrganizationChart" loCatId="hierarchy" qsTypeId="urn:microsoft.com/office/officeart/2005/8/quickstyle/3d1" qsCatId="3D" csTypeId="urn:microsoft.com/office/officeart/2005/8/colors/colorful2" csCatId="colorful" phldr="1"/>
       <dgm:spPr/>
       <dgm:t>
         <a:bodyPr/>
@@ -1017,28 +992,17 @@
         <a:lstStyle/>
         <a:p>
           <a:r>
-            <a:rPr lang="en-US" sz="1400" dirty="0" smtClean="0"/>
+            <a:rPr lang="en-US" sz="1400" smtClean="0"/>
             <a:t>Parsing </a:t>
           </a:r>
           <a:r>
-            <a:rPr lang="en-US" sz="1400" i="1" dirty="0" smtClean="0">
-              <a:solidFill>
-                <a:schemeClr val="accent4">
-                  <a:lumMod val="75000"/>
-                </a:schemeClr>
-              </a:solidFill>
+            <a:rPr lang="en-US" sz="1400" i="1" smtClean="0">
               <a:latin typeface="Consolas" panose="020B0609020204030204" pitchFamily="49" charset="0"/>
               <a:cs typeface="Consolas" panose="020B0609020204030204" pitchFamily="49" charset="0"/>
             </a:rPr>
             <a:t>√</a:t>
           </a:r>
-          <a:endParaRPr lang="en-US" sz="1400" dirty="0">
-            <a:solidFill>
-              <a:schemeClr val="accent4">
-                <a:lumMod val="75000"/>
-              </a:schemeClr>
-            </a:solidFill>
-          </a:endParaRPr>
+          <a:endParaRPr lang="en-US" sz="1400" dirty="0"/>
         </a:p>
       </dgm:t>
     </dgm:pt>
@@ -1072,28 +1036,17 @@
         <a:lstStyle/>
         <a:p>
           <a:r>
-            <a:rPr lang="en-US" sz="1400" dirty="0" smtClean="0"/>
+            <a:rPr lang="en-US" sz="1400" smtClean="0"/>
             <a:t>Conversion to AST </a:t>
           </a:r>
           <a:r>
-            <a:rPr lang="en-US" sz="1400" i="1" dirty="0" smtClean="0">
-              <a:solidFill>
-                <a:schemeClr val="accent4">
-                  <a:lumMod val="75000"/>
-                </a:schemeClr>
-              </a:solidFill>
+            <a:rPr lang="en-US" sz="1400" i="1" smtClean="0">
               <a:latin typeface="Consolas" panose="020B0609020204030204" pitchFamily="49" charset="0"/>
               <a:cs typeface="Consolas" panose="020B0609020204030204" pitchFamily="49" charset="0"/>
             </a:rPr>
             <a:t>√</a:t>
           </a:r>
-          <a:endParaRPr lang="en-US" sz="1400" dirty="0">
-            <a:solidFill>
-              <a:schemeClr val="accent4">
-                <a:lumMod val="75000"/>
-              </a:schemeClr>
-            </a:solidFill>
-          </a:endParaRPr>
+          <a:endParaRPr lang="en-US" sz="1400" dirty="0"/>
         </a:p>
       </dgm:t>
     </dgm:pt>
@@ -1238,38 +1191,21 @@
         <a:lstStyle/>
         <a:p>
           <a:r>
-            <a:rPr lang="en-US" sz="1400" dirty="0" smtClean="0"/>
+            <a:rPr lang="en-US" sz="1400" smtClean="0"/>
             <a:t>to SMT </a:t>
           </a:r>
           <a:r>
-            <a:rPr lang="en-US" sz="1400" i="1" dirty="0" smtClean="0">
-              <a:solidFill>
-                <a:schemeClr val="accent4">
-                  <a:lumMod val="75000"/>
-                </a:schemeClr>
-              </a:solidFill>
+            <a:rPr lang="en-US" sz="1400" i="1" smtClean="0">
               <a:latin typeface="Consolas" panose="020B0609020204030204" pitchFamily="49" charset="0"/>
               <a:cs typeface="Consolas" panose="020B0609020204030204" pitchFamily="49" charset="0"/>
             </a:rPr>
             <a:t>√</a:t>
           </a:r>
           <a:r>
-            <a:rPr lang="en-US" sz="1400" dirty="0" smtClean="0">
-              <a:solidFill>
-                <a:schemeClr val="accent4">
-                  <a:lumMod val="75000"/>
-                </a:schemeClr>
-              </a:solidFill>
-            </a:rPr>
+            <a:rPr lang="en-US" sz="1400" smtClean="0"/>
             <a:t> </a:t>
           </a:r>
-          <a:endParaRPr lang="en-US" sz="1400" dirty="0">
-            <a:solidFill>
-              <a:schemeClr val="accent4">
-                <a:lumMod val="75000"/>
-              </a:schemeClr>
-            </a:solidFill>
-          </a:endParaRPr>
+          <a:endParaRPr lang="en-US" sz="1400" dirty="0"/>
         </a:p>
       </dgm:t>
     </dgm:pt>
@@ -1420,28 +1356,17 @@
         <a:lstStyle/>
         <a:p>
           <a:r>
-            <a:rPr lang="en-US" sz="1400" dirty="0" smtClean="0"/>
+            <a:rPr lang="en-US" sz="1400" smtClean="0"/>
             <a:t>Class consistency </a:t>
           </a:r>
           <a:r>
-            <a:rPr lang="en-US" sz="1400" i="1" dirty="0" smtClean="0">
-              <a:solidFill>
-                <a:schemeClr val="accent4">
-                  <a:lumMod val="75000"/>
-                </a:schemeClr>
-              </a:solidFill>
+            <a:rPr lang="en-US" sz="1400" i="1" smtClean="0">
               <a:latin typeface="Consolas" panose="020B0609020204030204" pitchFamily="49" charset="0"/>
               <a:cs typeface="Consolas" panose="020B0609020204030204" pitchFamily="49" charset="0"/>
             </a:rPr>
             <a:t>√</a:t>
           </a:r>
-          <a:endParaRPr lang="en-US" sz="1400" dirty="0">
-            <a:solidFill>
-              <a:schemeClr val="accent4">
-                <a:lumMod val="75000"/>
-              </a:schemeClr>
-            </a:solidFill>
-          </a:endParaRPr>
+          <a:endParaRPr lang="en-US" sz="1400" dirty="0"/>
         </a:p>
       </dgm:t>
     </dgm:pt>
@@ -1660,16 +1585,11 @@
         <a:lstStyle/>
         <a:p>
           <a:r>
-            <a:rPr lang="en-US" sz="1400" dirty="0" smtClean="0"/>
+            <a:rPr lang="en-US" sz="1400" smtClean="0"/>
             <a:t>Latex </a:t>
           </a:r>
           <a:r>
-            <a:rPr lang="en-US" sz="1400" i="1" dirty="0" smtClean="0">
-              <a:solidFill>
-                <a:schemeClr val="accent4">
-                  <a:lumMod val="75000"/>
-                </a:schemeClr>
-              </a:solidFill>
+            <a:rPr lang="en-US" sz="1400" i="1" smtClean="0">
               <a:latin typeface="Consolas" panose="020B0609020204030204" pitchFamily="49" charset="0"/>
               <a:cs typeface="Consolas" panose="020B0609020204030204" pitchFamily="49" charset="0"/>
             </a:rPr>
@@ -1709,16 +1629,11 @@
         <a:lstStyle/>
         <a:p>
           <a:r>
-            <a:rPr lang="en-US" sz="1400" dirty="0" smtClean="0"/>
+            <a:rPr lang="en-US" sz="1400" smtClean="0"/>
             <a:t>Type Checking </a:t>
           </a:r>
           <a:r>
-            <a:rPr lang="en-US" sz="1400" i="1" dirty="0" smtClean="0">
-              <a:solidFill>
-                <a:schemeClr val="accent4">
-                  <a:lumMod val="75000"/>
-                </a:schemeClr>
-              </a:solidFill>
+            <a:rPr lang="en-US" sz="1400" i="1" smtClean="0">
               <a:latin typeface="Consolas" panose="020B0609020204030204" pitchFamily="49" charset="0"/>
               <a:cs typeface="Consolas" panose="020B0609020204030204" pitchFamily="49" charset="0"/>
             </a:rPr>
@@ -1777,10 +1692,24 @@
         </dgm:presLayoutVars>
       </dgm:prSet>
       <dgm:spPr/>
+      <dgm:t>
+        <a:bodyPr/>
+        <a:lstStyle/>
+        <a:p>
+          <a:endParaRPr lang="en-US"/>
+        </a:p>
+      </dgm:t>
     </dgm:pt>
     <dgm:pt modelId="{0DAE816F-A22E-464F-A8B0-8A6CE57A22FB}" type="pres">
       <dgm:prSet presAssocID="{7B7203B6-20DB-4281-8539-1072620383ED}" presName="rootComposite1" presStyleCnt="0"/>
       <dgm:spPr/>
+      <dgm:t>
+        <a:bodyPr/>
+        <a:lstStyle/>
+        <a:p>
+          <a:endParaRPr lang="en-US"/>
+        </a:p>
+      </dgm:t>
     </dgm:pt>
     <dgm:pt modelId="{1E0C8858-A0CA-4D0A-9317-A9C531C71B03}" type="pres">
       <dgm:prSet presAssocID="{7B7203B6-20DB-4281-8539-1072620383ED}" presName="rootText1" presStyleLbl="alignAcc1" presStyleIdx="0" presStyleCnt="0">
@@ -1800,10 +1729,24 @@
     <dgm:pt modelId="{3A5B0F3B-1D54-42AC-AA45-855E2902F93A}" type="pres">
       <dgm:prSet presAssocID="{7B7203B6-20DB-4281-8539-1072620383ED}" presName="topArc1" presStyleLbl="parChTrans1D1" presStyleIdx="0" presStyleCnt="36"/>
       <dgm:spPr/>
+      <dgm:t>
+        <a:bodyPr/>
+        <a:lstStyle/>
+        <a:p>
+          <a:endParaRPr lang="en-US"/>
+        </a:p>
+      </dgm:t>
     </dgm:pt>
     <dgm:pt modelId="{F7CEE381-80E3-4C85-9970-F17C6A5805BB}" type="pres">
       <dgm:prSet presAssocID="{7B7203B6-20DB-4281-8539-1072620383ED}" presName="bottomArc1" presStyleLbl="parChTrans1D1" presStyleIdx="1" presStyleCnt="36"/>
       <dgm:spPr/>
+      <dgm:t>
+        <a:bodyPr/>
+        <a:lstStyle/>
+        <a:p>
+          <a:endParaRPr lang="en-US"/>
+        </a:p>
+      </dgm:t>
     </dgm:pt>
     <dgm:pt modelId="{A121B180-66BB-4442-AEE4-D8032C6E0E2B}" type="pres">
       <dgm:prSet presAssocID="{7B7203B6-20DB-4281-8539-1072620383ED}" presName="topConnNode1" presStyleLbl="node1" presStyleIdx="0" presStyleCnt="0"/>
@@ -1819,6 +1762,13 @@
     <dgm:pt modelId="{9A133843-4035-4337-8976-887C914216AD}" type="pres">
       <dgm:prSet presAssocID="{7B7203B6-20DB-4281-8539-1072620383ED}" presName="hierChild2" presStyleCnt="0"/>
       <dgm:spPr/>
+      <dgm:t>
+        <a:bodyPr/>
+        <a:lstStyle/>
+        <a:p>
+          <a:endParaRPr lang="en-US"/>
+        </a:p>
+      </dgm:t>
     </dgm:pt>
     <dgm:pt modelId="{DF023ABA-E34F-4E78-BBD3-7D55876D0B06}" type="pres">
       <dgm:prSet presAssocID="{A0CD79B0-DBD6-441D-BCFE-4C84129DFCA7}" presName="Name28" presStyleLbl="parChTrans1D2" presStyleIdx="0" presStyleCnt="1"/>
@@ -1838,10 +1788,24 @@
         </dgm:presLayoutVars>
       </dgm:prSet>
       <dgm:spPr/>
+      <dgm:t>
+        <a:bodyPr/>
+        <a:lstStyle/>
+        <a:p>
+          <a:endParaRPr lang="en-US"/>
+        </a:p>
+      </dgm:t>
     </dgm:pt>
     <dgm:pt modelId="{48596564-DA73-4F9A-A5AC-42F82CC34700}" type="pres">
       <dgm:prSet presAssocID="{66DBE711-4A49-4547-8CF2-6E2CF867FF00}" presName="rootComposite2" presStyleCnt="0"/>
       <dgm:spPr/>
+      <dgm:t>
+        <a:bodyPr/>
+        <a:lstStyle/>
+        <a:p>
+          <a:endParaRPr lang="en-US"/>
+        </a:p>
+      </dgm:t>
     </dgm:pt>
     <dgm:pt modelId="{6224BBFC-5F3E-491F-AC1A-4BD1E8D437D5}" type="pres">
       <dgm:prSet presAssocID="{66DBE711-4A49-4547-8CF2-6E2CF867FF00}" presName="rootText2" presStyleLbl="alignAcc1" presStyleIdx="0" presStyleCnt="0" custScaleX="166336">
@@ -1861,10 +1825,24 @@
     <dgm:pt modelId="{393B7EF1-45A2-428C-81C6-07699A8AAAFC}" type="pres">
       <dgm:prSet presAssocID="{66DBE711-4A49-4547-8CF2-6E2CF867FF00}" presName="topArc2" presStyleLbl="parChTrans1D1" presStyleIdx="2" presStyleCnt="36"/>
       <dgm:spPr/>
+      <dgm:t>
+        <a:bodyPr/>
+        <a:lstStyle/>
+        <a:p>
+          <a:endParaRPr lang="en-US"/>
+        </a:p>
+      </dgm:t>
     </dgm:pt>
     <dgm:pt modelId="{A1CD0BB2-3B53-4E54-8880-449EA23E54E7}" type="pres">
       <dgm:prSet presAssocID="{66DBE711-4A49-4547-8CF2-6E2CF867FF00}" presName="bottomArc2" presStyleLbl="parChTrans1D1" presStyleIdx="3" presStyleCnt="36"/>
       <dgm:spPr/>
+      <dgm:t>
+        <a:bodyPr/>
+        <a:lstStyle/>
+        <a:p>
+          <a:endParaRPr lang="en-US"/>
+        </a:p>
+      </dgm:t>
     </dgm:pt>
     <dgm:pt modelId="{39840B04-74A9-430D-8615-F9CEC991CBE5}" type="pres">
       <dgm:prSet presAssocID="{66DBE711-4A49-4547-8CF2-6E2CF867FF00}" presName="topConnNode2" presStyleLbl="node2" presStyleIdx="0" presStyleCnt="0"/>
@@ -1880,6 +1858,13 @@
     <dgm:pt modelId="{D6FC57DE-2D1E-4157-9A1E-7D5508157EA1}" type="pres">
       <dgm:prSet presAssocID="{66DBE711-4A49-4547-8CF2-6E2CF867FF00}" presName="hierChild4" presStyleCnt="0"/>
       <dgm:spPr/>
+      <dgm:t>
+        <a:bodyPr/>
+        <a:lstStyle/>
+        <a:p>
+          <a:endParaRPr lang="en-US"/>
+        </a:p>
+      </dgm:t>
     </dgm:pt>
     <dgm:pt modelId="{B3AE80F9-2103-4B71-8F02-CAB3AA4CF62D}" type="pres">
       <dgm:prSet presAssocID="{46279AFF-16FC-4AC9-A440-F482ED3920CC}" presName="Name28" presStyleLbl="parChTrans1D3" presStyleIdx="0" presStyleCnt="1"/>
@@ -1899,10 +1884,24 @@
         </dgm:presLayoutVars>
       </dgm:prSet>
       <dgm:spPr/>
+      <dgm:t>
+        <a:bodyPr/>
+        <a:lstStyle/>
+        <a:p>
+          <a:endParaRPr lang="en-US"/>
+        </a:p>
+      </dgm:t>
     </dgm:pt>
     <dgm:pt modelId="{8DE8CED8-1808-4057-AE78-A112E9A6FA03}" type="pres">
       <dgm:prSet presAssocID="{B27876A7-3F8C-431C-956B-7EAC02A1E33F}" presName="rootComposite2" presStyleCnt="0"/>
       <dgm:spPr/>
+      <dgm:t>
+        <a:bodyPr/>
+        <a:lstStyle/>
+        <a:p>
+          <a:endParaRPr lang="en-US"/>
+        </a:p>
+      </dgm:t>
     </dgm:pt>
     <dgm:pt modelId="{87E6D7E6-E975-4EC6-AFCF-93E9E200463A}" type="pres">
       <dgm:prSet presAssocID="{B27876A7-3F8C-431C-956B-7EAC02A1E33F}" presName="rootText2" presStyleLbl="alignAcc1" presStyleIdx="0" presStyleCnt="0" custScaleX="216061">
@@ -1922,10 +1921,24 @@
     <dgm:pt modelId="{9547FDBC-85F8-4482-875B-2A91930BD865}" type="pres">
       <dgm:prSet presAssocID="{B27876A7-3F8C-431C-956B-7EAC02A1E33F}" presName="topArc2" presStyleLbl="parChTrans1D1" presStyleIdx="4" presStyleCnt="36"/>
       <dgm:spPr/>
+      <dgm:t>
+        <a:bodyPr/>
+        <a:lstStyle/>
+        <a:p>
+          <a:endParaRPr lang="en-US"/>
+        </a:p>
+      </dgm:t>
     </dgm:pt>
     <dgm:pt modelId="{7E1F0D96-FEDE-492B-BA91-2077254DDF1F}" type="pres">
       <dgm:prSet presAssocID="{B27876A7-3F8C-431C-956B-7EAC02A1E33F}" presName="bottomArc2" presStyleLbl="parChTrans1D1" presStyleIdx="5" presStyleCnt="36"/>
       <dgm:spPr/>
+      <dgm:t>
+        <a:bodyPr/>
+        <a:lstStyle/>
+        <a:p>
+          <a:endParaRPr lang="en-US"/>
+        </a:p>
+      </dgm:t>
     </dgm:pt>
     <dgm:pt modelId="{AC8F9C80-B792-406D-9BE6-FE9A429B2B0D}" type="pres">
       <dgm:prSet presAssocID="{B27876A7-3F8C-431C-956B-7EAC02A1E33F}" presName="topConnNode2" presStyleLbl="node3" presStyleIdx="0" presStyleCnt="0"/>
@@ -1941,6 +1954,13 @@
     <dgm:pt modelId="{527D52BA-68CA-49D7-8C44-075DE07A8C66}" type="pres">
       <dgm:prSet presAssocID="{B27876A7-3F8C-431C-956B-7EAC02A1E33F}" presName="hierChild4" presStyleCnt="0"/>
       <dgm:spPr/>
+      <dgm:t>
+        <a:bodyPr/>
+        <a:lstStyle/>
+        <a:p>
+          <a:endParaRPr lang="en-US"/>
+        </a:p>
+      </dgm:t>
     </dgm:pt>
     <dgm:pt modelId="{D8110EF7-E15B-4001-A3CB-7ADAA5444A7C}" type="pres">
       <dgm:prSet presAssocID="{72324453-13DB-4627-ACB6-B569C90981C3}" presName="Name28" presStyleLbl="parChTrans1D4" presStyleIdx="0" presStyleCnt="15"/>
@@ -1960,10 +1980,24 @@
         </dgm:presLayoutVars>
       </dgm:prSet>
       <dgm:spPr/>
+      <dgm:t>
+        <a:bodyPr/>
+        <a:lstStyle/>
+        <a:p>
+          <a:endParaRPr lang="en-US"/>
+        </a:p>
+      </dgm:t>
     </dgm:pt>
     <dgm:pt modelId="{53BB81B9-9590-4B36-BE69-D8D66A463EA4}" type="pres">
       <dgm:prSet presAssocID="{A056FB49-F477-465A-B39F-FE65E20D5F2A}" presName="rootComposite2" presStyleCnt="0"/>
       <dgm:spPr/>
+      <dgm:t>
+        <a:bodyPr/>
+        <a:lstStyle/>
+        <a:p>
+          <a:endParaRPr lang="en-US"/>
+        </a:p>
+      </dgm:t>
     </dgm:pt>
     <dgm:pt modelId="{E0D2B6F8-DBD2-46D6-9746-95F8869D9A07}" type="pres">
       <dgm:prSet presAssocID="{A056FB49-F477-465A-B39F-FE65E20D5F2A}" presName="rootText2" presStyleLbl="alignAcc1" presStyleIdx="0" presStyleCnt="0" custScaleX="348742">
@@ -1983,10 +2017,24 @@
     <dgm:pt modelId="{E31517EB-C846-4A00-93D5-87480B62B81A}" type="pres">
       <dgm:prSet presAssocID="{A056FB49-F477-465A-B39F-FE65E20D5F2A}" presName="topArc2" presStyleLbl="parChTrans1D1" presStyleIdx="6" presStyleCnt="36"/>
       <dgm:spPr/>
+      <dgm:t>
+        <a:bodyPr/>
+        <a:lstStyle/>
+        <a:p>
+          <a:endParaRPr lang="en-US"/>
+        </a:p>
+      </dgm:t>
     </dgm:pt>
     <dgm:pt modelId="{5850E104-533A-4AD8-810B-0172E1ECD260}" type="pres">
       <dgm:prSet presAssocID="{A056FB49-F477-465A-B39F-FE65E20D5F2A}" presName="bottomArc2" presStyleLbl="parChTrans1D1" presStyleIdx="7" presStyleCnt="36"/>
       <dgm:spPr/>
+      <dgm:t>
+        <a:bodyPr/>
+        <a:lstStyle/>
+        <a:p>
+          <a:endParaRPr lang="en-US"/>
+        </a:p>
+      </dgm:t>
     </dgm:pt>
     <dgm:pt modelId="{148AE8B7-38E0-48F6-AEF7-9463C452981A}" type="pres">
       <dgm:prSet presAssocID="{A056FB49-F477-465A-B39F-FE65E20D5F2A}" presName="topConnNode2" presStyleLbl="node4" presStyleIdx="0" presStyleCnt="0"/>
@@ -2002,6 +2050,13 @@
     <dgm:pt modelId="{E1E75EB5-FF2B-4B82-ABC1-7615A2A0B3AF}" type="pres">
       <dgm:prSet presAssocID="{A056FB49-F477-465A-B39F-FE65E20D5F2A}" presName="hierChild4" presStyleCnt="0"/>
       <dgm:spPr/>
+      <dgm:t>
+        <a:bodyPr/>
+        <a:lstStyle/>
+        <a:p>
+          <a:endParaRPr lang="en-US"/>
+        </a:p>
+      </dgm:t>
     </dgm:pt>
     <dgm:pt modelId="{6FF57E50-04A8-4951-847A-2C725B24ABB4}" type="pres">
       <dgm:prSet presAssocID="{884BB362-3BD4-4CA6-ADD3-538298516D23}" presName="Name28" presStyleLbl="parChTrans1D4" presStyleIdx="1" presStyleCnt="15"/>
@@ -2021,10 +2076,24 @@
         </dgm:presLayoutVars>
       </dgm:prSet>
       <dgm:spPr/>
+      <dgm:t>
+        <a:bodyPr/>
+        <a:lstStyle/>
+        <a:p>
+          <a:endParaRPr lang="en-US"/>
+        </a:p>
+      </dgm:t>
     </dgm:pt>
     <dgm:pt modelId="{DFD95109-A2F6-49C7-9DDC-61779E64A057}" type="pres">
       <dgm:prSet presAssocID="{0A49A00D-6E82-4D45-9E4A-6FDEE4EEA527}" presName="rootComposite2" presStyleCnt="0"/>
       <dgm:spPr/>
+      <dgm:t>
+        <a:bodyPr/>
+        <a:lstStyle/>
+        <a:p>
+          <a:endParaRPr lang="en-US"/>
+        </a:p>
+      </dgm:t>
     </dgm:pt>
     <dgm:pt modelId="{9B5D9EDB-F93D-429C-B688-FC9E1CFB1F93}" type="pres">
       <dgm:prSet presAssocID="{0A49A00D-6E82-4D45-9E4A-6FDEE4EEA527}" presName="rootText2" presStyleLbl="alignAcc1" presStyleIdx="0" presStyleCnt="0" custScaleX="271401">
@@ -2044,10 +2113,24 @@
     <dgm:pt modelId="{146E1CFA-54DB-425B-9FA0-F19AC302FCB0}" type="pres">
       <dgm:prSet presAssocID="{0A49A00D-6E82-4D45-9E4A-6FDEE4EEA527}" presName="topArc2" presStyleLbl="parChTrans1D1" presStyleIdx="8" presStyleCnt="36"/>
       <dgm:spPr/>
+      <dgm:t>
+        <a:bodyPr/>
+        <a:lstStyle/>
+        <a:p>
+          <a:endParaRPr lang="en-US"/>
+        </a:p>
+      </dgm:t>
     </dgm:pt>
     <dgm:pt modelId="{D141DC33-1FD7-42E5-A6C7-7E60DC2ED7E0}" type="pres">
       <dgm:prSet presAssocID="{0A49A00D-6E82-4D45-9E4A-6FDEE4EEA527}" presName="bottomArc2" presStyleLbl="parChTrans1D1" presStyleIdx="9" presStyleCnt="36"/>
       <dgm:spPr/>
+      <dgm:t>
+        <a:bodyPr/>
+        <a:lstStyle/>
+        <a:p>
+          <a:endParaRPr lang="en-US"/>
+        </a:p>
+      </dgm:t>
     </dgm:pt>
     <dgm:pt modelId="{A9DED617-FFF3-4BE5-ABFC-DA272A85657E}" type="pres">
       <dgm:prSet presAssocID="{0A49A00D-6E82-4D45-9E4A-6FDEE4EEA527}" presName="topConnNode2" presStyleLbl="node4" presStyleIdx="0" presStyleCnt="0"/>
@@ -2063,10 +2146,24 @@
     <dgm:pt modelId="{5BE19DF6-601C-42EE-A4D8-A6285A57C589}" type="pres">
       <dgm:prSet presAssocID="{0A49A00D-6E82-4D45-9E4A-6FDEE4EEA527}" presName="hierChild4" presStyleCnt="0"/>
       <dgm:spPr/>
+      <dgm:t>
+        <a:bodyPr/>
+        <a:lstStyle/>
+        <a:p>
+          <a:endParaRPr lang="en-US"/>
+        </a:p>
+      </dgm:t>
     </dgm:pt>
     <dgm:pt modelId="{95701E7F-24D8-4792-9780-778B2A6E6C07}" type="pres">
       <dgm:prSet presAssocID="{0A49A00D-6E82-4D45-9E4A-6FDEE4EEA527}" presName="hierChild5" presStyleCnt="0"/>
       <dgm:spPr/>
+      <dgm:t>
+        <a:bodyPr/>
+        <a:lstStyle/>
+        <a:p>
+          <a:endParaRPr lang="en-US"/>
+        </a:p>
+      </dgm:t>
     </dgm:pt>
     <dgm:pt modelId="{77AFC571-5D4A-4713-BAD2-B2F043D9E4F0}" type="pres">
       <dgm:prSet presAssocID="{2BA41C0E-3BD3-4FAC-986D-6CC8E2028BC7}" presName="Name28" presStyleLbl="parChTrans1D4" presStyleIdx="2" presStyleCnt="15"/>
@@ -2086,10 +2183,24 @@
         </dgm:presLayoutVars>
       </dgm:prSet>
       <dgm:spPr/>
+      <dgm:t>
+        <a:bodyPr/>
+        <a:lstStyle/>
+        <a:p>
+          <a:endParaRPr lang="en-US"/>
+        </a:p>
+      </dgm:t>
     </dgm:pt>
     <dgm:pt modelId="{F686C128-1B36-430A-81C0-91345142274C}" type="pres">
       <dgm:prSet presAssocID="{D4DBD54D-CAAC-4F67-8AC9-F0FF09111B76}" presName="rootComposite2" presStyleCnt="0"/>
       <dgm:spPr/>
+      <dgm:t>
+        <a:bodyPr/>
+        <a:lstStyle/>
+        <a:p>
+          <a:endParaRPr lang="en-US"/>
+        </a:p>
+      </dgm:t>
     </dgm:pt>
     <dgm:pt modelId="{871FD543-CD1E-48A3-9DEC-EB41C7146695}" type="pres">
       <dgm:prSet presAssocID="{D4DBD54D-CAAC-4F67-8AC9-F0FF09111B76}" presName="rootText2" presStyleLbl="alignAcc1" presStyleIdx="0" presStyleCnt="0" custScaleX="221649">
@@ -2109,10 +2220,24 @@
     <dgm:pt modelId="{288875E8-CD6F-4FD8-8F03-8BBD78219C3A}" type="pres">
       <dgm:prSet presAssocID="{D4DBD54D-CAAC-4F67-8AC9-F0FF09111B76}" presName="topArc2" presStyleLbl="parChTrans1D1" presStyleIdx="10" presStyleCnt="36"/>
       <dgm:spPr/>
+      <dgm:t>
+        <a:bodyPr/>
+        <a:lstStyle/>
+        <a:p>
+          <a:endParaRPr lang="en-US"/>
+        </a:p>
+      </dgm:t>
     </dgm:pt>
     <dgm:pt modelId="{FA2DD701-E4E3-4B86-AAA9-C10491ED0A3E}" type="pres">
       <dgm:prSet presAssocID="{D4DBD54D-CAAC-4F67-8AC9-F0FF09111B76}" presName="bottomArc2" presStyleLbl="parChTrans1D1" presStyleIdx="11" presStyleCnt="36"/>
       <dgm:spPr/>
+      <dgm:t>
+        <a:bodyPr/>
+        <a:lstStyle/>
+        <a:p>
+          <a:endParaRPr lang="en-US"/>
+        </a:p>
+      </dgm:t>
     </dgm:pt>
     <dgm:pt modelId="{304EE8DC-74F9-4EA2-A898-F562AB921F08}" type="pres">
       <dgm:prSet presAssocID="{D4DBD54D-CAAC-4F67-8AC9-F0FF09111B76}" presName="topConnNode2" presStyleLbl="node4" presStyleIdx="0" presStyleCnt="0"/>
@@ -2128,14 +2253,35 @@
     <dgm:pt modelId="{D42D4020-116D-4544-B547-2A60F80DA6A5}" type="pres">
       <dgm:prSet presAssocID="{D4DBD54D-CAAC-4F67-8AC9-F0FF09111B76}" presName="hierChild4" presStyleCnt="0"/>
       <dgm:spPr/>
+      <dgm:t>
+        <a:bodyPr/>
+        <a:lstStyle/>
+        <a:p>
+          <a:endParaRPr lang="en-US"/>
+        </a:p>
+      </dgm:t>
     </dgm:pt>
     <dgm:pt modelId="{71317E25-63FF-4216-A396-086F6E598BA7}" type="pres">
       <dgm:prSet presAssocID="{D4DBD54D-CAAC-4F67-8AC9-F0FF09111B76}" presName="hierChild5" presStyleCnt="0"/>
       <dgm:spPr/>
+      <dgm:t>
+        <a:bodyPr/>
+        <a:lstStyle/>
+        <a:p>
+          <a:endParaRPr lang="en-US"/>
+        </a:p>
+      </dgm:t>
     </dgm:pt>
     <dgm:pt modelId="{6C6AFC28-7930-49BF-B58D-87B69C54AF53}" type="pres">
       <dgm:prSet presAssocID="{A056FB49-F477-465A-B39F-FE65E20D5F2A}" presName="hierChild5" presStyleCnt="0"/>
       <dgm:spPr/>
+      <dgm:t>
+        <a:bodyPr/>
+        <a:lstStyle/>
+        <a:p>
+          <a:endParaRPr lang="en-US"/>
+        </a:p>
+      </dgm:t>
     </dgm:pt>
     <dgm:pt modelId="{B4F2084F-355C-4A22-A705-3DDCE1749361}" type="pres">
       <dgm:prSet presAssocID="{153103D2-A285-4A1F-B43F-97FF1E941393}" presName="Name28" presStyleLbl="parChTrans1D4" presStyleIdx="3" presStyleCnt="15"/>
@@ -2155,10 +2301,24 @@
         </dgm:presLayoutVars>
       </dgm:prSet>
       <dgm:spPr/>
+      <dgm:t>
+        <a:bodyPr/>
+        <a:lstStyle/>
+        <a:p>
+          <a:endParaRPr lang="en-US"/>
+        </a:p>
+      </dgm:t>
     </dgm:pt>
     <dgm:pt modelId="{C3F7DCFF-5D85-41AC-8A75-08E9A75680CF}" type="pres">
       <dgm:prSet presAssocID="{AD0F264C-28C5-43BA-86B4-8733D972B0FF}" presName="rootComposite2" presStyleCnt="0"/>
       <dgm:spPr/>
+      <dgm:t>
+        <a:bodyPr/>
+        <a:lstStyle/>
+        <a:p>
+          <a:endParaRPr lang="en-US"/>
+        </a:p>
+      </dgm:t>
     </dgm:pt>
     <dgm:pt modelId="{D07A9C80-965E-4711-A655-3460DDBA569B}" type="pres">
       <dgm:prSet presAssocID="{AD0F264C-28C5-43BA-86B4-8733D972B0FF}" presName="rootText2" presStyleLbl="alignAcc1" presStyleIdx="0" presStyleCnt="0" custScaleX="203813">
@@ -2178,10 +2338,24 @@
     <dgm:pt modelId="{097E3815-5124-496B-A12D-0E759A531691}" type="pres">
       <dgm:prSet presAssocID="{AD0F264C-28C5-43BA-86B4-8733D972B0FF}" presName="topArc2" presStyleLbl="parChTrans1D1" presStyleIdx="12" presStyleCnt="36"/>
       <dgm:spPr/>
+      <dgm:t>
+        <a:bodyPr/>
+        <a:lstStyle/>
+        <a:p>
+          <a:endParaRPr lang="en-US"/>
+        </a:p>
+      </dgm:t>
     </dgm:pt>
     <dgm:pt modelId="{9F87DB24-2326-4139-8CBF-41A595E83F31}" type="pres">
       <dgm:prSet presAssocID="{AD0F264C-28C5-43BA-86B4-8733D972B0FF}" presName="bottomArc2" presStyleLbl="parChTrans1D1" presStyleIdx="13" presStyleCnt="36"/>
       <dgm:spPr/>
+      <dgm:t>
+        <a:bodyPr/>
+        <a:lstStyle/>
+        <a:p>
+          <a:endParaRPr lang="en-US"/>
+        </a:p>
+      </dgm:t>
     </dgm:pt>
     <dgm:pt modelId="{93E80003-D8D9-406A-99A3-533244C42A0E}" type="pres">
       <dgm:prSet presAssocID="{AD0F264C-28C5-43BA-86B4-8733D972B0FF}" presName="topConnNode2" presStyleLbl="node4" presStyleIdx="0" presStyleCnt="0"/>
@@ -2197,10 +2371,24 @@
     <dgm:pt modelId="{B827676D-834A-4CC5-8D61-97E98D36F963}" type="pres">
       <dgm:prSet presAssocID="{AD0F264C-28C5-43BA-86B4-8733D972B0FF}" presName="hierChild4" presStyleCnt="0"/>
       <dgm:spPr/>
+      <dgm:t>
+        <a:bodyPr/>
+        <a:lstStyle/>
+        <a:p>
+          <a:endParaRPr lang="en-US"/>
+        </a:p>
+      </dgm:t>
     </dgm:pt>
     <dgm:pt modelId="{0E025C5C-57D9-444F-B0C2-7AF9C3D9CB9A}" type="pres">
       <dgm:prSet presAssocID="{C18AE9E4-58C3-4D76-A5FB-6AB6DCC5F6CE}" presName="Name28" presStyleLbl="parChTrans1D4" presStyleIdx="4" presStyleCnt="15"/>
       <dgm:spPr/>
+      <dgm:t>
+        <a:bodyPr/>
+        <a:lstStyle/>
+        <a:p>
+          <a:endParaRPr lang="en-US"/>
+        </a:p>
+      </dgm:t>
     </dgm:pt>
     <dgm:pt modelId="{C5EDF823-32C3-47D5-B733-EFC17EBAE5C1}" type="pres">
       <dgm:prSet presAssocID="{A1EC8075-019A-443B-A990-CF7F53DE9B6C}" presName="hierRoot2" presStyleCnt="0">
@@ -2209,10 +2397,24 @@
         </dgm:presLayoutVars>
       </dgm:prSet>
       <dgm:spPr/>
+      <dgm:t>
+        <a:bodyPr/>
+        <a:lstStyle/>
+        <a:p>
+          <a:endParaRPr lang="en-US"/>
+        </a:p>
+      </dgm:t>
     </dgm:pt>
     <dgm:pt modelId="{F2AA286A-F220-4255-8C94-E786BCB7A9D2}" type="pres">
       <dgm:prSet presAssocID="{A1EC8075-019A-443B-A990-CF7F53DE9B6C}" presName="rootComposite2" presStyleCnt="0"/>
       <dgm:spPr/>
+      <dgm:t>
+        <a:bodyPr/>
+        <a:lstStyle/>
+        <a:p>
+          <a:endParaRPr lang="en-US"/>
+        </a:p>
+      </dgm:t>
     </dgm:pt>
     <dgm:pt modelId="{8AB6158F-8531-4243-9B9E-F063F6D62F02}" type="pres">
       <dgm:prSet presAssocID="{A1EC8075-019A-443B-A990-CF7F53DE9B6C}" presName="rootText2" presStyleLbl="alignAcc1" presStyleIdx="0" presStyleCnt="0" custScaleX="171901">
@@ -2232,10 +2434,24 @@
     <dgm:pt modelId="{5EBF7DAF-B9CC-430C-9A32-FEC851E299DE}" type="pres">
       <dgm:prSet presAssocID="{A1EC8075-019A-443B-A990-CF7F53DE9B6C}" presName="topArc2" presStyleLbl="parChTrans1D1" presStyleIdx="14" presStyleCnt="36"/>
       <dgm:spPr/>
+      <dgm:t>
+        <a:bodyPr/>
+        <a:lstStyle/>
+        <a:p>
+          <a:endParaRPr lang="en-US"/>
+        </a:p>
+      </dgm:t>
     </dgm:pt>
     <dgm:pt modelId="{B39AAD30-56C5-4B5C-A5FE-F7EE6B698A6F}" type="pres">
       <dgm:prSet presAssocID="{A1EC8075-019A-443B-A990-CF7F53DE9B6C}" presName="bottomArc2" presStyleLbl="parChTrans1D1" presStyleIdx="15" presStyleCnt="36"/>
       <dgm:spPr/>
+      <dgm:t>
+        <a:bodyPr/>
+        <a:lstStyle/>
+        <a:p>
+          <a:endParaRPr lang="en-US"/>
+        </a:p>
+      </dgm:t>
     </dgm:pt>
     <dgm:pt modelId="{16E10861-320A-4751-8F93-EF257D70805C}" type="pres">
       <dgm:prSet presAssocID="{A1EC8075-019A-443B-A990-CF7F53DE9B6C}" presName="topConnNode2" presStyleLbl="node4" presStyleIdx="0" presStyleCnt="0"/>
@@ -2251,10 +2467,24 @@
     <dgm:pt modelId="{EE3F7EB5-0792-4C16-B6C0-8581C98A848F}" type="pres">
       <dgm:prSet presAssocID="{A1EC8075-019A-443B-A990-CF7F53DE9B6C}" presName="hierChild4" presStyleCnt="0"/>
       <dgm:spPr/>
+      <dgm:t>
+        <a:bodyPr/>
+        <a:lstStyle/>
+        <a:p>
+          <a:endParaRPr lang="en-US"/>
+        </a:p>
+      </dgm:t>
     </dgm:pt>
     <dgm:pt modelId="{8FED2C8B-F894-48E4-9D0F-B4718B9118D8}" type="pres">
       <dgm:prSet presAssocID="{A1EC8075-019A-443B-A990-CF7F53DE9B6C}" presName="hierChild5" presStyleCnt="0"/>
       <dgm:spPr/>
+      <dgm:t>
+        <a:bodyPr/>
+        <a:lstStyle/>
+        <a:p>
+          <a:endParaRPr lang="en-US"/>
+        </a:p>
+      </dgm:t>
     </dgm:pt>
     <dgm:pt modelId="{B168139D-9638-4836-9432-0FB779B3B428}" type="pres">
       <dgm:prSet presAssocID="{8D7FDFAF-5840-48AE-905E-FEC26B5CBEBE}" presName="Name28" presStyleLbl="parChTrans1D4" presStyleIdx="5" presStyleCnt="15"/>
@@ -2274,10 +2504,24 @@
         </dgm:presLayoutVars>
       </dgm:prSet>
       <dgm:spPr/>
+      <dgm:t>
+        <a:bodyPr/>
+        <a:lstStyle/>
+        <a:p>
+          <a:endParaRPr lang="en-US"/>
+        </a:p>
+      </dgm:t>
     </dgm:pt>
     <dgm:pt modelId="{693934C2-5820-41E4-8321-1CAB3A980E0A}" type="pres">
       <dgm:prSet presAssocID="{5F413A98-045E-4A43-AC3C-B2E8D07F4B83}" presName="rootComposite2" presStyleCnt="0"/>
       <dgm:spPr/>
+      <dgm:t>
+        <a:bodyPr/>
+        <a:lstStyle/>
+        <a:p>
+          <a:endParaRPr lang="en-US"/>
+        </a:p>
+      </dgm:t>
     </dgm:pt>
     <dgm:pt modelId="{0F368D30-1687-4B9A-8E4C-18D6B90C8073}" type="pres">
       <dgm:prSet presAssocID="{5F413A98-045E-4A43-AC3C-B2E8D07F4B83}" presName="rootText2" presStyleLbl="alignAcc1" presStyleIdx="0" presStyleCnt="0" custScaleX="172896">
@@ -2297,10 +2541,24 @@
     <dgm:pt modelId="{0342C0EC-4FAA-42C0-A8B6-F4C9EF916262}" type="pres">
       <dgm:prSet presAssocID="{5F413A98-045E-4A43-AC3C-B2E8D07F4B83}" presName="topArc2" presStyleLbl="parChTrans1D1" presStyleIdx="16" presStyleCnt="36"/>
       <dgm:spPr/>
+      <dgm:t>
+        <a:bodyPr/>
+        <a:lstStyle/>
+        <a:p>
+          <a:endParaRPr lang="en-US"/>
+        </a:p>
+      </dgm:t>
     </dgm:pt>
     <dgm:pt modelId="{771EFBD6-F752-4C5D-A2EB-73C2B557B48B}" type="pres">
       <dgm:prSet presAssocID="{5F413A98-045E-4A43-AC3C-B2E8D07F4B83}" presName="bottomArc2" presStyleLbl="parChTrans1D1" presStyleIdx="17" presStyleCnt="36"/>
       <dgm:spPr/>
+      <dgm:t>
+        <a:bodyPr/>
+        <a:lstStyle/>
+        <a:p>
+          <a:endParaRPr lang="en-US"/>
+        </a:p>
+      </dgm:t>
     </dgm:pt>
     <dgm:pt modelId="{E3829788-7D38-4CB5-9F9B-856D393113D2}" type="pres">
       <dgm:prSet presAssocID="{5F413A98-045E-4A43-AC3C-B2E8D07F4B83}" presName="topConnNode2" presStyleLbl="node4" presStyleIdx="0" presStyleCnt="0"/>
@@ -2316,10 +2574,24 @@
     <dgm:pt modelId="{9FF9B21B-06C1-4D0D-A9A1-0C10287FF4AD}" type="pres">
       <dgm:prSet presAssocID="{5F413A98-045E-4A43-AC3C-B2E8D07F4B83}" presName="hierChild4" presStyleCnt="0"/>
       <dgm:spPr/>
+      <dgm:t>
+        <a:bodyPr/>
+        <a:lstStyle/>
+        <a:p>
+          <a:endParaRPr lang="en-US"/>
+        </a:p>
+      </dgm:t>
     </dgm:pt>
     <dgm:pt modelId="{49AFA00A-55ED-4BEE-8BF9-00A1C8ED5D93}" type="pres">
       <dgm:prSet presAssocID="{5F413A98-045E-4A43-AC3C-B2E8D07F4B83}" presName="hierChild5" presStyleCnt="0"/>
       <dgm:spPr/>
+      <dgm:t>
+        <a:bodyPr/>
+        <a:lstStyle/>
+        <a:p>
+          <a:endParaRPr lang="en-US"/>
+        </a:p>
+      </dgm:t>
     </dgm:pt>
     <dgm:pt modelId="{95646D47-2327-4564-85D8-6CCBB654AD0A}" type="pres">
       <dgm:prSet presAssocID="{97068351-7F29-4DB1-A0B4-9EBF9D77EEEF}" presName="Name28" presStyleLbl="parChTrans1D4" presStyleIdx="6" presStyleCnt="15"/>
@@ -2339,10 +2611,24 @@
         </dgm:presLayoutVars>
       </dgm:prSet>
       <dgm:spPr/>
+      <dgm:t>
+        <a:bodyPr/>
+        <a:lstStyle/>
+        <a:p>
+          <a:endParaRPr lang="en-US"/>
+        </a:p>
+      </dgm:t>
     </dgm:pt>
     <dgm:pt modelId="{3760D94A-E173-4A6D-92E5-FFFB6BDF0D0E}" type="pres">
       <dgm:prSet presAssocID="{D26629C5-CAC0-40C0-8699-E3F9E6C2F5BE}" presName="rootComposite2" presStyleCnt="0"/>
       <dgm:spPr/>
+      <dgm:t>
+        <a:bodyPr/>
+        <a:lstStyle/>
+        <a:p>
+          <a:endParaRPr lang="en-US"/>
+        </a:p>
+      </dgm:t>
     </dgm:pt>
     <dgm:pt modelId="{30AECE91-C63E-4D94-9394-381BD0623EE0}" type="pres">
       <dgm:prSet presAssocID="{D26629C5-CAC0-40C0-8699-E3F9E6C2F5BE}" presName="rootText2" presStyleLbl="alignAcc1" presStyleIdx="0" presStyleCnt="0" custScaleX="208113">
@@ -2362,10 +2648,24 @@
     <dgm:pt modelId="{F4E7FFED-36B0-487A-883C-7055BE2DABA7}" type="pres">
       <dgm:prSet presAssocID="{D26629C5-CAC0-40C0-8699-E3F9E6C2F5BE}" presName="topArc2" presStyleLbl="parChTrans1D1" presStyleIdx="18" presStyleCnt="36"/>
       <dgm:spPr/>
+      <dgm:t>
+        <a:bodyPr/>
+        <a:lstStyle/>
+        <a:p>
+          <a:endParaRPr lang="en-US"/>
+        </a:p>
+      </dgm:t>
     </dgm:pt>
     <dgm:pt modelId="{B311A944-5DE4-43A2-B2A4-39FC75C91AC0}" type="pres">
       <dgm:prSet presAssocID="{D26629C5-CAC0-40C0-8699-E3F9E6C2F5BE}" presName="bottomArc2" presStyleLbl="parChTrans1D1" presStyleIdx="19" presStyleCnt="36"/>
       <dgm:spPr/>
+      <dgm:t>
+        <a:bodyPr/>
+        <a:lstStyle/>
+        <a:p>
+          <a:endParaRPr lang="en-US"/>
+        </a:p>
+      </dgm:t>
     </dgm:pt>
     <dgm:pt modelId="{50357888-1378-470F-BA05-929C6044EC6D}" type="pres">
       <dgm:prSet presAssocID="{D26629C5-CAC0-40C0-8699-E3F9E6C2F5BE}" presName="topConnNode2" presStyleLbl="node4" presStyleIdx="0" presStyleCnt="0"/>
@@ -2381,10 +2681,24 @@
     <dgm:pt modelId="{3C190C30-6092-46B1-B5FD-23FB45CD81BF}" type="pres">
       <dgm:prSet presAssocID="{D26629C5-CAC0-40C0-8699-E3F9E6C2F5BE}" presName="hierChild4" presStyleCnt="0"/>
       <dgm:spPr/>
+      <dgm:t>
+        <a:bodyPr/>
+        <a:lstStyle/>
+        <a:p>
+          <a:endParaRPr lang="en-US"/>
+        </a:p>
+      </dgm:t>
     </dgm:pt>
     <dgm:pt modelId="{95AF125F-CAA4-444E-8CA9-FDF635D3FEDF}" type="pres">
       <dgm:prSet presAssocID="{D26629C5-CAC0-40C0-8699-E3F9E6C2F5BE}" presName="hierChild5" presStyleCnt="0"/>
       <dgm:spPr/>
+      <dgm:t>
+        <a:bodyPr/>
+        <a:lstStyle/>
+        <a:p>
+          <a:endParaRPr lang="en-US"/>
+        </a:p>
+      </dgm:t>
     </dgm:pt>
     <dgm:pt modelId="{B28CA9DD-8294-4623-899E-179B2A328D7B}" type="pres">
       <dgm:prSet presAssocID="{00204AB6-E9C2-44DD-9E72-C0766D735CE9}" presName="Name28" presStyleLbl="parChTrans1D4" presStyleIdx="7" presStyleCnt="15"/>
@@ -2404,10 +2718,24 @@
         </dgm:presLayoutVars>
       </dgm:prSet>
       <dgm:spPr/>
+      <dgm:t>
+        <a:bodyPr/>
+        <a:lstStyle/>
+        <a:p>
+          <a:endParaRPr lang="en-US"/>
+        </a:p>
+      </dgm:t>
     </dgm:pt>
     <dgm:pt modelId="{6BCDBAB0-49B4-497F-84E2-B4204943804C}" type="pres">
       <dgm:prSet presAssocID="{AB4FBE87-8274-4C06-B27D-91DEA9C21018}" presName="rootComposite2" presStyleCnt="0"/>
       <dgm:spPr/>
+      <dgm:t>
+        <a:bodyPr/>
+        <a:lstStyle/>
+        <a:p>
+          <a:endParaRPr lang="en-US"/>
+        </a:p>
+      </dgm:t>
     </dgm:pt>
     <dgm:pt modelId="{9086CC03-1419-4E02-8816-638CF6E9BCD3}" type="pres">
       <dgm:prSet presAssocID="{AB4FBE87-8274-4C06-B27D-91DEA9C21018}" presName="rootText2" presStyleLbl="alignAcc1" presStyleIdx="0" presStyleCnt="0" custScaleX="206372">
@@ -2427,10 +2755,24 @@
     <dgm:pt modelId="{06A44381-AC88-41A2-B1C3-0D0C4B9A0DBE}" type="pres">
       <dgm:prSet presAssocID="{AB4FBE87-8274-4C06-B27D-91DEA9C21018}" presName="topArc2" presStyleLbl="parChTrans1D1" presStyleIdx="20" presStyleCnt="36"/>
       <dgm:spPr/>
+      <dgm:t>
+        <a:bodyPr/>
+        <a:lstStyle/>
+        <a:p>
+          <a:endParaRPr lang="en-US"/>
+        </a:p>
+      </dgm:t>
     </dgm:pt>
     <dgm:pt modelId="{5BF4901D-BB48-46E9-B4BB-EEFFC736A225}" type="pres">
       <dgm:prSet presAssocID="{AB4FBE87-8274-4C06-B27D-91DEA9C21018}" presName="bottomArc2" presStyleLbl="parChTrans1D1" presStyleIdx="21" presStyleCnt="36"/>
       <dgm:spPr/>
+      <dgm:t>
+        <a:bodyPr/>
+        <a:lstStyle/>
+        <a:p>
+          <a:endParaRPr lang="en-US"/>
+        </a:p>
+      </dgm:t>
     </dgm:pt>
     <dgm:pt modelId="{6D2325CE-F490-4991-A56A-892EB5356C74}" type="pres">
       <dgm:prSet presAssocID="{AB4FBE87-8274-4C06-B27D-91DEA9C21018}" presName="topConnNode2" presStyleLbl="node4" presStyleIdx="0" presStyleCnt="0"/>
@@ -2446,14 +2788,35 @@
     <dgm:pt modelId="{AFA4E276-5BCB-4BC0-827F-FC03D8767578}" type="pres">
       <dgm:prSet presAssocID="{AB4FBE87-8274-4C06-B27D-91DEA9C21018}" presName="hierChild4" presStyleCnt="0"/>
       <dgm:spPr/>
+      <dgm:t>
+        <a:bodyPr/>
+        <a:lstStyle/>
+        <a:p>
+          <a:endParaRPr lang="en-US"/>
+        </a:p>
+      </dgm:t>
     </dgm:pt>
     <dgm:pt modelId="{7240F185-3B3E-422F-9761-B6A0F95CF361}" type="pres">
       <dgm:prSet presAssocID="{AB4FBE87-8274-4C06-B27D-91DEA9C21018}" presName="hierChild5" presStyleCnt="0"/>
       <dgm:spPr/>
+      <dgm:t>
+        <a:bodyPr/>
+        <a:lstStyle/>
+        <a:p>
+          <a:endParaRPr lang="en-US"/>
+        </a:p>
+      </dgm:t>
     </dgm:pt>
     <dgm:pt modelId="{57D05D10-8AB7-4D5A-B659-74E602E91DF3}" type="pres">
       <dgm:prSet presAssocID="{AD0F264C-28C5-43BA-86B4-8733D972B0FF}" presName="hierChild5" presStyleCnt="0"/>
       <dgm:spPr/>
+      <dgm:t>
+        <a:bodyPr/>
+        <a:lstStyle/>
+        <a:p>
+          <a:endParaRPr lang="en-US"/>
+        </a:p>
+      </dgm:t>
     </dgm:pt>
     <dgm:pt modelId="{879EC2B6-EEFE-4B35-BE06-9E3A52093AE1}" type="pres">
       <dgm:prSet presAssocID="{2B04B022-3D96-4962-AF3D-E9DB13CF6F2C}" presName="Name28" presStyleLbl="parChTrans1D4" presStyleIdx="8" presStyleCnt="15"/>
@@ -2473,10 +2836,24 @@
         </dgm:presLayoutVars>
       </dgm:prSet>
       <dgm:spPr/>
+      <dgm:t>
+        <a:bodyPr/>
+        <a:lstStyle/>
+        <a:p>
+          <a:endParaRPr lang="en-US"/>
+        </a:p>
+      </dgm:t>
     </dgm:pt>
     <dgm:pt modelId="{0B7F3587-C698-42E5-A8ED-4A5AEC3BC8F4}" type="pres">
       <dgm:prSet presAssocID="{30E7A03F-7F3A-4CF1-8860-75644279B951}" presName="rootComposite2" presStyleCnt="0"/>
       <dgm:spPr/>
+      <dgm:t>
+        <a:bodyPr/>
+        <a:lstStyle/>
+        <a:p>
+          <a:endParaRPr lang="en-US"/>
+        </a:p>
+      </dgm:t>
     </dgm:pt>
     <dgm:pt modelId="{ADE46A3D-DCE0-4E1B-9B8B-5B2E855C537B}" type="pres">
       <dgm:prSet presAssocID="{30E7A03F-7F3A-4CF1-8860-75644279B951}" presName="rootText2" presStyleLbl="alignAcc1" presStyleIdx="0" presStyleCnt="0">
@@ -2496,10 +2873,24 @@
     <dgm:pt modelId="{3FBB455D-F200-4BA3-8A4B-AE5615495DA5}" type="pres">
       <dgm:prSet presAssocID="{30E7A03F-7F3A-4CF1-8860-75644279B951}" presName="topArc2" presStyleLbl="parChTrans1D1" presStyleIdx="22" presStyleCnt="36"/>
       <dgm:spPr/>
+      <dgm:t>
+        <a:bodyPr/>
+        <a:lstStyle/>
+        <a:p>
+          <a:endParaRPr lang="en-US"/>
+        </a:p>
+      </dgm:t>
     </dgm:pt>
     <dgm:pt modelId="{A1B29CD6-71A4-407E-AE3F-A9DF4AAAC1AA}" type="pres">
       <dgm:prSet presAssocID="{30E7A03F-7F3A-4CF1-8860-75644279B951}" presName="bottomArc2" presStyleLbl="parChTrans1D1" presStyleIdx="23" presStyleCnt="36"/>
       <dgm:spPr/>
+      <dgm:t>
+        <a:bodyPr/>
+        <a:lstStyle/>
+        <a:p>
+          <a:endParaRPr lang="en-US"/>
+        </a:p>
+      </dgm:t>
     </dgm:pt>
     <dgm:pt modelId="{D2B4C66E-4A36-4456-B801-30C1FD84ED6F}" type="pres">
       <dgm:prSet presAssocID="{30E7A03F-7F3A-4CF1-8860-75644279B951}" presName="topConnNode2" presStyleLbl="node4" presStyleIdx="0" presStyleCnt="0"/>
@@ -2515,6 +2906,13 @@
     <dgm:pt modelId="{65F7894B-3F1F-4CB5-A4CB-75CE57687AAA}" type="pres">
       <dgm:prSet presAssocID="{30E7A03F-7F3A-4CF1-8860-75644279B951}" presName="hierChild4" presStyleCnt="0"/>
       <dgm:spPr/>
+      <dgm:t>
+        <a:bodyPr/>
+        <a:lstStyle/>
+        <a:p>
+          <a:endParaRPr lang="en-US"/>
+        </a:p>
+      </dgm:t>
     </dgm:pt>
     <dgm:pt modelId="{F30CD632-7AB3-4157-8022-9A04E41C61F5}" type="pres">
       <dgm:prSet presAssocID="{215DF587-48A2-48EC-90C5-28D4E27A3C42}" presName="Name28" presStyleLbl="parChTrans1D4" presStyleIdx="9" presStyleCnt="15"/>
@@ -2534,10 +2932,24 @@
         </dgm:presLayoutVars>
       </dgm:prSet>
       <dgm:spPr/>
+      <dgm:t>
+        <a:bodyPr/>
+        <a:lstStyle/>
+        <a:p>
+          <a:endParaRPr lang="en-US"/>
+        </a:p>
+      </dgm:t>
     </dgm:pt>
     <dgm:pt modelId="{96C252C8-1B90-4090-91F2-174C4C6AB2E2}" type="pres">
       <dgm:prSet presAssocID="{0BD76478-B91F-44E0-A5A7-31AE58744EA4}" presName="rootComposite2" presStyleCnt="0"/>
       <dgm:spPr/>
+      <dgm:t>
+        <a:bodyPr/>
+        <a:lstStyle/>
+        <a:p>
+          <a:endParaRPr lang="en-US"/>
+        </a:p>
+      </dgm:t>
     </dgm:pt>
     <dgm:pt modelId="{DB55847B-863F-4052-B638-1F104125F2A0}" type="pres">
       <dgm:prSet presAssocID="{0BD76478-B91F-44E0-A5A7-31AE58744EA4}" presName="rootText2" presStyleLbl="alignAcc1" presStyleIdx="0" presStyleCnt="0">
@@ -2557,10 +2969,24 @@
     <dgm:pt modelId="{0FB2F8A8-B9B9-494F-B897-540EBC9157CF}" type="pres">
       <dgm:prSet presAssocID="{0BD76478-B91F-44E0-A5A7-31AE58744EA4}" presName="topArc2" presStyleLbl="parChTrans1D1" presStyleIdx="24" presStyleCnt="36"/>
       <dgm:spPr/>
+      <dgm:t>
+        <a:bodyPr/>
+        <a:lstStyle/>
+        <a:p>
+          <a:endParaRPr lang="en-US"/>
+        </a:p>
+      </dgm:t>
     </dgm:pt>
     <dgm:pt modelId="{30CD97F0-2EF3-47D0-9F95-1E240EEDE1E6}" type="pres">
       <dgm:prSet presAssocID="{0BD76478-B91F-44E0-A5A7-31AE58744EA4}" presName="bottomArc2" presStyleLbl="parChTrans1D1" presStyleIdx="25" presStyleCnt="36"/>
       <dgm:spPr/>
+      <dgm:t>
+        <a:bodyPr/>
+        <a:lstStyle/>
+        <a:p>
+          <a:endParaRPr lang="en-US"/>
+        </a:p>
+      </dgm:t>
     </dgm:pt>
     <dgm:pt modelId="{114271C8-59B4-4C10-BA87-A00F7D17C663}" type="pres">
       <dgm:prSet presAssocID="{0BD76478-B91F-44E0-A5A7-31AE58744EA4}" presName="topConnNode2" presStyleLbl="node4" presStyleIdx="0" presStyleCnt="0"/>
@@ -2576,10 +3002,24 @@
     <dgm:pt modelId="{00BC2B00-B005-4A33-BFAD-0491B27F0BC3}" type="pres">
       <dgm:prSet presAssocID="{0BD76478-B91F-44E0-A5A7-31AE58744EA4}" presName="hierChild4" presStyleCnt="0"/>
       <dgm:spPr/>
+      <dgm:t>
+        <a:bodyPr/>
+        <a:lstStyle/>
+        <a:p>
+          <a:endParaRPr lang="en-US"/>
+        </a:p>
+      </dgm:t>
     </dgm:pt>
     <dgm:pt modelId="{CBDB9F45-5B08-44F7-B22C-A2FAC01B95AD}" type="pres">
       <dgm:prSet presAssocID="{0BD76478-B91F-44E0-A5A7-31AE58744EA4}" presName="hierChild5" presStyleCnt="0"/>
       <dgm:spPr/>
+      <dgm:t>
+        <a:bodyPr/>
+        <a:lstStyle/>
+        <a:p>
+          <a:endParaRPr lang="en-US"/>
+        </a:p>
+      </dgm:t>
     </dgm:pt>
     <dgm:pt modelId="{E47EE065-A5AD-439B-A045-57636814262E}" type="pres">
       <dgm:prSet presAssocID="{26A0D31B-9E33-4271-A888-87F357946316}" presName="Name28" presStyleLbl="parChTrans1D4" presStyleIdx="10" presStyleCnt="15"/>
@@ -2599,10 +3039,24 @@
         </dgm:presLayoutVars>
       </dgm:prSet>
       <dgm:spPr/>
+      <dgm:t>
+        <a:bodyPr/>
+        <a:lstStyle/>
+        <a:p>
+          <a:endParaRPr lang="en-US"/>
+        </a:p>
+      </dgm:t>
     </dgm:pt>
     <dgm:pt modelId="{4973447D-AC9F-4F8A-A193-3002710EC9B6}" type="pres">
       <dgm:prSet presAssocID="{220292C8-D3C9-43E3-A7D1-734FA07CC12F}" presName="rootComposite2" presStyleCnt="0"/>
       <dgm:spPr/>
+      <dgm:t>
+        <a:bodyPr/>
+        <a:lstStyle/>
+        <a:p>
+          <a:endParaRPr lang="en-US"/>
+        </a:p>
+      </dgm:t>
     </dgm:pt>
     <dgm:pt modelId="{DB0608AF-6434-4811-8D76-A819FFCCAF16}" type="pres">
       <dgm:prSet presAssocID="{220292C8-D3C9-43E3-A7D1-734FA07CC12F}" presName="rootText2" presStyleLbl="alignAcc1" presStyleIdx="0" presStyleCnt="0">
@@ -2622,10 +3076,24 @@
     <dgm:pt modelId="{C8F92E9B-A002-4473-B9BC-1178E10AFAEA}" type="pres">
       <dgm:prSet presAssocID="{220292C8-D3C9-43E3-A7D1-734FA07CC12F}" presName="topArc2" presStyleLbl="parChTrans1D1" presStyleIdx="26" presStyleCnt="36"/>
       <dgm:spPr/>
+      <dgm:t>
+        <a:bodyPr/>
+        <a:lstStyle/>
+        <a:p>
+          <a:endParaRPr lang="en-US"/>
+        </a:p>
+      </dgm:t>
     </dgm:pt>
     <dgm:pt modelId="{E496D336-07C5-40D6-8C55-28B47F0100A7}" type="pres">
       <dgm:prSet presAssocID="{220292C8-D3C9-43E3-A7D1-734FA07CC12F}" presName="bottomArc2" presStyleLbl="parChTrans1D1" presStyleIdx="27" presStyleCnt="36"/>
       <dgm:spPr/>
+      <dgm:t>
+        <a:bodyPr/>
+        <a:lstStyle/>
+        <a:p>
+          <a:endParaRPr lang="en-US"/>
+        </a:p>
+      </dgm:t>
     </dgm:pt>
     <dgm:pt modelId="{7ECCE2DA-38C0-4CC0-9371-403B20D68AB5}" type="pres">
       <dgm:prSet presAssocID="{220292C8-D3C9-43E3-A7D1-734FA07CC12F}" presName="topConnNode2" presStyleLbl="node4" presStyleIdx="0" presStyleCnt="0"/>
@@ -2641,10 +3109,24 @@
     <dgm:pt modelId="{56464D23-9FAF-458D-8DA9-51B077B174F1}" type="pres">
       <dgm:prSet presAssocID="{220292C8-D3C9-43E3-A7D1-734FA07CC12F}" presName="hierChild4" presStyleCnt="0"/>
       <dgm:spPr/>
+      <dgm:t>
+        <a:bodyPr/>
+        <a:lstStyle/>
+        <a:p>
+          <a:endParaRPr lang="en-US"/>
+        </a:p>
+      </dgm:t>
     </dgm:pt>
     <dgm:pt modelId="{E903E761-CA8D-4076-B2CE-AAEE6E873729}" type="pres">
       <dgm:prSet presAssocID="{220292C8-D3C9-43E3-A7D1-734FA07CC12F}" presName="hierChild5" presStyleCnt="0"/>
       <dgm:spPr/>
+      <dgm:t>
+        <a:bodyPr/>
+        <a:lstStyle/>
+        <a:p>
+          <a:endParaRPr lang="en-US"/>
+        </a:p>
+      </dgm:t>
     </dgm:pt>
     <dgm:pt modelId="{A8270DEA-35D0-4217-AFFF-9FC3852CCDC3}" type="pres">
       <dgm:prSet presAssocID="{965B1A88-B29D-4A73-8FAD-3060039D4AC2}" presName="Name28" presStyleLbl="parChTrans1D4" presStyleIdx="11" presStyleCnt="15"/>
@@ -2664,10 +3146,24 @@
         </dgm:presLayoutVars>
       </dgm:prSet>
       <dgm:spPr/>
+      <dgm:t>
+        <a:bodyPr/>
+        <a:lstStyle/>
+        <a:p>
+          <a:endParaRPr lang="en-US"/>
+        </a:p>
+      </dgm:t>
     </dgm:pt>
     <dgm:pt modelId="{7D0D6588-0822-4815-9347-48DDEDFBC409}" type="pres">
       <dgm:prSet presAssocID="{C767EE05-A867-4605-905A-26AEE19E33EF}" presName="rootComposite2" presStyleCnt="0"/>
       <dgm:spPr/>
+      <dgm:t>
+        <a:bodyPr/>
+        <a:lstStyle/>
+        <a:p>
+          <a:endParaRPr lang="en-US"/>
+        </a:p>
+      </dgm:t>
     </dgm:pt>
     <dgm:pt modelId="{EB104F69-8B6F-485D-BF5B-7765EC980701}" type="pres">
       <dgm:prSet presAssocID="{C767EE05-A867-4605-905A-26AEE19E33EF}" presName="rootText2" presStyleLbl="alignAcc1" presStyleIdx="0" presStyleCnt="0" custScaleX="303151">
@@ -2687,10 +3183,24 @@
     <dgm:pt modelId="{579C4178-BAB5-479D-9ABD-B92882E57EFC}" type="pres">
       <dgm:prSet presAssocID="{C767EE05-A867-4605-905A-26AEE19E33EF}" presName="topArc2" presStyleLbl="parChTrans1D1" presStyleIdx="28" presStyleCnt="36"/>
       <dgm:spPr/>
+      <dgm:t>
+        <a:bodyPr/>
+        <a:lstStyle/>
+        <a:p>
+          <a:endParaRPr lang="en-US"/>
+        </a:p>
+      </dgm:t>
     </dgm:pt>
     <dgm:pt modelId="{016F1884-A744-4BB3-BAAE-E54C40E49009}" type="pres">
       <dgm:prSet presAssocID="{C767EE05-A867-4605-905A-26AEE19E33EF}" presName="bottomArc2" presStyleLbl="parChTrans1D1" presStyleIdx="29" presStyleCnt="36"/>
       <dgm:spPr/>
+      <dgm:t>
+        <a:bodyPr/>
+        <a:lstStyle/>
+        <a:p>
+          <a:endParaRPr lang="en-US"/>
+        </a:p>
+      </dgm:t>
     </dgm:pt>
     <dgm:pt modelId="{EF04980A-0082-4377-90A6-EEA212E92C2D}" type="pres">
       <dgm:prSet presAssocID="{C767EE05-A867-4605-905A-26AEE19E33EF}" presName="topConnNode2" presStyleLbl="node4" presStyleIdx="0" presStyleCnt="0"/>
@@ -2706,14 +3216,35 @@
     <dgm:pt modelId="{B7E27F65-3843-4C14-9702-7B356D1F2682}" type="pres">
       <dgm:prSet presAssocID="{C767EE05-A867-4605-905A-26AEE19E33EF}" presName="hierChild4" presStyleCnt="0"/>
       <dgm:spPr/>
+      <dgm:t>
+        <a:bodyPr/>
+        <a:lstStyle/>
+        <a:p>
+          <a:endParaRPr lang="en-US"/>
+        </a:p>
+      </dgm:t>
     </dgm:pt>
     <dgm:pt modelId="{86469CCB-9092-43D0-A691-3BEC191112DC}" type="pres">
       <dgm:prSet presAssocID="{C767EE05-A867-4605-905A-26AEE19E33EF}" presName="hierChild5" presStyleCnt="0"/>
       <dgm:spPr/>
+      <dgm:t>
+        <a:bodyPr/>
+        <a:lstStyle/>
+        <a:p>
+          <a:endParaRPr lang="en-US"/>
+        </a:p>
+      </dgm:t>
     </dgm:pt>
     <dgm:pt modelId="{9B03D7B9-1A5A-4EBA-AAC6-7AE19C4BE611}" type="pres">
       <dgm:prSet presAssocID="{30E7A03F-7F3A-4CF1-8860-75644279B951}" presName="hierChild5" presStyleCnt="0"/>
       <dgm:spPr/>
+      <dgm:t>
+        <a:bodyPr/>
+        <a:lstStyle/>
+        <a:p>
+          <a:endParaRPr lang="en-US"/>
+        </a:p>
+      </dgm:t>
     </dgm:pt>
     <dgm:pt modelId="{B7CCB88F-0261-4FC8-BA15-888BCD3E30A8}" type="pres">
       <dgm:prSet presAssocID="{4F45B7B3-F24E-4744-A8FD-351D01F180EE}" presName="Name28" presStyleLbl="parChTrans1D4" presStyleIdx="12" presStyleCnt="15"/>
@@ -2733,10 +3264,24 @@
         </dgm:presLayoutVars>
       </dgm:prSet>
       <dgm:spPr/>
+      <dgm:t>
+        <a:bodyPr/>
+        <a:lstStyle/>
+        <a:p>
+          <a:endParaRPr lang="en-US"/>
+        </a:p>
+      </dgm:t>
     </dgm:pt>
     <dgm:pt modelId="{A221C025-D6E4-4B03-AC99-1AAE656F0855}" type="pres">
       <dgm:prSet presAssocID="{490EE227-96C8-47DB-BFD0-816B3A00B399}" presName="rootComposite2" presStyleCnt="0"/>
       <dgm:spPr/>
+      <dgm:t>
+        <a:bodyPr/>
+        <a:lstStyle/>
+        <a:p>
+          <a:endParaRPr lang="en-US"/>
+        </a:p>
+      </dgm:t>
     </dgm:pt>
     <dgm:pt modelId="{8E5B0BCC-D0D8-4094-A7DE-4CD6FD9FA789}" type="pres">
       <dgm:prSet presAssocID="{490EE227-96C8-47DB-BFD0-816B3A00B399}" presName="rootText2" presStyleLbl="alignAcc1" presStyleIdx="0" presStyleCnt="0" custScaleX="236133">
@@ -2756,10 +3301,24 @@
     <dgm:pt modelId="{4BA432B5-D5DB-465F-A8ED-523A8038D560}" type="pres">
       <dgm:prSet presAssocID="{490EE227-96C8-47DB-BFD0-816B3A00B399}" presName="topArc2" presStyleLbl="parChTrans1D1" presStyleIdx="30" presStyleCnt="36"/>
       <dgm:spPr/>
+      <dgm:t>
+        <a:bodyPr/>
+        <a:lstStyle/>
+        <a:p>
+          <a:endParaRPr lang="en-US"/>
+        </a:p>
+      </dgm:t>
     </dgm:pt>
     <dgm:pt modelId="{839401B2-0EB8-4D6F-9583-15FD7D7FA762}" type="pres">
       <dgm:prSet presAssocID="{490EE227-96C8-47DB-BFD0-816B3A00B399}" presName="bottomArc2" presStyleLbl="parChTrans1D1" presStyleIdx="31" presStyleCnt="36"/>
       <dgm:spPr/>
+      <dgm:t>
+        <a:bodyPr/>
+        <a:lstStyle/>
+        <a:p>
+          <a:endParaRPr lang="en-US"/>
+        </a:p>
+      </dgm:t>
     </dgm:pt>
     <dgm:pt modelId="{D02FA1C0-FB7B-4E7B-9212-57FDD04FDDC3}" type="pres">
       <dgm:prSet presAssocID="{490EE227-96C8-47DB-BFD0-816B3A00B399}" presName="topConnNode2" presStyleLbl="node4" presStyleIdx="0" presStyleCnt="0"/>
@@ -2775,14 +3334,35 @@
     <dgm:pt modelId="{A8C6ED02-9680-4673-AEA7-960FDF5C019B}" type="pres">
       <dgm:prSet presAssocID="{490EE227-96C8-47DB-BFD0-816B3A00B399}" presName="hierChild4" presStyleCnt="0"/>
       <dgm:spPr/>
+      <dgm:t>
+        <a:bodyPr/>
+        <a:lstStyle/>
+        <a:p>
+          <a:endParaRPr lang="en-US"/>
+        </a:p>
+      </dgm:t>
     </dgm:pt>
     <dgm:pt modelId="{B943E816-A614-49F0-84A1-31EF2D18A4A5}" type="pres">
       <dgm:prSet presAssocID="{490EE227-96C8-47DB-BFD0-816B3A00B399}" presName="hierChild5" presStyleCnt="0"/>
       <dgm:spPr/>
+      <dgm:t>
+        <a:bodyPr/>
+        <a:lstStyle/>
+        <a:p>
+          <a:endParaRPr lang="en-US"/>
+        </a:p>
+      </dgm:t>
     </dgm:pt>
     <dgm:pt modelId="{46FC53F3-E2B4-4AB7-8C72-75B8B2949500}" type="pres">
       <dgm:prSet presAssocID="{43A42314-2EAC-4DAD-A1A1-C6D0A51E0BAC}" presName="Name28" presStyleLbl="parChTrans1D4" presStyleIdx="13" presStyleCnt="15"/>
       <dgm:spPr/>
+      <dgm:t>
+        <a:bodyPr/>
+        <a:lstStyle/>
+        <a:p>
+          <a:endParaRPr lang="en-US"/>
+        </a:p>
+      </dgm:t>
     </dgm:pt>
     <dgm:pt modelId="{24D73316-1828-41A2-A15D-DA49E2070873}" type="pres">
       <dgm:prSet presAssocID="{C8F89FDB-1B01-44EA-ACFF-60DB3F58DC8B}" presName="hierRoot2" presStyleCnt="0">
@@ -2791,10 +3371,24 @@
         </dgm:presLayoutVars>
       </dgm:prSet>
       <dgm:spPr/>
+      <dgm:t>
+        <a:bodyPr/>
+        <a:lstStyle/>
+        <a:p>
+          <a:endParaRPr lang="en-US"/>
+        </a:p>
+      </dgm:t>
     </dgm:pt>
     <dgm:pt modelId="{DBFB1967-0B62-4FFD-824B-F7FF65F8AF64}" type="pres">
       <dgm:prSet presAssocID="{C8F89FDB-1B01-44EA-ACFF-60DB3F58DC8B}" presName="rootComposite2" presStyleCnt="0"/>
       <dgm:spPr/>
+      <dgm:t>
+        <a:bodyPr/>
+        <a:lstStyle/>
+        <a:p>
+          <a:endParaRPr lang="en-US"/>
+        </a:p>
+      </dgm:t>
     </dgm:pt>
     <dgm:pt modelId="{3388F3EC-68C1-4585-8B64-4450B68DE8D7}" type="pres">
       <dgm:prSet presAssocID="{C8F89FDB-1B01-44EA-ACFF-60DB3F58DC8B}" presName="rootText2" presStyleLbl="alignAcc1" presStyleIdx="0" presStyleCnt="0" custScaleX="182696">
@@ -2814,10 +3408,24 @@
     <dgm:pt modelId="{85E8DC3D-2BB7-44E0-A9BB-543D93F57A2F}" type="pres">
       <dgm:prSet presAssocID="{C8F89FDB-1B01-44EA-ACFF-60DB3F58DC8B}" presName="topArc2" presStyleLbl="parChTrans1D1" presStyleIdx="32" presStyleCnt="36"/>
       <dgm:spPr/>
+      <dgm:t>
+        <a:bodyPr/>
+        <a:lstStyle/>
+        <a:p>
+          <a:endParaRPr lang="en-US"/>
+        </a:p>
+      </dgm:t>
     </dgm:pt>
     <dgm:pt modelId="{485E0016-8DEC-4198-AC98-B9B6C594B7E5}" type="pres">
       <dgm:prSet presAssocID="{C8F89FDB-1B01-44EA-ACFF-60DB3F58DC8B}" presName="bottomArc2" presStyleLbl="parChTrans1D1" presStyleIdx="33" presStyleCnt="36"/>
       <dgm:spPr/>
+      <dgm:t>
+        <a:bodyPr/>
+        <a:lstStyle/>
+        <a:p>
+          <a:endParaRPr lang="en-US"/>
+        </a:p>
+      </dgm:t>
     </dgm:pt>
     <dgm:pt modelId="{47960EFF-35A0-4F39-9B31-1DD1604B6344}" type="pres">
       <dgm:prSet presAssocID="{C8F89FDB-1B01-44EA-ACFF-60DB3F58DC8B}" presName="topConnNode2" presStyleLbl="node4" presStyleIdx="0" presStyleCnt="0"/>
@@ -2833,10 +3441,24 @@
     <dgm:pt modelId="{EF68E7B5-83D5-43EB-83A5-4E99648C9139}" type="pres">
       <dgm:prSet presAssocID="{C8F89FDB-1B01-44EA-ACFF-60DB3F58DC8B}" presName="hierChild4" presStyleCnt="0"/>
       <dgm:spPr/>
+      <dgm:t>
+        <a:bodyPr/>
+        <a:lstStyle/>
+        <a:p>
+          <a:endParaRPr lang="en-US"/>
+        </a:p>
+      </dgm:t>
     </dgm:pt>
     <dgm:pt modelId="{82732868-9283-4264-89D3-0FCFD97F39F8}" type="pres">
       <dgm:prSet presAssocID="{EF2D4896-77CB-445C-877D-F11B38C2579D}" presName="Name28" presStyleLbl="parChTrans1D4" presStyleIdx="14" presStyleCnt="15"/>
       <dgm:spPr/>
+      <dgm:t>
+        <a:bodyPr/>
+        <a:lstStyle/>
+        <a:p>
+          <a:endParaRPr lang="en-US"/>
+        </a:p>
+      </dgm:t>
     </dgm:pt>
     <dgm:pt modelId="{5937D23A-43FD-4479-85D7-9D5C12EA47D8}" type="pres">
       <dgm:prSet presAssocID="{52B1F852-D929-4D6D-AA15-BE4D72739A86}" presName="hierRoot2" presStyleCnt="0">
@@ -2845,10 +3467,24 @@
         </dgm:presLayoutVars>
       </dgm:prSet>
       <dgm:spPr/>
+      <dgm:t>
+        <a:bodyPr/>
+        <a:lstStyle/>
+        <a:p>
+          <a:endParaRPr lang="en-US"/>
+        </a:p>
+      </dgm:t>
     </dgm:pt>
     <dgm:pt modelId="{10E6DAE0-5A23-471D-9EE5-F1D9AB7D02BB}" type="pres">
       <dgm:prSet presAssocID="{52B1F852-D929-4D6D-AA15-BE4D72739A86}" presName="rootComposite2" presStyleCnt="0"/>
       <dgm:spPr/>
+      <dgm:t>
+        <a:bodyPr/>
+        <a:lstStyle/>
+        <a:p>
+          <a:endParaRPr lang="en-US"/>
+        </a:p>
+      </dgm:t>
     </dgm:pt>
     <dgm:pt modelId="{398BC3BB-B7DD-4AAF-9963-2D3D2693CB22}" type="pres">
       <dgm:prSet presAssocID="{52B1F852-D929-4D6D-AA15-BE4D72739A86}" presName="rootText2" presStyleLbl="alignAcc1" presStyleIdx="0" presStyleCnt="0">
@@ -2868,10 +3504,24 @@
     <dgm:pt modelId="{D36BDF83-1659-48B3-8941-883368C8BA30}" type="pres">
       <dgm:prSet presAssocID="{52B1F852-D929-4D6D-AA15-BE4D72739A86}" presName="topArc2" presStyleLbl="parChTrans1D1" presStyleIdx="34" presStyleCnt="36"/>
       <dgm:spPr/>
+      <dgm:t>
+        <a:bodyPr/>
+        <a:lstStyle/>
+        <a:p>
+          <a:endParaRPr lang="en-US"/>
+        </a:p>
+      </dgm:t>
     </dgm:pt>
     <dgm:pt modelId="{402E685E-3A14-4B91-9909-DADE1CECEA5A}" type="pres">
       <dgm:prSet presAssocID="{52B1F852-D929-4D6D-AA15-BE4D72739A86}" presName="bottomArc2" presStyleLbl="parChTrans1D1" presStyleIdx="35" presStyleCnt="36"/>
       <dgm:spPr/>
+      <dgm:t>
+        <a:bodyPr/>
+        <a:lstStyle/>
+        <a:p>
+          <a:endParaRPr lang="en-US"/>
+        </a:p>
+      </dgm:t>
     </dgm:pt>
     <dgm:pt modelId="{23B9C89C-C5CC-4045-B072-F49531FFABEE}" type="pres">
       <dgm:prSet presAssocID="{52B1F852-D929-4D6D-AA15-BE4D72739A86}" presName="topConnNode2" presStyleLbl="node4" presStyleIdx="0" presStyleCnt="0"/>
@@ -2887,26 +3537,68 @@
     <dgm:pt modelId="{79C089EA-1824-4090-8260-4A468065A322}" type="pres">
       <dgm:prSet presAssocID="{52B1F852-D929-4D6D-AA15-BE4D72739A86}" presName="hierChild4" presStyleCnt="0"/>
       <dgm:spPr/>
+      <dgm:t>
+        <a:bodyPr/>
+        <a:lstStyle/>
+        <a:p>
+          <a:endParaRPr lang="en-US"/>
+        </a:p>
+      </dgm:t>
     </dgm:pt>
     <dgm:pt modelId="{39814DF8-2651-403A-B247-66AC9BC19105}" type="pres">
       <dgm:prSet presAssocID="{52B1F852-D929-4D6D-AA15-BE4D72739A86}" presName="hierChild5" presStyleCnt="0"/>
       <dgm:spPr/>
+      <dgm:t>
+        <a:bodyPr/>
+        <a:lstStyle/>
+        <a:p>
+          <a:endParaRPr lang="en-US"/>
+        </a:p>
+      </dgm:t>
     </dgm:pt>
     <dgm:pt modelId="{753E9FBD-9D10-4D54-8B87-DA78E0FBD04E}" type="pres">
       <dgm:prSet presAssocID="{C8F89FDB-1B01-44EA-ACFF-60DB3F58DC8B}" presName="hierChild5" presStyleCnt="0"/>
       <dgm:spPr/>
+      <dgm:t>
+        <a:bodyPr/>
+        <a:lstStyle/>
+        <a:p>
+          <a:endParaRPr lang="en-US"/>
+        </a:p>
+      </dgm:t>
     </dgm:pt>
     <dgm:pt modelId="{2E901098-36B9-4DC9-8852-B0339875F512}" type="pres">
       <dgm:prSet presAssocID="{B27876A7-3F8C-431C-956B-7EAC02A1E33F}" presName="hierChild5" presStyleCnt="0"/>
       <dgm:spPr/>
+      <dgm:t>
+        <a:bodyPr/>
+        <a:lstStyle/>
+        <a:p>
+          <a:endParaRPr lang="en-US"/>
+        </a:p>
+      </dgm:t>
     </dgm:pt>
     <dgm:pt modelId="{A19BFE21-5F78-4451-811E-68CF80540364}" type="pres">
       <dgm:prSet presAssocID="{66DBE711-4A49-4547-8CF2-6E2CF867FF00}" presName="hierChild5" presStyleCnt="0"/>
       <dgm:spPr/>
+      <dgm:t>
+        <a:bodyPr/>
+        <a:lstStyle/>
+        <a:p>
+          <a:endParaRPr lang="en-US"/>
+        </a:p>
+      </dgm:t>
     </dgm:pt>
     <dgm:pt modelId="{3C8B19BB-B43B-43E0-9323-4FAD23563CC9}" type="pres">
       <dgm:prSet presAssocID="{7B7203B6-20DB-4281-8539-1072620383ED}" presName="hierChild3" presStyleCnt="0"/>
       <dgm:spPr/>
+      <dgm:t>
+        <a:bodyPr/>
+        <a:lstStyle/>
+        <a:p>
+          <a:endParaRPr lang="en-US"/>
+        </a:p>
+      </dgm:t>
     </dgm:pt>
   </dgm:ptLst>
   <dgm:cxnLst>
@@ -2919,8 +3611,8 @@
     <dgm:cxn modelId="{34BD3534-FE2E-4A4C-8219-46A253D418FD}" type="presOf" srcId="{66DBE711-4A49-4547-8CF2-6E2CF867FF00}" destId="{39840B04-74A9-430D-8615-F9CEC991CBE5}" srcOrd="1" destOrd="0" presId="urn:microsoft.com/office/officeart/2008/layout/HalfCircleOrganizationChart"/>
     <dgm:cxn modelId="{BA0062DC-233B-48F5-B3ED-F79D4AFB6932}" type="presOf" srcId="{30E7A03F-7F3A-4CF1-8860-75644279B951}" destId="{ADE46A3D-DCE0-4E1B-9B8B-5B2E855C537B}" srcOrd="0" destOrd="0" presId="urn:microsoft.com/office/officeart/2008/layout/HalfCircleOrganizationChart"/>
     <dgm:cxn modelId="{7F1AE16C-63C6-4A55-94AE-AEBB771448DD}" type="presOf" srcId="{7B7203B6-20DB-4281-8539-1072620383ED}" destId="{1E0C8858-A0CA-4D0A-9317-A9C531C71B03}" srcOrd="0" destOrd="0" presId="urn:microsoft.com/office/officeart/2008/layout/HalfCircleOrganizationChart"/>
+    <dgm:cxn modelId="{E77D918A-68AA-4B1E-B522-81F8BA5B9895}" type="presOf" srcId="{C767EE05-A867-4605-905A-26AEE19E33EF}" destId="{EB104F69-8B6F-485D-BF5B-7765EC980701}" srcOrd="0" destOrd="0" presId="urn:microsoft.com/office/officeart/2008/layout/HalfCircleOrganizationChart"/>
     <dgm:cxn modelId="{A9B5940E-DD21-4C89-8255-66F6BA8C8292}" type="presOf" srcId="{EF2D4896-77CB-445C-877D-F11B38C2579D}" destId="{82732868-9283-4264-89D3-0FCFD97F39F8}" srcOrd="0" destOrd="0" presId="urn:microsoft.com/office/officeart/2008/layout/HalfCircleOrganizationChart"/>
-    <dgm:cxn modelId="{E77D918A-68AA-4B1E-B522-81F8BA5B9895}" type="presOf" srcId="{C767EE05-A867-4605-905A-26AEE19E33EF}" destId="{EB104F69-8B6F-485D-BF5B-7765EC980701}" srcOrd="0" destOrd="0" presId="urn:microsoft.com/office/officeart/2008/layout/HalfCircleOrganizationChart"/>
     <dgm:cxn modelId="{87B0C0E7-9E8A-4C09-8359-A4439AEA48D1}" srcId="{30E7A03F-7F3A-4CF1-8860-75644279B951}" destId="{220292C8-D3C9-43E3-A7D1-734FA07CC12F}" srcOrd="1" destOrd="0" parTransId="{26A0D31B-9E33-4271-A888-87F357946316}" sibTransId="{45D0FF33-0D4C-4EAF-AA6D-D07026E2F0AB}"/>
     <dgm:cxn modelId="{BD83622E-6AA3-460A-A61F-7E1B7E7DB51D}" type="presOf" srcId="{AD0F264C-28C5-43BA-86B4-8733D972B0FF}" destId="{D07A9C80-965E-4711-A655-3460DDBA569B}" srcOrd="0" destOrd="0" presId="urn:microsoft.com/office/officeart/2008/layout/HalfCircleOrganizationChart"/>
     <dgm:cxn modelId="{C66EAD64-C6F8-4362-A3C9-9E07558C4F90}" srcId="{B27876A7-3F8C-431C-956B-7EAC02A1E33F}" destId="{C8F89FDB-1B01-44EA-ACFF-60DB3F58DC8B}" srcOrd="4" destOrd="0" parTransId="{43A42314-2EAC-4DAD-A1A1-C6D0A51E0BAC}" sibTransId="{5EC999CD-9912-4E84-94BE-798BF19BDD17}"/>
@@ -3206,8 +3898,7 @@
         <a:noFill/>
         <a:ln w="19050" cap="rnd" cmpd="sng" algn="ctr">
           <a:solidFill>
-            <a:schemeClr val="accent1">
-              <a:shade val="80000"/>
+            <a:schemeClr val="accent5">
               <a:hueOff val="0"/>
               <a:satOff val="0"/>
               <a:lumOff val="0"/>
@@ -3272,8 +3963,7 @@
         <a:noFill/>
         <a:ln w="19050" cap="rnd" cmpd="sng" algn="ctr">
           <a:solidFill>
-            <a:schemeClr val="accent1">
-              <a:shade val="80000"/>
+            <a:schemeClr val="accent5">
               <a:hueOff val="0"/>
               <a:satOff val="0"/>
               <a:lumOff val="0"/>
@@ -3338,8 +4028,7 @@
         <a:noFill/>
         <a:ln w="19050" cap="rnd" cmpd="sng" algn="ctr">
           <a:solidFill>
-            <a:schemeClr val="accent1">
-              <a:shade val="80000"/>
+            <a:schemeClr val="accent5">
               <a:hueOff val="0"/>
               <a:satOff val="0"/>
               <a:lumOff val="0"/>
@@ -3401,8 +4090,7 @@
         <a:noFill/>
         <a:ln w="19050" cap="rnd" cmpd="sng" algn="ctr">
           <a:solidFill>
-            <a:schemeClr val="accent1">
-              <a:shade val="80000"/>
+            <a:schemeClr val="accent5">
               <a:hueOff val="0"/>
               <a:satOff val="0"/>
               <a:lumOff val="0"/>
@@ -3464,8 +4152,7 @@
         <a:noFill/>
         <a:ln w="19050" cap="rnd" cmpd="sng" algn="ctr">
           <a:solidFill>
-            <a:schemeClr val="accent1">
-              <a:shade val="80000"/>
+            <a:schemeClr val="accent5">
               <a:hueOff val="0"/>
               <a:satOff val="0"/>
               <a:lumOff val="0"/>
@@ -3527,8 +4214,7 @@
         <a:noFill/>
         <a:ln w="19050" cap="rnd" cmpd="sng" algn="ctr">
           <a:solidFill>
-            <a:schemeClr val="accent1">
-              <a:shade val="80000"/>
+            <a:schemeClr val="accent5">
               <a:hueOff val="0"/>
               <a:satOff val="0"/>
               <a:lumOff val="0"/>
@@ -3593,8 +4279,7 @@
         <a:noFill/>
         <a:ln w="19050" cap="rnd" cmpd="sng" algn="ctr">
           <a:solidFill>
-            <a:schemeClr val="accent1">
-              <a:shade val="80000"/>
+            <a:schemeClr val="accent5">
               <a:hueOff val="0"/>
               <a:satOff val="0"/>
               <a:lumOff val="0"/>
@@ -3656,8 +4341,7 @@
         <a:noFill/>
         <a:ln w="19050" cap="rnd" cmpd="sng" algn="ctr">
           <a:solidFill>
-            <a:schemeClr val="accent1">
-              <a:shade val="80000"/>
+            <a:schemeClr val="accent5">
               <a:hueOff val="0"/>
               <a:satOff val="0"/>
               <a:lumOff val="0"/>
@@ -3719,8 +4403,7 @@
         <a:noFill/>
         <a:ln w="19050" cap="rnd" cmpd="sng" algn="ctr">
           <a:solidFill>
-            <a:schemeClr val="accent1">
-              <a:shade val="80000"/>
+            <a:schemeClr val="accent5">
               <a:hueOff val="0"/>
               <a:satOff val="0"/>
               <a:lumOff val="0"/>
@@ -3782,8 +4465,7 @@
         <a:noFill/>
         <a:ln w="19050" cap="rnd" cmpd="sng" algn="ctr">
           <a:solidFill>
-            <a:schemeClr val="accent1">
-              <a:shade val="80000"/>
+            <a:schemeClr val="accent5">
               <a:hueOff val="0"/>
               <a:satOff val="0"/>
               <a:lumOff val="0"/>
@@ -3845,8 +4527,7 @@
         <a:noFill/>
         <a:ln w="19050" cap="rnd" cmpd="sng" algn="ctr">
           <a:solidFill>
-            <a:schemeClr val="accent1">
-              <a:shade val="80000"/>
+            <a:schemeClr val="accent5">
               <a:hueOff val="0"/>
               <a:satOff val="0"/>
               <a:lumOff val="0"/>
@@ -3911,8 +4592,7 @@
         <a:noFill/>
         <a:ln w="19050" cap="rnd" cmpd="sng" algn="ctr">
           <a:solidFill>
-            <a:schemeClr val="accent1">
-              <a:shade val="80000"/>
+            <a:schemeClr val="accent5">
               <a:hueOff val="0"/>
               <a:satOff val="0"/>
               <a:lumOff val="0"/>
@@ -3974,8 +4654,7 @@
         <a:noFill/>
         <a:ln w="19050" cap="rnd" cmpd="sng" algn="ctr">
           <a:solidFill>
-            <a:schemeClr val="accent1">
-              <a:shade val="80000"/>
+            <a:schemeClr val="accent5">
               <a:hueOff val="0"/>
               <a:satOff val="0"/>
               <a:lumOff val="0"/>
@@ -4037,8 +4716,7 @@
         <a:noFill/>
         <a:ln w="19050" cap="rnd" cmpd="sng" algn="ctr">
           <a:solidFill>
-            <a:schemeClr val="accent1">
-              <a:shade val="80000"/>
+            <a:schemeClr val="accent5">
               <a:hueOff val="0"/>
               <a:satOff val="0"/>
               <a:lumOff val="0"/>
@@ -4103,8 +4781,7 @@
         <a:noFill/>
         <a:ln w="19050" cap="rnd" cmpd="sng" algn="ctr">
           <a:solidFill>
-            <a:schemeClr val="accent1">
-              <a:shade val="80000"/>
+            <a:schemeClr val="accent5">
               <a:hueOff val="0"/>
               <a:satOff val="0"/>
               <a:lumOff val="0"/>
@@ -4163,8 +4840,7 @@
         <a:noFill/>
         <a:ln w="19050" cap="rnd" cmpd="sng" algn="ctr">
           <a:solidFill>
-            <a:schemeClr val="accent1">
-              <a:shade val="80000"/>
+            <a:schemeClr val="accent4">
               <a:hueOff val="0"/>
               <a:satOff val="0"/>
               <a:lumOff val="0"/>
@@ -4223,8 +4899,7 @@
         <a:noFill/>
         <a:ln w="19050" cap="rnd" cmpd="sng" algn="ctr">
           <a:solidFill>
-            <a:schemeClr val="accent1">
-              <a:shade val="60000"/>
+            <a:schemeClr val="accent3">
               <a:hueOff val="0"/>
               <a:satOff val="0"/>
               <a:lumOff val="0"/>
@@ -4272,8 +4947,7 @@
         <a:noFill/>
         <a:ln w="19050" cap="rnd" cmpd="sng" algn="ctr">
           <a:solidFill>
-            <a:schemeClr val="accent1">
-              <a:shade val="60000"/>
+            <a:schemeClr val="accent2">
               <a:hueOff val="0"/>
               <a:satOff val="0"/>
               <a:lumOff val="0"/>
@@ -4321,8 +4995,7 @@
         <a:noFill/>
         <a:ln w="19050" cap="rnd" cmpd="sng" algn="ctr">
           <a:solidFill>
-            <a:schemeClr val="accent1">
-              <a:shade val="60000"/>
+            <a:schemeClr val="accent2">
               <a:hueOff val="0"/>
               <a:satOff val="0"/>
               <a:lumOff val="0"/>
@@ -4442,8 +5115,7 @@
         <a:noFill/>
         <a:ln w="19050" cap="rnd" cmpd="sng" algn="ctr">
           <a:solidFill>
-            <a:schemeClr val="accent1">
-              <a:shade val="60000"/>
+            <a:schemeClr val="accent2">
               <a:hueOff val="0"/>
               <a:satOff val="0"/>
               <a:lumOff val="0"/>
@@ -4491,8 +5163,7 @@
         <a:noFill/>
         <a:ln w="19050" cap="rnd" cmpd="sng" algn="ctr">
           <a:solidFill>
-            <a:schemeClr val="accent1">
-              <a:shade val="60000"/>
+            <a:schemeClr val="accent2">
               <a:hueOff val="0"/>
               <a:satOff val="0"/>
               <a:lumOff val="0"/>
@@ -4582,28 +5253,17 @@
             </a:spcAft>
           </a:pPr>
           <a:r>
-            <a:rPr lang="en-US" sz="1400" kern="1200" dirty="0" smtClean="0"/>
+            <a:rPr lang="en-US" sz="1400" kern="1200" smtClean="0"/>
             <a:t>Parsing </a:t>
           </a:r>
           <a:r>
-            <a:rPr lang="en-US" sz="1400" i="1" kern="1200" dirty="0" smtClean="0">
-              <a:solidFill>
-                <a:schemeClr val="accent4">
-                  <a:lumMod val="75000"/>
-                </a:schemeClr>
-              </a:solidFill>
+            <a:rPr lang="en-US" sz="1400" i="1" kern="1200" smtClean="0">
               <a:latin typeface="Consolas" panose="020B0609020204030204" pitchFamily="49" charset="0"/>
               <a:cs typeface="Consolas" panose="020B0609020204030204" pitchFamily="49" charset="0"/>
             </a:rPr>
             <a:t>√</a:t>
           </a:r>
-          <a:endParaRPr lang="en-US" sz="1400" kern="1200" dirty="0">
-            <a:solidFill>
-              <a:schemeClr val="accent4">
-                <a:lumMod val="75000"/>
-              </a:schemeClr>
-            </a:solidFill>
-          </a:endParaRPr>
+          <a:endParaRPr lang="en-US" sz="1400" kern="1200" dirty="0"/>
         </a:p>
       </dsp:txBody>
       <dsp:txXfrm>
@@ -4630,8 +5290,7 @@
         <a:noFill/>
         <a:ln w="19050" cap="rnd" cmpd="sng" algn="ctr">
           <a:solidFill>
-            <a:schemeClr val="accent1">
-              <a:shade val="60000"/>
+            <a:schemeClr val="accent2">
               <a:hueOff val="0"/>
               <a:satOff val="0"/>
               <a:lumOff val="0"/>
@@ -4679,8 +5338,7 @@
         <a:noFill/>
         <a:ln w="19050" cap="rnd" cmpd="sng" algn="ctr">
           <a:solidFill>
-            <a:schemeClr val="accent1">
-              <a:shade val="60000"/>
+            <a:schemeClr val="accent2">
               <a:hueOff val="0"/>
               <a:satOff val="0"/>
               <a:lumOff val="0"/>
@@ -4770,28 +5428,17 @@
             </a:spcAft>
           </a:pPr>
           <a:r>
-            <a:rPr lang="en-US" sz="1400" kern="1200" dirty="0" smtClean="0"/>
+            <a:rPr lang="en-US" sz="1400" kern="1200" smtClean="0"/>
             <a:t>Conversion to AST </a:t>
           </a:r>
           <a:r>
-            <a:rPr lang="en-US" sz="1400" i="1" kern="1200" dirty="0" smtClean="0">
-              <a:solidFill>
-                <a:schemeClr val="accent4">
-                  <a:lumMod val="75000"/>
-                </a:schemeClr>
-              </a:solidFill>
+            <a:rPr lang="en-US" sz="1400" i="1" kern="1200" smtClean="0">
               <a:latin typeface="Consolas" panose="020B0609020204030204" pitchFamily="49" charset="0"/>
               <a:cs typeface="Consolas" panose="020B0609020204030204" pitchFamily="49" charset="0"/>
             </a:rPr>
             <a:t>√</a:t>
           </a:r>
-          <a:endParaRPr lang="en-US" sz="1400" kern="1200" dirty="0">
-            <a:solidFill>
-              <a:schemeClr val="accent4">
-                <a:lumMod val="75000"/>
-              </a:schemeClr>
-            </a:solidFill>
-          </a:endParaRPr>
+          <a:endParaRPr lang="en-US" sz="1400" kern="1200" dirty="0"/>
         </a:p>
       </dsp:txBody>
       <dsp:txXfrm>
@@ -4818,8 +5465,7 @@
         <a:noFill/>
         <a:ln w="19050" cap="rnd" cmpd="sng" algn="ctr">
           <a:solidFill>
-            <a:schemeClr val="accent1">
-              <a:shade val="60000"/>
+            <a:schemeClr val="accent2">
               <a:hueOff val="0"/>
               <a:satOff val="0"/>
               <a:lumOff val="0"/>
@@ -4867,8 +5513,7 @@
         <a:noFill/>
         <a:ln w="19050" cap="rnd" cmpd="sng" algn="ctr">
           <a:solidFill>
-            <a:schemeClr val="accent1">
-              <a:shade val="60000"/>
+            <a:schemeClr val="accent2">
               <a:hueOff val="0"/>
               <a:satOff val="0"/>
               <a:lumOff val="0"/>
@@ -4988,8 +5633,7 @@
         <a:noFill/>
         <a:ln w="19050" cap="rnd" cmpd="sng" algn="ctr">
           <a:solidFill>
-            <a:schemeClr val="accent1">
-              <a:shade val="60000"/>
+            <a:schemeClr val="accent2">
               <a:hueOff val="0"/>
               <a:satOff val="0"/>
               <a:lumOff val="0"/>
@@ -5037,8 +5681,7 @@
         <a:noFill/>
         <a:ln w="19050" cap="rnd" cmpd="sng" algn="ctr">
           <a:solidFill>
-            <a:schemeClr val="accent1">
-              <a:shade val="60000"/>
+            <a:schemeClr val="accent2">
               <a:hueOff val="0"/>
               <a:satOff val="0"/>
               <a:lumOff val="0"/>
@@ -5158,8 +5801,7 @@
         <a:noFill/>
         <a:ln w="19050" cap="rnd" cmpd="sng" algn="ctr">
           <a:solidFill>
-            <a:schemeClr val="accent1">
-              <a:shade val="60000"/>
+            <a:schemeClr val="accent2">
               <a:hueOff val="0"/>
               <a:satOff val="0"/>
               <a:lumOff val="0"/>
@@ -5207,8 +5849,7 @@
         <a:noFill/>
         <a:ln w="19050" cap="rnd" cmpd="sng" algn="ctr">
           <a:solidFill>
-            <a:schemeClr val="accent1">
-              <a:shade val="60000"/>
+            <a:schemeClr val="accent2">
               <a:hueOff val="0"/>
               <a:satOff val="0"/>
               <a:lumOff val="0"/>
@@ -5328,8 +5969,7 @@
         <a:noFill/>
         <a:ln w="19050" cap="rnd" cmpd="sng" algn="ctr">
           <a:solidFill>
-            <a:schemeClr val="accent1">
-              <a:shade val="60000"/>
+            <a:schemeClr val="accent2">
               <a:hueOff val="0"/>
               <a:satOff val="0"/>
               <a:lumOff val="0"/>
@@ -5377,8 +6017,7 @@
         <a:noFill/>
         <a:ln w="19050" cap="rnd" cmpd="sng" algn="ctr">
           <a:solidFill>
-            <a:schemeClr val="accent1">
-              <a:shade val="60000"/>
+            <a:schemeClr val="accent2">
               <a:hueOff val="0"/>
               <a:satOff val="0"/>
               <a:lumOff val="0"/>
@@ -5498,8 +6137,7 @@
         <a:noFill/>
         <a:ln w="19050" cap="rnd" cmpd="sng" algn="ctr">
           <a:solidFill>
-            <a:schemeClr val="accent1">
-              <a:shade val="60000"/>
+            <a:schemeClr val="accent2">
               <a:hueOff val="0"/>
               <a:satOff val="0"/>
               <a:lumOff val="0"/>
@@ -5547,8 +6185,7 @@
         <a:noFill/>
         <a:ln w="19050" cap="rnd" cmpd="sng" algn="ctr">
           <a:solidFill>
-            <a:schemeClr val="accent1">
-              <a:shade val="60000"/>
+            <a:schemeClr val="accent2">
               <a:hueOff val="0"/>
               <a:satOff val="0"/>
               <a:lumOff val="0"/>
@@ -5638,16 +6275,11 @@
             </a:spcAft>
           </a:pPr>
           <a:r>
-            <a:rPr lang="en-US" sz="1400" kern="1200" dirty="0" smtClean="0"/>
+            <a:rPr lang="en-US" sz="1400" kern="1200" smtClean="0"/>
             <a:t>Type Checking </a:t>
           </a:r>
           <a:r>
-            <a:rPr lang="en-US" sz="1400" i="1" kern="1200" dirty="0" smtClean="0">
-              <a:solidFill>
-                <a:schemeClr val="accent4">
-                  <a:lumMod val="75000"/>
-                </a:schemeClr>
-              </a:solidFill>
+            <a:rPr lang="en-US" sz="1400" i="1" kern="1200" smtClean="0">
               <a:latin typeface="Consolas" panose="020B0609020204030204" pitchFamily="49" charset="0"/>
               <a:cs typeface="Consolas" panose="020B0609020204030204" pitchFamily="49" charset="0"/>
             </a:rPr>
@@ -5680,8 +6312,7 @@
         <a:noFill/>
         <a:ln w="19050" cap="rnd" cmpd="sng" algn="ctr">
           <a:solidFill>
-            <a:schemeClr val="accent1">
-              <a:shade val="60000"/>
+            <a:schemeClr val="accent2">
               <a:hueOff val="0"/>
               <a:satOff val="0"/>
               <a:lumOff val="0"/>
@@ -5729,8 +6360,7 @@
         <a:noFill/>
         <a:ln w="19050" cap="rnd" cmpd="sng" algn="ctr">
           <a:solidFill>
-            <a:schemeClr val="accent1">
-              <a:shade val="60000"/>
+            <a:schemeClr val="accent2">
               <a:hueOff val="0"/>
               <a:satOff val="0"/>
               <a:lumOff val="0"/>
@@ -5850,8 +6480,7 @@
         <a:noFill/>
         <a:ln w="19050" cap="rnd" cmpd="sng" algn="ctr">
           <a:solidFill>
-            <a:schemeClr val="accent1">
-              <a:shade val="60000"/>
+            <a:schemeClr val="accent2">
               <a:hueOff val="0"/>
               <a:satOff val="0"/>
               <a:lumOff val="0"/>
@@ -5899,8 +6528,7 @@
         <a:noFill/>
         <a:ln w="19050" cap="rnd" cmpd="sng" algn="ctr">
           <a:solidFill>
-            <a:schemeClr val="accent1">
-              <a:shade val="60000"/>
+            <a:schemeClr val="accent2">
               <a:hueOff val="0"/>
               <a:satOff val="0"/>
               <a:lumOff val="0"/>
@@ -5990,28 +6618,17 @@
             </a:spcAft>
           </a:pPr>
           <a:r>
-            <a:rPr lang="en-US" sz="1400" kern="1200" dirty="0" smtClean="0"/>
+            <a:rPr lang="en-US" sz="1400" kern="1200" smtClean="0"/>
             <a:t>Class consistency </a:t>
           </a:r>
           <a:r>
-            <a:rPr lang="en-US" sz="1400" i="1" kern="1200" dirty="0" smtClean="0">
-              <a:solidFill>
-                <a:schemeClr val="accent4">
-                  <a:lumMod val="75000"/>
-                </a:schemeClr>
-              </a:solidFill>
+            <a:rPr lang="en-US" sz="1400" i="1" kern="1200" smtClean="0">
               <a:latin typeface="Consolas" panose="020B0609020204030204" pitchFamily="49" charset="0"/>
               <a:cs typeface="Consolas" panose="020B0609020204030204" pitchFamily="49" charset="0"/>
             </a:rPr>
             <a:t>√</a:t>
           </a:r>
-          <a:endParaRPr lang="en-US" sz="1400" kern="1200" dirty="0">
-            <a:solidFill>
-              <a:schemeClr val="accent4">
-                <a:lumMod val="75000"/>
-              </a:schemeClr>
-            </a:solidFill>
-          </a:endParaRPr>
+          <a:endParaRPr lang="en-US" sz="1400" kern="1200" dirty="0"/>
         </a:p>
       </dsp:txBody>
       <dsp:txXfrm>
@@ -6038,8 +6655,7 @@
         <a:noFill/>
         <a:ln w="19050" cap="rnd" cmpd="sng" algn="ctr">
           <a:solidFill>
-            <a:schemeClr val="accent1">
-              <a:shade val="60000"/>
+            <a:schemeClr val="accent2">
               <a:hueOff val="0"/>
               <a:satOff val="0"/>
               <a:lumOff val="0"/>
@@ -6087,8 +6703,7 @@
         <a:noFill/>
         <a:ln w="19050" cap="rnd" cmpd="sng" algn="ctr">
           <a:solidFill>
-            <a:schemeClr val="accent1">
-              <a:shade val="60000"/>
+            <a:schemeClr val="accent2">
               <a:hueOff val="0"/>
               <a:satOff val="0"/>
               <a:lumOff val="0"/>
@@ -6208,8 +6823,7 @@
         <a:noFill/>
         <a:ln w="19050" cap="rnd" cmpd="sng" algn="ctr">
           <a:solidFill>
-            <a:schemeClr val="accent1">
-              <a:shade val="60000"/>
+            <a:schemeClr val="accent2">
               <a:hueOff val="0"/>
               <a:satOff val="0"/>
               <a:lumOff val="0"/>
@@ -6257,8 +6871,7 @@
         <a:noFill/>
         <a:ln w="19050" cap="rnd" cmpd="sng" algn="ctr">
           <a:solidFill>
-            <a:schemeClr val="accent1">
-              <a:shade val="60000"/>
+            <a:schemeClr val="accent2">
               <a:hueOff val="0"/>
               <a:satOff val="0"/>
               <a:lumOff val="0"/>
@@ -6378,8 +6991,7 @@
         <a:noFill/>
         <a:ln w="19050" cap="rnd" cmpd="sng" algn="ctr">
           <a:solidFill>
-            <a:schemeClr val="accent1">
-              <a:shade val="60000"/>
+            <a:schemeClr val="accent2">
               <a:hueOff val="0"/>
               <a:satOff val="0"/>
               <a:lumOff val="0"/>
@@ -6427,8 +7039,7 @@
         <a:noFill/>
         <a:ln w="19050" cap="rnd" cmpd="sng" algn="ctr">
           <a:solidFill>
-            <a:schemeClr val="accent1">
-              <a:shade val="60000"/>
+            <a:schemeClr val="accent2">
               <a:hueOff val="0"/>
               <a:satOff val="0"/>
               <a:lumOff val="0"/>
@@ -6518,38 +7129,21 @@
             </a:spcAft>
           </a:pPr>
           <a:r>
-            <a:rPr lang="en-US" sz="1400" kern="1200" dirty="0" smtClean="0"/>
+            <a:rPr lang="en-US" sz="1400" kern="1200" smtClean="0"/>
             <a:t>to SMT </a:t>
           </a:r>
           <a:r>
-            <a:rPr lang="en-US" sz="1400" i="1" kern="1200" dirty="0" smtClean="0">
-              <a:solidFill>
-                <a:schemeClr val="accent4">
-                  <a:lumMod val="75000"/>
-                </a:schemeClr>
-              </a:solidFill>
+            <a:rPr lang="en-US" sz="1400" i="1" kern="1200" smtClean="0">
               <a:latin typeface="Consolas" panose="020B0609020204030204" pitchFamily="49" charset="0"/>
               <a:cs typeface="Consolas" panose="020B0609020204030204" pitchFamily="49" charset="0"/>
             </a:rPr>
             <a:t>√</a:t>
           </a:r>
           <a:r>
-            <a:rPr lang="en-US" sz="1400" kern="1200" dirty="0" smtClean="0">
-              <a:solidFill>
-                <a:schemeClr val="accent4">
-                  <a:lumMod val="75000"/>
-                </a:schemeClr>
-              </a:solidFill>
-            </a:rPr>
+            <a:rPr lang="en-US" sz="1400" kern="1200" smtClean="0"/>
             <a:t> </a:t>
           </a:r>
-          <a:endParaRPr lang="en-US" sz="1400" kern="1200" dirty="0">
-            <a:solidFill>
-              <a:schemeClr val="accent4">
-                <a:lumMod val="75000"/>
-              </a:schemeClr>
-            </a:solidFill>
-          </a:endParaRPr>
+          <a:endParaRPr lang="en-US" sz="1400" kern="1200" dirty="0"/>
         </a:p>
       </dsp:txBody>
       <dsp:txXfrm>
@@ -6576,8 +7170,7 @@
         <a:noFill/>
         <a:ln w="19050" cap="rnd" cmpd="sng" algn="ctr">
           <a:solidFill>
-            <a:schemeClr val="accent1">
-              <a:shade val="60000"/>
+            <a:schemeClr val="accent2">
               <a:hueOff val="0"/>
               <a:satOff val="0"/>
               <a:lumOff val="0"/>
@@ -6625,8 +7218,7 @@
         <a:noFill/>
         <a:ln w="19050" cap="rnd" cmpd="sng" algn="ctr">
           <a:solidFill>
-            <a:schemeClr val="accent1">
-              <a:shade val="60000"/>
+            <a:schemeClr val="accent2">
               <a:hueOff val="0"/>
               <a:satOff val="0"/>
               <a:lumOff val="0"/>
@@ -6746,8 +7338,7 @@
         <a:noFill/>
         <a:ln w="19050" cap="rnd" cmpd="sng" algn="ctr">
           <a:solidFill>
-            <a:schemeClr val="accent1">
-              <a:shade val="60000"/>
+            <a:schemeClr val="accent2">
               <a:hueOff val="0"/>
               <a:satOff val="0"/>
               <a:lumOff val="0"/>
@@ -6795,8 +7386,7 @@
         <a:noFill/>
         <a:ln w="19050" cap="rnd" cmpd="sng" algn="ctr">
           <a:solidFill>
-            <a:schemeClr val="accent1">
-              <a:shade val="60000"/>
+            <a:schemeClr val="accent2">
               <a:hueOff val="0"/>
               <a:satOff val="0"/>
               <a:lumOff val="0"/>
@@ -6922,8 +7512,7 @@
         <a:noFill/>
         <a:ln w="19050" cap="rnd" cmpd="sng" algn="ctr">
           <a:solidFill>
-            <a:schemeClr val="accent1">
-              <a:shade val="60000"/>
+            <a:schemeClr val="accent2">
               <a:hueOff val="0"/>
               <a:satOff val="0"/>
               <a:lumOff val="0"/>
@@ -6971,8 +7560,7 @@
         <a:noFill/>
         <a:ln w="19050" cap="rnd" cmpd="sng" algn="ctr">
           <a:solidFill>
-            <a:schemeClr val="accent1">
-              <a:shade val="60000"/>
+            <a:schemeClr val="accent2">
               <a:hueOff val="0"/>
               <a:satOff val="0"/>
               <a:lumOff val="0"/>
@@ -7092,8 +7680,7 @@
         <a:noFill/>
         <a:ln w="19050" cap="rnd" cmpd="sng" algn="ctr">
           <a:solidFill>
-            <a:schemeClr val="accent1">
-              <a:shade val="60000"/>
+            <a:schemeClr val="accent2">
               <a:hueOff val="0"/>
               <a:satOff val="0"/>
               <a:lumOff val="0"/>
@@ -7141,8 +7728,7 @@
         <a:noFill/>
         <a:ln w="19050" cap="rnd" cmpd="sng" algn="ctr">
           <a:solidFill>
-            <a:schemeClr val="accent1">
-              <a:shade val="60000"/>
+            <a:schemeClr val="accent2">
               <a:hueOff val="0"/>
               <a:satOff val="0"/>
               <a:lumOff val="0"/>
@@ -7262,8 +7848,7 @@
         <a:noFill/>
         <a:ln w="19050" cap="rnd" cmpd="sng" algn="ctr">
           <a:solidFill>
-            <a:schemeClr val="accent1">
-              <a:shade val="60000"/>
+            <a:schemeClr val="accent2">
               <a:hueOff val="0"/>
               <a:satOff val="0"/>
               <a:lumOff val="0"/>
@@ -7311,8 +7896,7 @@
         <a:noFill/>
         <a:ln w="19050" cap="rnd" cmpd="sng" algn="ctr">
           <a:solidFill>
-            <a:schemeClr val="accent1">
-              <a:shade val="60000"/>
+            <a:schemeClr val="accent2">
               <a:hueOff val="0"/>
               <a:satOff val="0"/>
               <a:lumOff val="0"/>
@@ -7402,16 +7986,11 @@
             </a:spcAft>
           </a:pPr>
           <a:r>
-            <a:rPr lang="en-US" sz="1400" kern="1200" dirty="0" smtClean="0"/>
+            <a:rPr lang="en-US" sz="1400" kern="1200" smtClean="0"/>
             <a:t>Latex </a:t>
           </a:r>
           <a:r>
-            <a:rPr lang="en-US" sz="1400" i="1" kern="1200" dirty="0" smtClean="0">
-              <a:solidFill>
-                <a:schemeClr val="accent4">
-                  <a:lumMod val="75000"/>
-                </a:schemeClr>
-              </a:solidFill>
+            <a:rPr lang="en-US" sz="1400" i="1" kern="1200" smtClean="0">
               <a:latin typeface="Consolas" panose="020B0609020204030204" pitchFamily="49" charset="0"/>
               <a:cs typeface="Consolas" panose="020B0609020204030204" pitchFamily="49" charset="0"/>
             </a:rPr>
@@ -9923,7 +10502,7 @@
           <a:p>
             <a:fld id="{3A560DDB-BEB9-48D2-8F04-7EAC6052052E}" type="datetimeFigureOut">
               <a:rPr lang="en-US" smtClean="0"/>
-              <a:t>7/8/2015</a:t>
+              <a:t>7/9/2015</a:t>
             </a:fld>
             <a:endParaRPr lang="en-US"/>
           </a:p>
@@ -10377,7 +10956,7 @@
           <a:p>
             <a:fld id="{ED57E8F0-C568-41E0-BE5A-51B4982C6A0E}" type="datetimeFigureOut">
               <a:rPr lang="en-US" smtClean="0"/>
-              <a:t>7/8/2015</a:t>
+              <a:t>7/9/2015</a:t>
             </a:fld>
             <a:endParaRPr lang="en-US"/>
           </a:p>
@@ -10652,7 +11231,7 @@
           <a:p>
             <a:fld id="{ED57E8F0-C568-41E0-BE5A-51B4982C6A0E}" type="datetimeFigureOut">
               <a:rPr lang="en-US" smtClean="0"/>
-              <a:t>7/8/2015</a:t>
+              <a:t>7/9/2015</a:t>
             </a:fld>
             <a:endParaRPr lang="en-US"/>
           </a:p>
@@ -10846,7 +11425,7 @@
           <a:p>
             <a:fld id="{ED57E8F0-C568-41E0-BE5A-51B4982C6A0E}" type="datetimeFigureOut">
               <a:rPr lang="en-US" smtClean="0"/>
-              <a:t>7/8/2015</a:t>
+              <a:t>7/9/2015</a:t>
             </a:fld>
             <a:endParaRPr lang="en-US"/>
           </a:p>
@@ -11119,7 +11698,7 @@
           <a:p>
             <a:fld id="{ED57E8F0-C568-41E0-BE5A-51B4982C6A0E}" type="datetimeFigureOut">
               <a:rPr lang="en-US" smtClean="0"/>
-              <a:t>7/8/2015</a:t>
+              <a:t>7/9/2015</a:t>
             </a:fld>
             <a:endParaRPr lang="en-US"/>
           </a:p>
@@ -11460,7 +12039,7 @@
           <a:p>
             <a:fld id="{ED57E8F0-C568-41E0-BE5A-51B4982C6A0E}" type="datetimeFigureOut">
               <a:rPr lang="en-US" smtClean="0"/>
-              <a:t>7/8/2015</a:t>
+              <a:t>7/9/2015</a:t>
             </a:fld>
             <a:endParaRPr lang="en-US"/>
           </a:p>
@@ -12083,7 +12662,7 @@
           <a:p>
             <a:fld id="{ED57E8F0-C568-41E0-BE5A-51B4982C6A0E}" type="datetimeFigureOut">
               <a:rPr lang="en-US" smtClean="0"/>
-              <a:t>7/8/2015</a:t>
+              <a:t>7/9/2015</a:t>
             </a:fld>
             <a:endParaRPr lang="en-US"/>
           </a:p>
@@ -12943,7 +13522,7 @@
           <a:p>
             <a:fld id="{ED57E8F0-C568-41E0-BE5A-51B4982C6A0E}" type="datetimeFigureOut">
               <a:rPr lang="en-US" smtClean="0"/>
-              <a:t>7/8/2015</a:t>
+              <a:t>7/9/2015</a:t>
             </a:fld>
             <a:endParaRPr lang="en-US"/>
           </a:p>
@@ -13113,7 +13692,7 @@
           <a:p>
             <a:fld id="{ED57E8F0-C568-41E0-BE5A-51B4982C6A0E}" type="datetimeFigureOut">
               <a:rPr lang="en-US" smtClean="0"/>
-              <a:t>7/8/2015</a:t>
+              <a:t>7/9/2015</a:t>
             </a:fld>
             <a:endParaRPr lang="en-US"/>
           </a:p>
@@ -13293,7 +13872,7 @@
           <a:p>
             <a:fld id="{ED57E8F0-C568-41E0-BE5A-51B4982C6A0E}" type="datetimeFigureOut">
               <a:rPr lang="en-US" smtClean="0"/>
-              <a:t>7/8/2015</a:t>
+              <a:t>7/9/2015</a:t>
             </a:fld>
             <a:endParaRPr lang="en-US"/>
           </a:p>
@@ -13463,7 +14042,7 @@
           <a:p>
             <a:fld id="{ED57E8F0-C568-41E0-BE5A-51B4982C6A0E}" type="datetimeFigureOut">
               <a:rPr lang="en-US" smtClean="0"/>
-              <a:t>7/8/2015</a:t>
+              <a:t>7/9/2015</a:t>
             </a:fld>
             <a:endParaRPr lang="en-US"/>
           </a:p>
@@ -13710,7 +14289,7 @@
           <a:p>
             <a:fld id="{ED57E8F0-C568-41E0-BE5A-51B4982C6A0E}" type="datetimeFigureOut">
               <a:rPr lang="en-US" smtClean="0"/>
-              <a:t>7/8/2015</a:t>
+              <a:t>7/9/2015</a:t>
             </a:fld>
             <a:endParaRPr lang="en-US"/>
           </a:p>
@@ -14002,7 +14581,7 @@
           <a:p>
             <a:fld id="{ED57E8F0-C568-41E0-BE5A-51B4982C6A0E}" type="datetimeFigureOut">
               <a:rPr lang="en-US" smtClean="0"/>
-              <a:t>7/8/2015</a:t>
+              <a:t>7/9/2015</a:t>
             </a:fld>
             <a:endParaRPr lang="en-US"/>
           </a:p>
@@ -14446,7 +15025,7 @@
           <a:p>
             <a:fld id="{ED57E8F0-C568-41E0-BE5A-51B4982C6A0E}" type="datetimeFigureOut">
               <a:rPr lang="en-US" smtClean="0"/>
-              <a:t>7/8/2015</a:t>
+              <a:t>7/9/2015</a:t>
             </a:fld>
             <a:endParaRPr lang="en-US"/>
           </a:p>
@@ -14564,7 +15143,7 @@
           <a:p>
             <a:fld id="{ED57E8F0-C568-41E0-BE5A-51B4982C6A0E}" type="datetimeFigureOut">
               <a:rPr lang="en-US" smtClean="0"/>
-              <a:t>7/8/2015</a:t>
+              <a:t>7/9/2015</a:t>
             </a:fld>
             <a:endParaRPr lang="en-US"/>
           </a:p>
@@ -14659,7 +15238,7 @@
           <a:p>
             <a:fld id="{ED57E8F0-C568-41E0-BE5A-51B4982C6A0E}" type="datetimeFigureOut">
               <a:rPr lang="en-US" smtClean="0"/>
-              <a:t>7/8/2015</a:t>
+              <a:t>7/9/2015</a:t>
             </a:fld>
             <a:endParaRPr lang="en-US"/>
           </a:p>
@@ -14938,7 +15517,7 @@
           <a:p>
             <a:fld id="{ED57E8F0-C568-41E0-BE5A-51B4982C6A0E}" type="datetimeFigureOut">
               <a:rPr lang="en-US" smtClean="0"/>
-              <a:t>7/8/2015</a:t>
+              <a:t>7/9/2015</a:t>
             </a:fld>
             <a:endParaRPr lang="en-US"/>
           </a:p>
@@ -15213,7 +15792,7 @@
           <a:p>
             <a:fld id="{ED57E8F0-C568-41E0-BE5A-51B4982C6A0E}" type="datetimeFigureOut">
               <a:rPr lang="en-US" smtClean="0"/>
-              <a:t>7/8/2015</a:t>
+              <a:t>7/9/2015</a:t>
             </a:fld>
             <a:endParaRPr lang="en-US"/>
           </a:p>
@@ -15642,7 +16221,7 @@
           <a:p>
             <a:fld id="{ED57E8F0-C568-41E0-BE5A-51B4982C6A0E}" type="datetimeFigureOut">
               <a:rPr lang="en-US" smtClean="0"/>
-              <a:t>7/8/2015</a:t>
+              <a:t>7/9/2015</a:t>
             </a:fld>
             <a:endParaRPr lang="en-US"/>
           </a:p>
@@ -16218,11 +16797,7 @@
           <a:p>
             <a:r>
               <a:rPr lang="en-US" dirty="0" smtClean="0"/>
-              <a:t>Joint work with Klaus </a:t>
-            </a:r>
-            <a:r>
-              <a:rPr lang="en-US" dirty="0" smtClean="0"/>
-              <a:t>Havelund, </a:t>
+              <a:t>Joint work with Klaus Havelund, </a:t>
             </a:r>
             <a:r>
               <a:rPr lang="en-US" dirty="0" err="1" smtClean="0"/>
@@ -16849,19 +17424,17 @@
           </a:prstGeom>
         </p:spPr>
         <p:style>
-          <a:lnRef idx="2">
-            <a:schemeClr val="accent1">
-              <a:shade val="50000"/>
-            </a:schemeClr>
+          <a:lnRef idx="1">
+            <a:schemeClr val="accent1"/>
           </a:lnRef>
-          <a:fillRef idx="1">
+          <a:fillRef idx="2">
             <a:schemeClr val="accent1"/>
           </a:fillRef>
-          <a:effectRef idx="0">
+          <a:effectRef idx="1">
             <a:schemeClr val="accent1"/>
           </a:effectRef>
           <a:fontRef idx="minor">
-            <a:schemeClr val="lt1"/>
+            <a:schemeClr val="dk1"/>
           </a:fontRef>
         </p:style>
         <p:txBody>
@@ -16897,19 +17470,17 @@
           </a:prstGeom>
         </p:spPr>
         <p:style>
-          <a:lnRef idx="2">
-            <a:schemeClr val="accent1">
-              <a:shade val="50000"/>
-            </a:schemeClr>
+          <a:lnRef idx="1">
+            <a:schemeClr val="accent1"/>
           </a:lnRef>
-          <a:fillRef idx="1">
+          <a:fillRef idx="2">
             <a:schemeClr val="accent1"/>
           </a:fillRef>
-          <a:effectRef idx="0">
+          <a:effectRef idx="1">
             <a:schemeClr val="accent1"/>
           </a:effectRef>
           <a:fontRef idx="minor">
-            <a:schemeClr val="lt1"/>
+            <a:schemeClr val="dk1"/>
           </a:fontRef>
         </p:style>
         <p:txBody>
@@ -16945,19 +17516,17 @@
           </a:prstGeom>
         </p:spPr>
         <p:style>
-          <a:lnRef idx="2">
-            <a:schemeClr val="accent1">
-              <a:shade val="50000"/>
-            </a:schemeClr>
+          <a:lnRef idx="1">
+            <a:schemeClr val="accent1"/>
           </a:lnRef>
-          <a:fillRef idx="1">
+          <a:fillRef idx="2">
             <a:schemeClr val="accent1"/>
           </a:fillRef>
-          <a:effectRef idx="0">
+          <a:effectRef idx="1">
             <a:schemeClr val="accent1"/>
           </a:effectRef>
           <a:fontRef idx="minor">
-            <a:schemeClr val="lt1"/>
+            <a:schemeClr val="dk1"/>
           </a:fontRef>
         </p:style>
         <p:txBody>
@@ -17224,7 +17793,7 @@
           <p:nvPr>
             <p:extLst>
               <p:ext uri="{D42A27DB-BD31-4B8C-83A1-F6EECF244321}">
-                <p14:modId xmlns:p14="http://schemas.microsoft.com/office/powerpoint/2010/main" val="261924037"/>
+                <p14:modId xmlns:p14="http://schemas.microsoft.com/office/powerpoint/2010/main" val="2908306680"/>
               </p:ext>
             </p:extLst>
           </p:nvPr>
@@ -18184,13 +18753,13 @@
           </a:prstGeom>
         </p:spPr>
         <p:style>
-          <a:lnRef idx="0">
+          <a:lnRef idx="1">
             <a:schemeClr val="accent1"/>
           </a:lnRef>
           <a:fillRef idx="3">
             <a:schemeClr val="accent1"/>
           </a:fillRef>
-          <a:effectRef idx="3">
+          <a:effectRef idx="2">
             <a:schemeClr val="accent1"/>
           </a:effectRef>
           <a:fontRef idx="minor">
@@ -23909,23 +24478,7 @@
           <a:p>
             <a:r>
               <a:rPr lang="en-US" dirty="0" smtClean="0"/>
-              <a:t>Strengthen i</a:t>
-            </a:r>
-            <a:r>
-              <a:rPr lang="en-US" dirty="0" smtClean="0"/>
-              <a:t>ntegrating </a:t>
-            </a:r>
-            <a:r>
-              <a:rPr lang="en-US" dirty="0" smtClean="0"/>
-              <a:t>with the </a:t>
-            </a:r>
-            <a:r>
-              <a:rPr lang="en-US" dirty="0" smtClean="0"/>
-              <a:t>MD and </a:t>
-            </a:r>
-            <a:r>
-              <a:rPr lang="en-US" dirty="0" smtClean="0"/>
-              <a:t>MMS for Europa</a:t>
+              <a:t>Strengthen integrating with the MD and MMS for Europa</a:t>
             </a:r>
           </a:p>
           <a:p>
@@ -23935,11 +24488,7 @@
             </a:r>
             <a:r>
               <a:rPr lang="en-US" dirty="0" smtClean="0"/>
-              <a:t>erform </a:t>
-            </a:r>
-            <a:r>
-              <a:rPr lang="en-US" dirty="0" smtClean="0"/>
-              <a:t>analysis on Europa models using our K infrastructure</a:t>
+              <a:t>erform analysis on Europa models using our K infrastructure</a:t>
             </a:r>
           </a:p>
           <a:p>
@@ -23949,15 +24498,7 @@
             </a:r>
             <a:r>
               <a:rPr lang="en-US" dirty="0" smtClean="0"/>
-              <a:t>evelop </a:t>
-            </a:r>
-            <a:r>
-              <a:rPr lang="en-US" dirty="0" smtClean="0"/>
-              <a:t>domain specific </a:t>
-            </a:r>
-            <a:r>
-              <a:rPr lang="en-US" dirty="0" smtClean="0"/>
-              <a:t>libraries</a:t>
+              <a:t>evelop domain specific libraries</a:t>
             </a:r>
           </a:p>
           <a:p>
@@ -23965,7 +24506,6 @@
               <a:rPr lang="en-US" dirty="0" smtClean="0"/>
               <a:t>Integration with external tools such as Mathematica etc.</a:t>
             </a:r>
-            <a:endParaRPr lang="en-US" dirty="0" smtClean="0"/>
           </a:p>
           <a:p>
             <a:r>
@@ -24130,7 +24670,7 @@
         <p:spPr>
           <a:xfrm>
             <a:off x="3477334" y="3244334"/>
-            <a:ext cx="5237331" cy="369332"/>
+            <a:ext cx="5153975" cy="369332"/>
           </a:xfrm>
           <a:prstGeom prst="rect">
             <a:avLst/>
@@ -24143,7 +24683,7 @@
           <a:lstStyle/>
           <a:p>
             <a:r>
-              <a:rPr lang="en-US" b="1" dirty="0">
+              <a:rPr lang="en-US" b="1" dirty="0" smtClean="0">
                 <a:ln w="0"/>
                 <a:solidFill>
                   <a:schemeClr val="accent1"/>
@@ -24156,7 +24696,7 @@
                   </a:outerShdw>
                 </a:effectLst>
               </a:rPr>
-              <a:t>Thank you for your time and attention!</a:t>
+              <a:t>Thank you for your time and patience!</a:t>
             </a:r>
             <a:endParaRPr lang="en-US" b="1" dirty="0">
               <a:ln w="0"/>
@@ -24348,15 +24888,15 @@
         </p:spPr>
         <p:style>
           <a:lnRef idx="2">
-            <a:schemeClr val="accent1">
+            <a:schemeClr val="accent6">
               <a:shade val="50000"/>
             </a:schemeClr>
           </a:lnRef>
           <a:fillRef idx="1">
-            <a:schemeClr val="accent1"/>
+            <a:schemeClr val="accent6"/>
           </a:fillRef>
           <a:effectRef idx="0">
-            <a:schemeClr val="accent1"/>
+            <a:schemeClr val="accent6"/>
           </a:effectRef>
           <a:fontRef idx="minor">
             <a:schemeClr val="lt1"/>
@@ -24562,6 +25102,60 @@
       </p:sp>
       <p:sp>
         <p:nvSpPr>
+          <p:cNvPr id="6" name="Content Placeholder 2"/>
+          <p:cNvSpPr>
+            <a:spLocks noGrp="1"/>
+          </p:cNvSpPr>
+          <p:nvPr>
+            <p:ph idx="1"/>
+          </p:nvPr>
+        </p:nvSpPr>
+        <p:spPr>
+          <a:xfrm>
+            <a:off x="727392" y="1850195"/>
+            <a:ext cx="8946541" cy="4195481"/>
+          </a:xfrm>
+        </p:spPr>
+        <p:txBody>
+          <a:bodyPr>
+            <a:normAutofit/>
+          </a:bodyPr>
+          <a:lstStyle/>
+          <a:p>
+            <a:r>
+              <a:rPr lang="en-US" dirty="0" smtClean="0"/>
+              <a:t>Create models</a:t>
+            </a:r>
+          </a:p>
+          <a:p>
+            <a:r>
+              <a:rPr lang="en-US" dirty="0" smtClean="0"/>
+              <a:t>Analyze for correctness</a:t>
+            </a:r>
+          </a:p>
+          <a:p>
+            <a:r>
+              <a:rPr lang="en-US" dirty="0" smtClean="0"/>
+              <a:t>Discover problems at each level</a:t>
+            </a:r>
+          </a:p>
+          <a:p>
+            <a:r>
+              <a:rPr lang="en-US" dirty="0" smtClean="0"/>
+              <a:t>Eventually produce implementations</a:t>
+            </a:r>
+          </a:p>
+          <a:p>
+            <a:r>
+              <a:rPr lang="en-US" dirty="0" smtClean="0"/>
+              <a:t>Rinse and repeat…</a:t>
+            </a:r>
+            <a:endParaRPr lang="en-US" dirty="0"/>
+          </a:p>
+        </p:txBody>
+      </p:sp>
+      <p:sp>
+        <p:nvSpPr>
           <p:cNvPr id="4" name="Rectangle 3"/>
           <p:cNvSpPr/>
           <p:nvPr/>
@@ -24700,60 +25294,6 @@
           </a:fontRef>
         </p:style>
       </p:cxnSp>
-      <p:sp>
-        <p:nvSpPr>
-          <p:cNvPr id="6" name="Content Placeholder 2"/>
-          <p:cNvSpPr>
-            <a:spLocks noGrp="1"/>
-          </p:cNvSpPr>
-          <p:nvPr>
-            <p:ph idx="1"/>
-          </p:nvPr>
-        </p:nvSpPr>
-        <p:spPr>
-          <a:xfrm>
-            <a:off x="727392" y="1850195"/>
-            <a:ext cx="8946541" cy="4195481"/>
-          </a:xfrm>
-        </p:spPr>
-        <p:txBody>
-          <a:bodyPr>
-            <a:normAutofit/>
-          </a:bodyPr>
-          <a:lstStyle/>
-          <a:p>
-            <a:r>
-              <a:rPr lang="en-US" dirty="0" smtClean="0"/>
-              <a:t>Create models</a:t>
-            </a:r>
-          </a:p>
-          <a:p>
-            <a:r>
-              <a:rPr lang="en-US" dirty="0" smtClean="0"/>
-              <a:t>Analyze for correctness</a:t>
-            </a:r>
-          </a:p>
-          <a:p>
-            <a:r>
-              <a:rPr lang="en-US" dirty="0" smtClean="0"/>
-              <a:t>Discover problems at each level</a:t>
-            </a:r>
-          </a:p>
-          <a:p>
-            <a:r>
-              <a:rPr lang="en-US" dirty="0" smtClean="0"/>
-              <a:t>Eventually produce implementations</a:t>
-            </a:r>
-          </a:p>
-          <a:p>
-            <a:r>
-              <a:rPr lang="en-US" dirty="0" smtClean="0"/>
-              <a:t>Rinse and repeat…</a:t>
-            </a:r>
-            <a:endParaRPr lang="en-US" dirty="0"/>
-          </a:p>
-        </p:txBody>
-      </p:sp>
     </p:spTree>
     <p:extLst>
       <p:ext uri="{BB962C8B-B14F-4D97-AF65-F5344CB8AC3E}">
@@ -25187,11 +25727,7 @@
           <a:p>
             <a:r>
               <a:rPr lang="en-US" dirty="0" smtClean="0"/>
-              <a:t>MBE </a:t>
-            </a:r>
-            <a:r>
-              <a:rPr lang="en-US" dirty="0" smtClean="0"/>
-              <a:t>refers to this as a “relation”</a:t>
+              <a:t>MBE refers to this as a “relation”</a:t>
             </a:r>
           </a:p>
           <a:p>
@@ -25245,8 +25781,8 @@
           </a:p>
         </p:txBody>
       </p:sp>
-      <mc:AlternateContent xmlns:mc="http://schemas.openxmlformats.org/markup-compatibility/2006">
-        <mc:Choice xmlns:a14="http://schemas.microsoft.com/office/drawing/2010/main" Requires="a14">
+      <mc:AlternateContent xmlns:mc="http://schemas.openxmlformats.org/markup-compatibility/2006" xmlns:a14="http://schemas.microsoft.com/office/drawing/2010/main">
+        <mc:Choice Requires="a14">
           <p:sp>
             <p:nvSpPr>
               <p:cNvPr id="3" name="TextBox 2"/>
@@ -25269,6 +25805,7 @@
               </a:bodyPr>
               <a:lstStyle/>
               <a:p>
+                <a:pPr/>
                 <a14:m>
                   <m:oMathPara xmlns:m="http://schemas.openxmlformats.org/officeDocument/2006/math">
                     <m:oMathParaPr>
@@ -25385,7 +25922,7 @@
             </p:txBody>
           </p:sp>
         </mc:Choice>
-        <mc:Fallback>
+        <mc:Fallback xmlns="">
           <p:sp>
             <p:nvSpPr>
               <p:cNvPr id="3" name="TextBox 2"/>
@@ -26183,8 +26720,8 @@
           </a:p>
         </p:txBody>
       </p:sp>
-      <mc:AlternateContent xmlns:mc="http://schemas.openxmlformats.org/markup-compatibility/2006">
-        <mc:Choice xmlns:a14="http://schemas.microsoft.com/office/drawing/2010/main" Requires="a14">
+      <mc:AlternateContent xmlns:mc="http://schemas.openxmlformats.org/markup-compatibility/2006" xmlns:a14="http://schemas.microsoft.com/office/drawing/2010/main">
+        <mc:Choice Requires="a14">
           <p:sp>
             <p:nvSpPr>
               <p:cNvPr id="16" name="TextBox 15"/>
@@ -26207,6 +26744,7 @@
               </a:bodyPr>
               <a:lstStyle/>
               <a:p>
+                <a:pPr/>
                 <a14:m>
                   <m:oMathPara xmlns:m="http://schemas.openxmlformats.org/officeDocument/2006/math">
                     <m:oMathParaPr>
@@ -26251,7 +26789,7 @@
             </p:txBody>
           </p:sp>
         </mc:Choice>
-        <mc:Fallback>
+        <mc:Fallback xmlns="">
           <p:sp>
             <p:nvSpPr>
               <p:cNvPr id="16" name="TextBox 15"/>
@@ -26290,8 +26828,8 @@
           </p:sp>
         </mc:Fallback>
       </mc:AlternateContent>
-      <mc:AlternateContent xmlns:mc="http://schemas.openxmlformats.org/markup-compatibility/2006">
-        <mc:Choice xmlns:a14="http://schemas.microsoft.com/office/drawing/2010/main" Requires="a14">
+      <mc:AlternateContent xmlns:mc="http://schemas.openxmlformats.org/markup-compatibility/2006" xmlns:a14="http://schemas.microsoft.com/office/drawing/2010/main">
+        <mc:Choice Requires="a14">
           <p:sp>
             <p:nvSpPr>
               <p:cNvPr id="17" name="TextBox 16"/>
@@ -26314,6 +26852,7 @@
               </a:bodyPr>
               <a:lstStyle/>
               <a:p>
+                <a:pPr/>
                 <a14:m>
                   <m:oMathPara xmlns:m="http://schemas.openxmlformats.org/officeDocument/2006/math">
                     <m:oMathParaPr>
@@ -26395,7 +26934,7 @@
             </p:txBody>
           </p:sp>
         </mc:Choice>
-        <mc:Fallback>
+        <mc:Fallback xmlns="">
           <p:sp>
             <p:nvSpPr>
               <p:cNvPr id="17" name="TextBox 16"/>
@@ -26434,8 +26973,8 @@
           </p:sp>
         </mc:Fallback>
       </mc:AlternateContent>
-      <mc:AlternateContent xmlns:mc="http://schemas.openxmlformats.org/markup-compatibility/2006">
-        <mc:Choice xmlns:a14="http://schemas.microsoft.com/office/drawing/2010/main" Requires="a14">
+      <mc:AlternateContent xmlns:mc="http://schemas.openxmlformats.org/markup-compatibility/2006" xmlns:a14="http://schemas.microsoft.com/office/drawing/2010/main">
+        <mc:Choice Requires="a14">
           <p:sp>
             <p:nvSpPr>
               <p:cNvPr id="18" name="TextBox 17"/>
@@ -26458,6 +26997,7 @@
               </a:bodyPr>
               <a:lstStyle/>
               <a:p>
+                <a:pPr/>
                 <a14:m>
                   <m:oMathPara xmlns:m="http://schemas.openxmlformats.org/officeDocument/2006/math">
                     <m:oMathParaPr>
@@ -26521,7 +27061,7 @@
             </p:txBody>
           </p:sp>
         </mc:Choice>
-        <mc:Fallback>
+        <mc:Fallback xmlns="">
           <p:sp>
             <p:nvSpPr>
               <p:cNvPr id="18" name="TextBox 17"/>
@@ -26560,8 +27100,8 @@
           </p:sp>
         </mc:Fallback>
       </mc:AlternateContent>
-      <mc:AlternateContent xmlns:mc="http://schemas.openxmlformats.org/markup-compatibility/2006">
-        <mc:Choice xmlns:a14="http://schemas.microsoft.com/office/drawing/2010/main" Requires="a14">
+      <mc:AlternateContent xmlns:mc="http://schemas.openxmlformats.org/markup-compatibility/2006" xmlns:a14="http://schemas.microsoft.com/office/drawing/2010/main">
+        <mc:Choice Requires="a14">
           <p:sp>
             <p:nvSpPr>
               <p:cNvPr id="19" name="TextBox 18"/>
@@ -26584,6 +27124,7 @@
               </a:bodyPr>
               <a:lstStyle/>
               <a:p>
+                <a:pPr/>
                 <a14:m>
                   <m:oMathPara xmlns:m="http://schemas.openxmlformats.org/officeDocument/2006/math">
                     <m:oMathParaPr>
@@ -26787,7 +27328,7 @@
             </p:txBody>
           </p:sp>
         </mc:Choice>
-        <mc:Fallback>
+        <mc:Fallback xmlns="">
           <p:sp>
             <p:nvSpPr>
               <p:cNvPr id="19" name="TextBox 18"/>
@@ -26826,8 +27367,8 @@
           </p:sp>
         </mc:Fallback>
       </mc:AlternateContent>
-      <mc:AlternateContent xmlns:mc="http://schemas.openxmlformats.org/markup-compatibility/2006">
-        <mc:Choice xmlns:a14="http://schemas.microsoft.com/office/drawing/2010/main" Requires="a14">
+      <mc:AlternateContent xmlns:mc="http://schemas.openxmlformats.org/markup-compatibility/2006" xmlns:a14="http://schemas.microsoft.com/office/drawing/2010/main">
+        <mc:Choice Requires="a14">
           <p:sp>
             <p:nvSpPr>
               <p:cNvPr id="20" name="TextBox 19"/>
@@ -26850,6 +27391,7 @@
               </a:bodyPr>
               <a:lstStyle/>
               <a:p>
+                <a:pPr/>
                 <a14:m>
                   <m:oMathPara xmlns:m="http://schemas.openxmlformats.org/officeDocument/2006/math">
                     <m:oMathParaPr>
@@ -26894,7 +27436,7 @@
             </p:txBody>
           </p:sp>
         </mc:Choice>
-        <mc:Fallback>
+        <mc:Fallback xmlns="">
           <p:sp>
             <p:nvSpPr>
               <p:cNvPr id="20" name="TextBox 19"/>
@@ -26933,8 +27475,8 @@
           </p:sp>
         </mc:Fallback>
       </mc:AlternateContent>
-      <mc:AlternateContent xmlns:mc="http://schemas.openxmlformats.org/markup-compatibility/2006">
-        <mc:Choice xmlns:a14="http://schemas.microsoft.com/office/drawing/2010/main" Requires="a14">
+      <mc:AlternateContent xmlns:mc="http://schemas.openxmlformats.org/markup-compatibility/2006" xmlns:a14="http://schemas.microsoft.com/office/drawing/2010/main">
+        <mc:Choice Requires="a14">
           <p:sp>
             <p:nvSpPr>
               <p:cNvPr id="21" name="TextBox 20"/>
@@ -26957,6 +27499,7 @@
               </a:bodyPr>
               <a:lstStyle/>
               <a:p>
+                <a:pPr/>
                 <a14:m>
                   <m:oMathPara xmlns:m="http://schemas.openxmlformats.org/officeDocument/2006/math">
                     <m:oMathParaPr>
@@ -27116,7 +27659,7 @@
             </p:txBody>
           </p:sp>
         </mc:Choice>
-        <mc:Fallback>
+        <mc:Fallback xmlns="">
           <p:sp>
             <p:nvSpPr>
               <p:cNvPr id="21" name="TextBox 20"/>
@@ -27155,8 +27698,8 @@
           </p:sp>
         </mc:Fallback>
       </mc:AlternateContent>
-      <mc:AlternateContent xmlns:mc="http://schemas.openxmlformats.org/markup-compatibility/2006">
-        <mc:Choice xmlns:a14="http://schemas.microsoft.com/office/drawing/2010/main" Requires="a14">
+      <mc:AlternateContent xmlns:mc="http://schemas.openxmlformats.org/markup-compatibility/2006" xmlns:a14="http://schemas.microsoft.com/office/drawing/2010/main">
+        <mc:Choice Requires="a14">
           <p:sp>
             <p:nvSpPr>
               <p:cNvPr id="22" name="TextBox 21"/>
@@ -27179,6 +27722,7 @@
               </a:bodyPr>
               <a:lstStyle/>
               <a:p>
+                <a:pPr/>
                 <a14:m>
                   <m:oMathPara xmlns:m="http://schemas.openxmlformats.org/officeDocument/2006/math">
                     <m:oMathParaPr>
@@ -27393,7 +27937,7 @@
             </p:txBody>
           </p:sp>
         </mc:Choice>
-        <mc:Fallback>
+        <mc:Fallback xmlns="">
           <p:sp>
             <p:nvSpPr>
               <p:cNvPr id="22" name="TextBox 21"/>
@@ -27638,7 +28182,7 @@
 <file path=ppt/theme/theme1.xml><?xml version="1.0" encoding="utf-8"?>
 <a:theme xmlns:a="http://schemas.openxmlformats.org/drawingml/2006/main" name="Ion">
   <a:themeElements>
-    <a:clrScheme name="Aspect">
+    <a:clrScheme name="Custom 1">
       <a:dk1>
         <a:sysClr val="windowText" lastClr="000000"/>
       </a:dk1>
@@ -27652,7 +28196,7 @@
         <a:srgbClr val="E3DED1"/>
       </a:lt2>
       <a:accent1>
-        <a:srgbClr val="F07F09"/>
+        <a:srgbClr val="FFFF00"/>
       </a:accent1>
       <a:accent2>
         <a:srgbClr val="9F2936"/>

</xml_diff>

<commit_message>
fomac paper changes, minor changes to presentation
</commit_message>
<xml_diff>
--- a/presentations/K.pptx
+++ b/presentations/K.pptx
@@ -5,7 +5,7 @@
     <p:sldMasterId id="2147483744" r:id="rId1"/>
   </p:sldMasterIdLst>
   <p:notesMasterIdLst>
-    <p:notesMasterId r:id="rId28"/>
+    <p:notesMasterId r:id="rId29"/>
   </p:notesMasterIdLst>
   <p:sldIdLst>
     <p:sldId id="266" r:id="rId2"/>
@@ -32,8 +32,9 @@
     <p:sldId id="275" r:id="rId23"/>
     <p:sldId id="276" r:id="rId24"/>
     <p:sldId id="277" r:id="rId25"/>
-    <p:sldId id="287" r:id="rId26"/>
-    <p:sldId id="283" r:id="rId27"/>
+    <p:sldId id="289" r:id="rId26"/>
+    <p:sldId id="287" r:id="rId27"/>
+    <p:sldId id="283" r:id="rId28"/>
   </p:sldIdLst>
   <p:sldSz cx="12192000" cy="6858000"/>
   <p:notesSz cx="6858000" cy="9144000"/>
@@ -24191,6 +24192,561 @@
           <a:p>
             <a:r>
               <a:rPr lang="en-US" dirty="0" smtClean="0"/>
+              <a:t>Single Artifact</a:t>
+            </a:r>
+            <a:endParaRPr lang="en-US" dirty="0"/>
+          </a:p>
+        </p:txBody>
+      </p:sp>
+      <p:sp>
+        <p:nvSpPr>
+          <p:cNvPr id="4" name="Flowchart: Document 3"/>
+          <p:cNvSpPr/>
+          <p:nvPr/>
+        </p:nvSpPr>
+        <p:spPr>
+          <a:xfrm>
+            <a:off x="768096" y="3235484"/>
+            <a:ext cx="1362456" cy="1417320"/>
+          </a:xfrm>
+          <a:prstGeom prst="flowChartDocument">
+            <a:avLst/>
+          </a:prstGeom>
+        </p:spPr>
+        <p:style>
+          <a:lnRef idx="2">
+            <a:schemeClr val="accent1">
+              <a:shade val="50000"/>
+            </a:schemeClr>
+          </a:lnRef>
+          <a:fillRef idx="1">
+            <a:schemeClr val="accent1"/>
+          </a:fillRef>
+          <a:effectRef idx="0">
+            <a:schemeClr val="accent1"/>
+          </a:effectRef>
+          <a:fontRef idx="minor">
+            <a:schemeClr val="lt1"/>
+          </a:fontRef>
+        </p:style>
+        <p:txBody>
+          <a:bodyPr rtlCol="0" anchor="ctr"/>
+          <a:lstStyle/>
+          <a:p>
+            <a:pPr algn="ctr"/>
+            <a:r>
+              <a:rPr lang="en-US" b="1" dirty="0" smtClean="0">
+                <a:solidFill>
+                  <a:schemeClr val="bg1"/>
+                </a:solidFill>
+                <a:latin typeface="+mj-lt"/>
+              </a:rPr>
+              <a:t>K Model</a:t>
+            </a:r>
+            <a:endParaRPr lang="en-US" b="1" dirty="0">
+              <a:solidFill>
+                <a:schemeClr val="bg1"/>
+              </a:solidFill>
+              <a:latin typeface="+mj-lt"/>
+            </a:endParaRPr>
+          </a:p>
+        </p:txBody>
+      </p:sp>
+      <p:sp>
+        <p:nvSpPr>
+          <p:cNvPr id="6" name="Flowchart: Multidocument 5"/>
+          <p:cNvSpPr/>
+          <p:nvPr/>
+        </p:nvSpPr>
+        <p:spPr>
+          <a:xfrm>
+            <a:off x="3617976" y="1484408"/>
+            <a:ext cx="2176272" cy="1228376"/>
+          </a:xfrm>
+          <a:prstGeom prst="flowChartMultidocument">
+            <a:avLst/>
+          </a:prstGeom>
+        </p:spPr>
+        <p:style>
+          <a:lnRef idx="1">
+            <a:schemeClr val="accent2"/>
+          </a:lnRef>
+          <a:fillRef idx="2">
+            <a:schemeClr val="accent2"/>
+          </a:fillRef>
+          <a:effectRef idx="1">
+            <a:schemeClr val="accent2"/>
+          </a:effectRef>
+          <a:fontRef idx="minor">
+            <a:schemeClr val="dk1"/>
+          </a:fontRef>
+        </p:style>
+        <p:txBody>
+          <a:bodyPr rtlCol="0" anchor="ctr"/>
+          <a:lstStyle/>
+          <a:p>
+            <a:pPr algn="ctr"/>
+            <a:r>
+              <a:rPr lang="en-US" b="1" dirty="0" smtClean="0">
+                <a:solidFill>
+                  <a:schemeClr val="bg1"/>
+                </a:solidFill>
+                <a:latin typeface="+mj-lt"/>
+              </a:rPr>
+              <a:t>Documentation</a:t>
+            </a:r>
+            <a:endParaRPr lang="en-US" b="1" dirty="0">
+              <a:solidFill>
+                <a:schemeClr val="bg1"/>
+              </a:solidFill>
+              <a:latin typeface="+mj-lt"/>
+            </a:endParaRPr>
+          </a:p>
+        </p:txBody>
+      </p:sp>
+      <p:sp>
+        <p:nvSpPr>
+          <p:cNvPr id="7" name="Flowchart: Decision 6"/>
+          <p:cNvSpPr/>
+          <p:nvPr/>
+        </p:nvSpPr>
+        <p:spPr>
+          <a:xfrm>
+            <a:off x="3430432" y="2840752"/>
+            <a:ext cx="2505456" cy="1316736"/>
+          </a:xfrm>
+          <a:prstGeom prst="flowChartDecision">
+            <a:avLst/>
+          </a:prstGeom>
+        </p:spPr>
+        <p:style>
+          <a:lnRef idx="1">
+            <a:schemeClr val="accent2"/>
+          </a:lnRef>
+          <a:fillRef idx="2">
+            <a:schemeClr val="accent2"/>
+          </a:fillRef>
+          <a:effectRef idx="1">
+            <a:schemeClr val="accent2"/>
+          </a:effectRef>
+          <a:fontRef idx="minor">
+            <a:schemeClr val="dk1"/>
+          </a:fontRef>
+        </p:style>
+        <p:txBody>
+          <a:bodyPr rtlCol="0" anchor="ctr"/>
+          <a:lstStyle/>
+          <a:p>
+            <a:pPr algn="ctr"/>
+            <a:r>
+              <a:rPr lang="en-US" b="1" dirty="0" smtClean="0">
+                <a:solidFill>
+                  <a:schemeClr val="bg1"/>
+                </a:solidFill>
+                <a:latin typeface="+mj-lt"/>
+              </a:rPr>
+              <a:t>Analysis/Solving</a:t>
+            </a:r>
+            <a:endParaRPr lang="en-US" b="1" dirty="0">
+              <a:solidFill>
+                <a:schemeClr val="bg1"/>
+              </a:solidFill>
+              <a:latin typeface="+mj-lt"/>
+            </a:endParaRPr>
+          </a:p>
+        </p:txBody>
+      </p:sp>
+      <p:sp>
+        <p:nvSpPr>
+          <p:cNvPr id="8" name="Flowchart: Process 7"/>
+          <p:cNvSpPr/>
+          <p:nvPr/>
+        </p:nvSpPr>
+        <p:spPr>
+          <a:xfrm>
+            <a:off x="3850872" y="4357140"/>
+            <a:ext cx="1539240" cy="736092"/>
+          </a:xfrm>
+          <a:prstGeom prst="flowChartProcess">
+            <a:avLst/>
+          </a:prstGeom>
+        </p:spPr>
+        <p:style>
+          <a:lnRef idx="1">
+            <a:schemeClr val="accent2"/>
+          </a:lnRef>
+          <a:fillRef idx="2">
+            <a:schemeClr val="accent2"/>
+          </a:fillRef>
+          <a:effectRef idx="1">
+            <a:schemeClr val="accent2"/>
+          </a:effectRef>
+          <a:fontRef idx="minor">
+            <a:schemeClr val="dk1"/>
+          </a:fontRef>
+        </p:style>
+        <p:txBody>
+          <a:bodyPr rtlCol="0" anchor="ctr"/>
+          <a:lstStyle/>
+          <a:p>
+            <a:pPr algn="ctr"/>
+            <a:r>
+              <a:rPr lang="en-US" b="1" dirty="0" smtClean="0">
+                <a:solidFill>
+                  <a:schemeClr val="bg1"/>
+                </a:solidFill>
+                <a:latin typeface="+mj-lt"/>
+              </a:rPr>
+              <a:t>Execution</a:t>
+            </a:r>
+            <a:endParaRPr lang="en-US" b="1" dirty="0">
+              <a:solidFill>
+                <a:schemeClr val="bg1"/>
+              </a:solidFill>
+              <a:latin typeface="+mj-lt"/>
+            </a:endParaRPr>
+          </a:p>
+        </p:txBody>
+      </p:sp>
+      <p:cxnSp>
+        <p:nvCxnSpPr>
+          <p:cNvPr id="10" name="Straight Arrow Connector 9"/>
+          <p:cNvCxnSpPr>
+            <a:stCxn id="4" idx="3"/>
+            <a:endCxn id="6" idx="1"/>
+          </p:cNvCxnSpPr>
+          <p:nvPr/>
+        </p:nvCxnSpPr>
+        <p:spPr>
+          <a:xfrm flipV="1">
+            <a:off x="2130552" y="2098596"/>
+            <a:ext cx="1487424" cy="1845548"/>
+          </a:xfrm>
+          <a:prstGeom prst="straightConnector1">
+            <a:avLst/>
+          </a:prstGeom>
+          <a:ln>
+            <a:tailEnd type="triangle"/>
+          </a:ln>
+        </p:spPr>
+        <p:style>
+          <a:lnRef idx="3">
+            <a:schemeClr val="accent1"/>
+          </a:lnRef>
+          <a:fillRef idx="0">
+            <a:schemeClr val="accent1"/>
+          </a:fillRef>
+          <a:effectRef idx="2">
+            <a:schemeClr val="accent1"/>
+          </a:effectRef>
+          <a:fontRef idx="minor">
+            <a:schemeClr val="tx1"/>
+          </a:fontRef>
+        </p:style>
+      </p:cxnSp>
+      <p:cxnSp>
+        <p:nvCxnSpPr>
+          <p:cNvPr id="11" name="Straight Arrow Connector 10"/>
+          <p:cNvCxnSpPr>
+            <a:stCxn id="4" idx="3"/>
+            <a:endCxn id="7" idx="1"/>
+          </p:cNvCxnSpPr>
+          <p:nvPr/>
+        </p:nvCxnSpPr>
+        <p:spPr>
+          <a:xfrm flipV="1">
+            <a:off x="2130552" y="3499120"/>
+            <a:ext cx="1299880" cy="445024"/>
+          </a:xfrm>
+          <a:prstGeom prst="straightConnector1">
+            <a:avLst/>
+          </a:prstGeom>
+          <a:ln>
+            <a:tailEnd type="triangle"/>
+          </a:ln>
+        </p:spPr>
+        <p:style>
+          <a:lnRef idx="3">
+            <a:schemeClr val="accent1"/>
+          </a:lnRef>
+          <a:fillRef idx="0">
+            <a:schemeClr val="accent1"/>
+          </a:fillRef>
+          <a:effectRef idx="2">
+            <a:schemeClr val="accent1"/>
+          </a:effectRef>
+          <a:fontRef idx="minor">
+            <a:schemeClr val="tx1"/>
+          </a:fontRef>
+        </p:style>
+      </p:cxnSp>
+      <p:cxnSp>
+        <p:nvCxnSpPr>
+          <p:cNvPr id="14" name="Straight Arrow Connector 13"/>
+          <p:cNvCxnSpPr>
+            <a:stCxn id="4" idx="3"/>
+            <a:endCxn id="8" idx="1"/>
+          </p:cNvCxnSpPr>
+          <p:nvPr/>
+        </p:nvCxnSpPr>
+        <p:spPr>
+          <a:xfrm>
+            <a:off x="2130552" y="3944144"/>
+            <a:ext cx="1720320" cy="781042"/>
+          </a:xfrm>
+          <a:prstGeom prst="straightConnector1">
+            <a:avLst/>
+          </a:prstGeom>
+          <a:ln>
+            <a:tailEnd type="triangle"/>
+          </a:ln>
+        </p:spPr>
+        <p:style>
+          <a:lnRef idx="3">
+            <a:schemeClr val="accent1"/>
+          </a:lnRef>
+          <a:fillRef idx="0">
+            <a:schemeClr val="accent1"/>
+          </a:fillRef>
+          <a:effectRef idx="2">
+            <a:schemeClr val="accent1"/>
+          </a:effectRef>
+          <a:fontRef idx="minor">
+            <a:schemeClr val="tx1"/>
+          </a:fontRef>
+        </p:style>
+      </p:cxnSp>
+      <p:sp>
+        <p:nvSpPr>
+          <p:cNvPr id="17" name="Content Placeholder 2"/>
+          <p:cNvSpPr>
+            <a:spLocks noGrp="1"/>
+          </p:cNvSpPr>
+          <p:nvPr>
+            <p:ph idx="1"/>
+          </p:nvPr>
+        </p:nvSpPr>
+        <p:spPr>
+          <a:xfrm>
+            <a:off x="6214688" y="2640799"/>
+            <a:ext cx="5352472" cy="3127625"/>
+          </a:xfrm>
+        </p:spPr>
+        <p:txBody>
+          <a:bodyPr>
+            <a:normAutofit/>
+          </a:bodyPr>
+          <a:lstStyle/>
+          <a:p>
+            <a:r>
+              <a:rPr lang="en-US" dirty="0" smtClean="0"/>
+              <a:t>Produce a single artifact…</a:t>
+            </a:r>
+            <a:endParaRPr lang="en-US" dirty="0" smtClean="0"/>
+          </a:p>
+          <a:p>
+            <a:r>
+              <a:rPr lang="en-US" dirty="0" smtClean="0"/>
+              <a:t>K provides infrastructure and automation for the rest</a:t>
+            </a:r>
+            <a:endParaRPr lang="en-US" dirty="0" smtClean="0"/>
+          </a:p>
+          <a:p>
+            <a:r>
+              <a:rPr lang="en-US" dirty="0" smtClean="0"/>
+              <a:t>The common language for all tasks.</a:t>
+            </a:r>
+            <a:endParaRPr lang="en-US" dirty="0" smtClean="0"/>
+          </a:p>
+          <a:p>
+            <a:endParaRPr lang="en-US" dirty="0" smtClean="0"/>
+          </a:p>
+          <a:p>
+            <a:endParaRPr lang="en-US" dirty="0" smtClean="0"/>
+          </a:p>
+          <a:p>
+            <a:pPr marL="0" indent="0">
+              <a:buNone/>
+            </a:pPr>
+            <a:endParaRPr lang="en-US" dirty="0" smtClean="0"/>
+          </a:p>
+        </p:txBody>
+      </p:sp>
+      <p:sp>
+        <p:nvSpPr>
+          <p:cNvPr id="20" name="Flowchart: Decision 19"/>
+          <p:cNvSpPr/>
+          <p:nvPr/>
+        </p:nvSpPr>
+        <p:spPr>
+          <a:xfrm>
+            <a:off x="3430432" y="5260880"/>
+            <a:ext cx="2389816" cy="804672"/>
+          </a:xfrm>
+          <a:prstGeom prst="flowChartDecision">
+            <a:avLst/>
+          </a:prstGeom>
+        </p:spPr>
+        <p:style>
+          <a:lnRef idx="1">
+            <a:schemeClr val="accent2"/>
+          </a:lnRef>
+          <a:fillRef idx="2">
+            <a:schemeClr val="accent2"/>
+          </a:fillRef>
+          <a:effectRef idx="1">
+            <a:schemeClr val="accent2"/>
+          </a:effectRef>
+          <a:fontRef idx="minor">
+            <a:schemeClr val="dk1"/>
+          </a:fontRef>
+        </p:style>
+        <p:txBody>
+          <a:bodyPr rtlCol="0" anchor="ctr"/>
+          <a:lstStyle/>
+          <a:p>
+            <a:pPr algn="ctr"/>
+            <a:r>
+              <a:rPr lang="en-US" b="1" dirty="0" smtClean="0">
+                <a:solidFill>
+                  <a:schemeClr val="bg1"/>
+                </a:solidFill>
+                <a:latin typeface="+mj-lt"/>
+              </a:rPr>
+              <a:t>Querying</a:t>
+            </a:r>
+            <a:endParaRPr lang="en-US" b="1" dirty="0">
+              <a:solidFill>
+                <a:schemeClr val="bg1"/>
+              </a:solidFill>
+              <a:latin typeface="+mj-lt"/>
+            </a:endParaRPr>
+          </a:p>
+        </p:txBody>
+      </p:sp>
+      <p:cxnSp>
+        <p:nvCxnSpPr>
+          <p:cNvPr id="21" name="Straight Arrow Connector 20"/>
+          <p:cNvCxnSpPr>
+            <a:stCxn id="4" idx="3"/>
+            <a:endCxn id="20" idx="1"/>
+          </p:cNvCxnSpPr>
+          <p:nvPr/>
+        </p:nvCxnSpPr>
+        <p:spPr>
+          <a:xfrm>
+            <a:off x="2130552" y="3944144"/>
+            <a:ext cx="1299880" cy="1719072"/>
+          </a:xfrm>
+          <a:prstGeom prst="straightConnector1">
+            <a:avLst/>
+          </a:prstGeom>
+          <a:ln>
+            <a:tailEnd type="triangle"/>
+          </a:ln>
+        </p:spPr>
+        <p:style>
+          <a:lnRef idx="3">
+            <a:schemeClr val="accent1"/>
+          </a:lnRef>
+          <a:fillRef idx="0">
+            <a:schemeClr val="accent1"/>
+          </a:fillRef>
+          <a:effectRef idx="2">
+            <a:schemeClr val="accent1"/>
+          </a:effectRef>
+          <a:fontRef idx="minor">
+            <a:schemeClr val="tx1"/>
+          </a:fontRef>
+        </p:style>
+      </p:cxnSp>
+      <p:cxnSp>
+        <p:nvCxnSpPr>
+          <p:cNvPr id="30" name="Straight Connector 29"/>
+          <p:cNvCxnSpPr/>
+          <p:nvPr/>
+        </p:nvCxnSpPr>
+        <p:spPr>
+          <a:xfrm>
+            <a:off x="4616044" y="6320068"/>
+            <a:ext cx="4448" cy="429768"/>
+          </a:xfrm>
+          <a:prstGeom prst="line">
+            <a:avLst/>
+          </a:prstGeom>
+          <a:ln>
+            <a:prstDash val="sysDash"/>
+          </a:ln>
+        </p:spPr>
+        <p:style>
+          <a:lnRef idx="3">
+            <a:schemeClr val="accent1"/>
+          </a:lnRef>
+          <a:fillRef idx="0">
+            <a:schemeClr val="accent1"/>
+          </a:fillRef>
+          <a:effectRef idx="2">
+            <a:schemeClr val="accent1"/>
+          </a:effectRef>
+          <a:fontRef idx="minor">
+            <a:schemeClr val="tx1"/>
+          </a:fontRef>
+        </p:style>
+      </p:cxnSp>
+    </p:spTree>
+    <p:extLst>
+      <p:ext uri="{BB962C8B-B14F-4D97-AF65-F5344CB8AC3E}">
+        <p14:creationId xmlns:p14="http://schemas.microsoft.com/office/powerpoint/2010/main" val="2800770764"/>
+      </p:ext>
+    </p:extLst>
+  </p:cSld>
+  <p:clrMapOvr>
+    <a:masterClrMapping/>
+  </p:clrMapOvr>
+  <p:timing>
+    <p:tnLst>
+      <p:par>
+        <p:cTn id="1" dur="indefinite" restart="never" nodeType="tmRoot"/>
+      </p:par>
+    </p:tnLst>
+  </p:timing>
+</p:sld>
+</file>
+
+<file path=ppt/slides/slide26.xml><?xml version="1.0" encoding="utf-8"?>
+<p:sld xmlns:a="http://schemas.openxmlformats.org/drawingml/2006/main" xmlns:r="http://schemas.openxmlformats.org/officeDocument/2006/relationships" xmlns:p="http://schemas.openxmlformats.org/presentationml/2006/main">
+  <p:cSld>
+    <p:spTree>
+      <p:nvGrpSpPr>
+        <p:cNvPr id="1" name=""/>
+        <p:cNvGrpSpPr/>
+        <p:nvPr/>
+      </p:nvGrpSpPr>
+      <p:grpSpPr>
+        <a:xfrm>
+          <a:off x="0" y="0"/>
+          <a:ext cx="0" cy="0"/>
+          <a:chOff x="0" y="0"/>
+          <a:chExt cx="0" cy="0"/>
+        </a:xfrm>
+      </p:grpSpPr>
+      <p:sp>
+        <p:nvSpPr>
+          <p:cNvPr id="2" name="Title 1"/>
+          <p:cNvSpPr>
+            <a:spLocks noGrp="1"/>
+          </p:cNvSpPr>
+          <p:nvPr>
+            <p:ph type="title"/>
+          </p:nvPr>
+        </p:nvSpPr>
+        <p:spPr/>
+        <p:txBody>
+          <a:bodyPr/>
+          <a:lstStyle/>
+          <a:p>
+            <a:r>
+              <a:rPr lang="en-US" dirty="0" smtClean="0"/>
               <a:t>Further…</a:t>
             </a:r>
             <a:endParaRPr lang="en-US" dirty="0"/>
@@ -24621,7 +25177,7 @@
 </p:sld>
 </file>
 
-<file path=ppt/slides/slide26.xml><?xml version="1.0" encoding="utf-8"?>
+<file path=ppt/slides/slide27.xml><?xml version="1.0" encoding="utf-8"?>
 <p:sld xmlns:a="http://schemas.openxmlformats.org/drawingml/2006/main" xmlns:r="http://schemas.openxmlformats.org/officeDocument/2006/relationships" xmlns:p="http://schemas.openxmlformats.org/presentationml/2006/main">
   <p:cSld>
     <p:spTree>
@@ -25367,7 +25923,7 @@
         <p:spPr/>
         <p:txBody>
           <a:bodyPr>
-            <a:normAutofit fontScale="92500" lnSpcReduction="10000"/>
+            <a:normAutofit/>
           </a:bodyPr>
           <a:lstStyle/>
           <a:p>
@@ -25432,13 +25988,11 @@
           <a:p>
             <a:r>
               <a:rPr lang="en-US" dirty="0" smtClean="0"/>
-              <a:t>Extensible keyword set</a:t>
-            </a:r>
-          </a:p>
-          <a:p>
+              <a:t>Collections </a:t>
+            </a:r>
             <a:r>
               <a:rPr lang="en-US" dirty="0" smtClean="0"/>
-              <a:t>Collections (</a:t>
+              <a:t>(</a:t>
             </a:r>
             <a:r>
               <a:rPr lang="en-US" dirty="0" err="1" smtClean="0"/>
@@ -25557,22 +26111,9 @@
           <a:p>
             <a:r>
               <a:rPr lang="en-US" dirty="0" smtClean="0"/>
-              <a:t>Extensible using </a:t>
-            </a:r>
-          </a:p>
-          <a:p>
-            <a:pPr lvl="1"/>
-            <a:r>
-              <a:rPr lang="en-US" dirty="0" smtClean="0"/>
-              <a:t>Keyword extension </a:t>
-            </a:r>
-          </a:p>
-          <a:p>
-            <a:pPr lvl="1"/>
-            <a:r>
-              <a:rPr lang="en-US" dirty="0" smtClean="0"/>
-              <a:t>Libraries</a:t>
-            </a:r>
+              <a:t>Extensible </a:t>
+            </a:r>
+            <a:endParaRPr lang="en-US" dirty="0" smtClean="0"/>
           </a:p>
           <a:p>
             <a:r>
@@ -26128,7 +26669,7 @@
               <a:rPr lang="en-US" sz="1600" dirty="0" smtClean="0">
                 <a:latin typeface="+mj-lt"/>
               </a:rPr>
-              <a:t>Spacecraft</a:t>
+              <a:t>Instrument</a:t>
             </a:r>
             <a:endParaRPr lang="en-US" sz="1600" dirty="0">
               <a:latin typeface="+mj-lt"/>
@@ -26553,7 +27094,7 @@
               <a:rPr lang="en-US" sz="1600" dirty="0" smtClean="0">
                 <a:latin typeface="+mj-lt"/>
               </a:rPr>
-              <a:t>Spacecraft</a:t>
+              <a:t>Instrument</a:t>
             </a:r>
             <a:endParaRPr lang="en-US" sz="1600" dirty="0">
               <a:latin typeface="+mj-lt"/>

</xml_diff>

<commit_message>
wrote text to prepost condition example
</commit_message>
<xml_diff>
--- a/presentations/K.pptx
+++ b/presentations/K.pptx
@@ -135,7 +135,7 @@
   </p:defaultTextStyle>
   <p:extLst>
     <p:ext uri="{EFAFB233-063F-42B5-8137-9DF3F51BA10A}">
-      <p15:sldGuideLst xmlns:p15="http://schemas.microsoft.com/office/powerpoint/2012/main">
+      <p15:sldGuideLst xmlns:p15="http://schemas.microsoft.com/office/powerpoint/2012/main" xmlns="">
         <p15:guide id="1" orient="horz" pos="2160" userDrawn="1">
           <p15:clr>
             <a:srgbClr val="A4A3A4"/>
@@ -10503,7 +10503,7 @@
           <a:p>
             <a:fld id="{3A560DDB-BEB9-48D2-8F04-7EAC6052052E}" type="datetimeFigureOut">
               <a:rPr lang="en-US" smtClean="0"/>
-              <a:t>7/9/2015</a:t>
+              <a:t>7/22/15</a:t>
             </a:fld>
             <a:endParaRPr lang="en-US"/>
           </a:p>
@@ -10957,7 +10957,7 @@
           <a:p>
             <a:fld id="{ED57E8F0-C568-41E0-BE5A-51B4982C6A0E}" type="datetimeFigureOut">
               <a:rPr lang="en-US" smtClean="0"/>
-              <a:t>7/9/2015</a:t>
+              <a:t>7/22/15</a:t>
             </a:fld>
             <a:endParaRPr lang="en-US"/>
           </a:p>
@@ -11232,7 +11232,7 @@
           <a:p>
             <a:fld id="{ED57E8F0-C568-41E0-BE5A-51B4982C6A0E}" type="datetimeFigureOut">
               <a:rPr lang="en-US" smtClean="0"/>
-              <a:t>7/9/2015</a:t>
+              <a:t>7/22/15</a:t>
             </a:fld>
             <a:endParaRPr lang="en-US"/>
           </a:p>
@@ -11426,7 +11426,7 @@
           <a:p>
             <a:fld id="{ED57E8F0-C568-41E0-BE5A-51B4982C6A0E}" type="datetimeFigureOut">
               <a:rPr lang="en-US" smtClean="0"/>
-              <a:t>7/9/2015</a:t>
+              <a:t>7/22/15</a:t>
             </a:fld>
             <a:endParaRPr lang="en-US"/>
           </a:p>
@@ -11699,7 +11699,7 @@
           <a:p>
             <a:fld id="{ED57E8F0-C568-41E0-BE5A-51B4982C6A0E}" type="datetimeFigureOut">
               <a:rPr lang="en-US" smtClean="0"/>
-              <a:t>7/9/2015</a:t>
+              <a:t>7/22/15</a:t>
             </a:fld>
             <a:endParaRPr lang="en-US"/>
           </a:p>
@@ -12040,7 +12040,7 @@
           <a:p>
             <a:fld id="{ED57E8F0-C568-41E0-BE5A-51B4982C6A0E}" type="datetimeFigureOut">
               <a:rPr lang="en-US" smtClean="0"/>
-              <a:t>7/9/2015</a:t>
+              <a:t>7/22/15</a:t>
             </a:fld>
             <a:endParaRPr lang="en-US"/>
           </a:p>
@@ -12663,7 +12663,7 @@
           <a:p>
             <a:fld id="{ED57E8F0-C568-41E0-BE5A-51B4982C6A0E}" type="datetimeFigureOut">
               <a:rPr lang="en-US" smtClean="0"/>
-              <a:t>7/9/2015</a:t>
+              <a:t>7/22/15</a:t>
             </a:fld>
             <a:endParaRPr lang="en-US"/>
           </a:p>
@@ -13523,7 +13523,7 @@
           <a:p>
             <a:fld id="{ED57E8F0-C568-41E0-BE5A-51B4982C6A0E}" type="datetimeFigureOut">
               <a:rPr lang="en-US" smtClean="0"/>
-              <a:t>7/9/2015</a:t>
+              <a:t>7/22/15</a:t>
             </a:fld>
             <a:endParaRPr lang="en-US"/>
           </a:p>
@@ -13693,7 +13693,7 @@
           <a:p>
             <a:fld id="{ED57E8F0-C568-41E0-BE5A-51B4982C6A0E}" type="datetimeFigureOut">
               <a:rPr lang="en-US" smtClean="0"/>
-              <a:t>7/9/2015</a:t>
+              <a:t>7/22/15</a:t>
             </a:fld>
             <a:endParaRPr lang="en-US"/>
           </a:p>
@@ -13873,7 +13873,7 @@
           <a:p>
             <a:fld id="{ED57E8F0-C568-41E0-BE5A-51B4982C6A0E}" type="datetimeFigureOut">
               <a:rPr lang="en-US" smtClean="0"/>
-              <a:t>7/9/2015</a:t>
+              <a:t>7/22/15</a:t>
             </a:fld>
             <a:endParaRPr lang="en-US"/>
           </a:p>
@@ -14043,7 +14043,7 @@
           <a:p>
             <a:fld id="{ED57E8F0-C568-41E0-BE5A-51B4982C6A0E}" type="datetimeFigureOut">
               <a:rPr lang="en-US" smtClean="0"/>
-              <a:t>7/9/2015</a:t>
+              <a:t>7/22/15</a:t>
             </a:fld>
             <a:endParaRPr lang="en-US"/>
           </a:p>
@@ -14290,7 +14290,7 @@
           <a:p>
             <a:fld id="{ED57E8F0-C568-41E0-BE5A-51B4982C6A0E}" type="datetimeFigureOut">
               <a:rPr lang="en-US" smtClean="0"/>
-              <a:t>7/9/2015</a:t>
+              <a:t>7/22/15</a:t>
             </a:fld>
             <a:endParaRPr lang="en-US"/>
           </a:p>
@@ -14582,7 +14582,7 @@
           <a:p>
             <a:fld id="{ED57E8F0-C568-41E0-BE5A-51B4982C6A0E}" type="datetimeFigureOut">
               <a:rPr lang="en-US" smtClean="0"/>
-              <a:t>7/9/2015</a:t>
+              <a:t>7/22/15</a:t>
             </a:fld>
             <a:endParaRPr lang="en-US"/>
           </a:p>
@@ -15026,7 +15026,7 @@
           <a:p>
             <a:fld id="{ED57E8F0-C568-41E0-BE5A-51B4982C6A0E}" type="datetimeFigureOut">
               <a:rPr lang="en-US" smtClean="0"/>
-              <a:t>7/9/2015</a:t>
+              <a:t>7/22/15</a:t>
             </a:fld>
             <a:endParaRPr lang="en-US"/>
           </a:p>
@@ -15144,7 +15144,7 @@
           <a:p>
             <a:fld id="{ED57E8F0-C568-41E0-BE5A-51B4982C6A0E}" type="datetimeFigureOut">
               <a:rPr lang="en-US" smtClean="0"/>
-              <a:t>7/9/2015</a:t>
+              <a:t>7/22/15</a:t>
             </a:fld>
             <a:endParaRPr lang="en-US"/>
           </a:p>
@@ -15239,7 +15239,7 @@
           <a:p>
             <a:fld id="{ED57E8F0-C568-41E0-BE5A-51B4982C6A0E}" type="datetimeFigureOut">
               <a:rPr lang="en-US" smtClean="0"/>
-              <a:t>7/9/2015</a:t>
+              <a:t>7/22/15</a:t>
             </a:fld>
             <a:endParaRPr lang="en-US"/>
           </a:p>
@@ -15518,7 +15518,7 @@
           <a:p>
             <a:fld id="{ED57E8F0-C568-41E0-BE5A-51B4982C6A0E}" type="datetimeFigureOut">
               <a:rPr lang="en-US" smtClean="0"/>
-              <a:t>7/9/2015</a:t>
+              <a:t>7/22/15</a:t>
             </a:fld>
             <a:endParaRPr lang="en-US"/>
           </a:p>
@@ -15793,7 +15793,7 @@
           <a:p>
             <a:fld id="{ED57E8F0-C568-41E0-BE5A-51B4982C6A0E}" type="datetimeFigureOut">
               <a:rPr lang="en-US" smtClean="0"/>
-              <a:t>7/9/2015</a:t>
+              <a:t>7/22/15</a:t>
             </a:fld>
             <a:endParaRPr lang="en-US"/>
           </a:p>
@@ -16222,7 +16222,7 @@
           <a:p>
             <a:fld id="{ED57E8F0-C568-41E0-BE5A-51B4982C6A0E}" type="datetimeFigureOut">
               <a:rPr lang="en-US" smtClean="0"/>
-              <a:t>7/9/2015</a:t>
+              <a:t>7/22/15</a:t>
             </a:fld>
             <a:endParaRPr lang="en-US"/>
           </a:p>
@@ -16833,7 +16833,7 @@
   <p:timing>
     <p:tnLst>
       <p:par>
-        <p:cTn id="1" dur="indefinite" restart="never" nodeType="tmRoot"/>
+        <p:cTn xmlns:p14="http://schemas.microsoft.com/office/powerpoint/2010/main" id="1" dur="indefinite" restart="never" nodeType="tmRoot"/>
       </p:par>
     </p:tnLst>
   </p:timing>
@@ -17140,7 +17140,7 @@
   <p:timing>
     <p:tnLst>
       <p:par>
-        <p:cTn id="1" dur="indefinite" restart="never" nodeType="tmRoot"/>
+        <p:cTn xmlns:p14="http://schemas.microsoft.com/office/powerpoint/2010/main" id="1" dur="indefinite" restart="never" nodeType="tmRoot"/>
       </p:par>
     </p:tnLst>
   </p:timing>
@@ -17632,7 +17632,7 @@
   <p:timing>
     <p:tnLst>
       <p:par>
-        <p:cTn id="1" dur="indefinite" restart="never" nodeType="tmRoot"/>
+        <p:cTn xmlns:p14="http://schemas.microsoft.com/office/powerpoint/2010/main" id="1" dur="indefinite" restart="never" nodeType="tmRoot"/>
       </p:par>
     </p:tnLst>
   </p:timing>
@@ -17740,7 +17740,7 @@
   <p:timing>
     <p:tnLst>
       <p:par>
-        <p:cTn id="1" dur="indefinite" restart="never" nodeType="tmRoot"/>
+        <p:cTn xmlns:p14="http://schemas.microsoft.com/office/powerpoint/2010/main" id="1" dur="indefinite" restart="never" nodeType="tmRoot"/>
       </p:par>
     </p:tnLst>
   </p:timing>
@@ -17822,7 +17822,7 @@
   <p:timing>
     <p:tnLst>
       <p:par>
-        <p:cTn id="1" dur="indefinite" restart="never" nodeType="tmRoot"/>
+        <p:cTn xmlns:p14="http://schemas.microsoft.com/office/powerpoint/2010/main" id="1" dur="indefinite" restart="never" nodeType="tmRoot"/>
       </p:par>
     </p:tnLst>
   </p:timing>
@@ -17901,7 +17901,7 @@
   <p:timing>
     <p:tnLst>
       <p:par>
-        <p:cTn id="1" dur="indefinite" restart="never" nodeType="tmRoot"/>
+        <p:cTn xmlns:p14="http://schemas.microsoft.com/office/powerpoint/2010/main" id="1" dur="indefinite" restart="never" nodeType="tmRoot"/>
       </p:par>
     </p:tnLst>
   </p:timing>
@@ -17991,7 +17991,7 @@
   <p:timing>
     <p:tnLst>
       <p:par>
-        <p:cTn id="1" dur="indefinite" restart="never" nodeType="tmRoot"/>
+        <p:cTn xmlns:p14="http://schemas.microsoft.com/office/powerpoint/2010/main" id="1" dur="indefinite" restart="never" nodeType="tmRoot"/>
       </p:par>
     </p:tnLst>
   </p:timing>
@@ -18223,7 +18223,7 @@
   <p:timing>
     <p:tnLst>
       <p:par>
-        <p:cTn id="1" dur="indefinite" restart="never" nodeType="tmRoot"/>
+        <p:cTn xmlns:p14="http://schemas.microsoft.com/office/powerpoint/2010/main" id="1" dur="indefinite" restart="never" nodeType="tmRoot"/>
       </p:par>
     </p:tnLst>
   </p:timing>
@@ -18457,7 +18457,7 @@
   <p:timing>
     <p:tnLst>
       <p:par>
-        <p:cTn id="1" dur="indefinite" restart="never" nodeType="tmRoot"/>
+        <p:cTn xmlns:p14="http://schemas.microsoft.com/office/powerpoint/2010/main" id="1" dur="indefinite" restart="never" nodeType="tmRoot"/>
       </p:par>
     </p:tnLst>
   </p:timing>
@@ -18691,7 +18691,7 @@
   <p:timing>
     <p:tnLst>
       <p:par>
-        <p:cTn id="1" dur="indefinite" restart="never" nodeType="tmRoot"/>
+        <p:cTn xmlns:p14="http://schemas.microsoft.com/office/powerpoint/2010/main" id="1" dur="indefinite" restart="never" nodeType="tmRoot"/>
       </p:par>
     </p:tnLst>
   </p:timing>
@@ -19103,7 +19103,7 @@
   <p:timing>
     <p:tnLst>
       <p:par>
-        <p:cTn id="1" dur="indefinite" restart="never" nodeType="tmRoot"/>
+        <p:cTn xmlns:p14="http://schemas.microsoft.com/office/powerpoint/2010/main" id="1" dur="indefinite" restart="never" nodeType="tmRoot"/>
       </p:par>
     </p:tnLst>
   </p:timing>
@@ -19956,7 +19956,7 @@
   <p:timing>
     <p:tnLst>
       <p:par>
-        <p:cTn id="1" dur="indefinite" restart="never" nodeType="tmRoot"/>
+        <p:cTn xmlns:p14="http://schemas.microsoft.com/office/powerpoint/2010/main" id="1" dur="indefinite" restart="never" nodeType="tmRoot"/>
       </p:par>
     </p:tnLst>
   </p:timing>
@@ -20417,7 +20417,7 @@
   <p:timing>
     <p:tnLst>
       <p:par>
-        <p:cTn id="1" dur="indefinite" restart="never" nodeType="tmRoot"/>
+        <p:cTn xmlns:p14="http://schemas.microsoft.com/office/powerpoint/2010/main" id="1" dur="indefinite" restart="never" nodeType="tmRoot"/>
       </p:par>
     </p:tnLst>
   </p:timing>
@@ -21101,7 +21101,7 @@
   <p:timing>
     <p:tnLst>
       <p:par>
-        <p:cTn id="1" dur="indefinite" restart="never" nodeType="tmRoot"/>
+        <p:cTn xmlns:p14="http://schemas.microsoft.com/office/powerpoint/2010/main" id="1" dur="indefinite" restart="never" nodeType="tmRoot"/>
       </p:par>
     </p:tnLst>
   </p:timing>
@@ -22025,7 +22025,7 @@
   <p:timing>
     <p:tnLst>
       <p:par>
-        <p:cTn id="1" dur="indefinite" restart="never" nodeType="tmRoot"/>
+        <p:cTn xmlns:p14="http://schemas.microsoft.com/office/powerpoint/2010/main" id="1" dur="indefinite" restart="never" nodeType="tmRoot"/>
       </p:par>
     </p:tnLst>
   </p:timing>
@@ -22959,7 +22959,7 @@
   <p:timing>
     <p:tnLst>
       <p:par>
-        <p:cTn id="1" dur="indefinite" restart="never" nodeType="tmRoot"/>
+        <p:cTn xmlns:p14="http://schemas.microsoft.com/office/powerpoint/2010/main" id="1" dur="indefinite" restart="never" nodeType="tmRoot"/>
       </p:par>
     </p:tnLst>
   </p:timing>
@@ -24151,7 +24151,7 @@
   <p:timing>
     <p:tnLst>
       <p:par>
-        <p:cTn id="1" dur="indefinite" restart="never" nodeType="tmRoot"/>
+        <p:cTn xmlns:p14="http://schemas.microsoft.com/office/powerpoint/2010/main" id="1" dur="indefinite" restart="never" nodeType="tmRoot"/>
       </p:par>
     </p:tnLst>
   </p:timing>
@@ -24542,21 +24542,18 @@
               <a:rPr lang="en-US" dirty="0" smtClean="0"/>
               <a:t>Produce a single artifact…</a:t>
             </a:r>
-            <a:endParaRPr lang="en-US" dirty="0" smtClean="0"/>
           </a:p>
           <a:p>
             <a:r>
               <a:rPr lang="en-US" dirty="0" smtClean="0"/>
               <a:t>K provides infrastructure and automation for the rest</a:t>
             </a:r>
-            <a:endParaRPr lang="en-US" dirty="0" smtClean="0"/>
           </a:p>
           <a:p>
             <a:r>
               <a:rPr lang="en-US" dirty="0" smtClean="0"/>
               <a:t>The common language for all tasks.</a:t>
             </a:r>
-            <a:endParaRPr lang="en-US" dirty="0" smtClean="0"/>
           </a:p>
           <a:p>
             <a:endParaRPr lang="en-US" dirty="0" smtClean="0"/>
@@ -24706,7 +24703,7 @@
   <p:timing>
     <p:tnLst>
       <p:par>
-        <p:cTn id="1" dur="indefinite" restart="never" nodeType="tmRoot"/>
+        <p:cTn xmlns:p14="http://schemas.microsoft.com/office/powerpoint/2010/main" id="1" dur="indefinite" restart="never" nodeType="tmRoot"/>
       </p:par>
     </p:tnLst>
   </p:timing>
@@ -25091,7 +25088,7 @@
   <p:timing>
     <p:tnLst>
       <p:par>
-        <p:cTn id="1" dur="indefinite" restart="never" nodeType="tmRoot">
+        <p:cTn xmlns:p14="http://schemas.microsoft.com/office/powerpoint/2010/main" id="1" dur="indefinite" restart="never" nodeType="tmRoot">
           <p:childTnLst>
             <p:seq concurrent="1" nextAc="seek">
               <p:cTn id="2" dur="indefinite" nodeType="mainSeq">
@@ -25283,7 +25280,7 @@
   <p:timing>
     <p:tnLst>
       <p:par>
-        <p:cTn id="1" dur="indefinite" restart="never" nodeType="tmRoot"/>
+        <p:cTn xmlns:p14="http://schemas.microsoft.com/office/powerpoint/2010/main" id="1" dur="indefinite" restart="never" nodeType="tmRoot"/>
       </p:par>
     </p:tnLst>
   </p:timing>
@@ -25484,7 +25481,7 @@
   <p:timing>
     <p:tnLst>
       <p:par>
-        <p:cTn id="1" dur="indefinite" restart="never" nodeType="tmRoot">
+        <p:cTn xmlns:p14="http://schemas.microsoft.com/office/powerpoint/2010/main" id="1" dur="indefinite" restart="never" nodeType="tmRoot">
           <p:childTnLst>
             <p:seq concurrent="1" nextAc="seek">
               <p:cTn id="2" dur="indefinite" nodeType="mainSeq">
@@ -25863,7 +25860,7 @@
   <p:timing>
     <p:tnLst>
       <p:par>
-        <p:cTn id="1" dur="indefinite" restart="never" nodeType="tmRoot"/>
+        <p:cTn xmlns:p14="http://schemas.microsoft.com/office/powerpoint/2010/main" id="1" dur="indefinite" restart="never" nodeType="tmRoot"/>
       </p:par>
     </p:tnLst>
   </p:timing>
@@ -25988,11 +25985,7 @@
           <a:p>
             <a:r>
               <a:rPr lang="en-US" dirty="0" smtClean="0"/>
-              <a:t>Collections </a:t>
-            </a:r>
-            <a:r>
-              <a:rPr lang="en-US" dirty="0" smtClean="0"/>
-              <a:t>(</a:t>
+              <a:t>Collections (</a:t>
             </a:r>
             <a:r>
               <a:rPr lang="en-US" dirty="0" err="1" smtClean="0"/>
@@ -26021,7 +26014,7 @@
   <p:timing>
     <p:tnLst>
       <p:par>
-        <p:cTn id="1" dur="indefinite" restart="never" nodeType="tmRoot"/>
+        <p:cTn xmlns:p14="http://schemas.microsoft.com/office/powerpoint/2010/main" id="1" dur="indefinite" restart="never" nodeType="tmRoot"/>
       </p:par>
     </p:tnLst>
   </p:timing>
@@ -26113,7 +26106,6 @@
               <a:rPr lang="en-US" dirty="0" smtClean="0"/>
               <a:t>Extensible </a:t>
             </a:r>
-            <a:endParaRPr lang="en-US" dirty="0" smtClean="0"/>
           </a:p>
           <a:p>
             <a:r>
@@ -26151,7 +26143,7 @@
   <p:timing>
     <p:tnLst>
       <p:par>
-        <p:cTn id="1" dur="indefinite" restart="never" nodeType="tmRoot"/>
+        <p:cTn xmlns:p14="http://schemas.microsoft.com/office/powerpoint/2010/main" id="1" dur="indefinite" restart="never" nodeType="tmRoot"/>
       </p:par>
     </p:tnLst>
   </p:timing>
@@ -26346,9 +26338,8 @@
               </a:bodyPr>
               <a:lstStyle/>
               <a:p>
-                <a:pPr/>
                 <a14:m>
-                  <m:oMathPara xmlns:m="http://schemas.openxmlformats.org/officeDocument/2006/math">
+                  <m:oMathPara xmlns:m="http://schemas.openxmlformats.org/officeDocument/2006/math" xmlns="">
                     <m:oMathParaPr>
                       <m:jc m:val="centerGroup"/>
                     </m:oMathParaPr>
@@ -26849,7 +26840,7 @@
   <p:timing>
     <p:tnLst>
       <p:par>
-        <p:cTn id="1" dur="indefinite" restart="never" nodeType="tmRoot"/>
+        <p:cTn xmlns:p14="http://schemas.microsoft.com/office/powerpoint/2010/main" id="1" dur="indefinite" restart="never" nodeType="tmRoot"/>
       </p:par>
     </p:tnLst>
   </p:timing>
@@ -27285,9 +27276,8 @@
               </a:bodyPr>
               <a:lstStyle/>
               <a:p>
-                <a:pPr/>
                 <a14:m>
-                  <m:oMathPara xmlns:m="http://schemas.openxmlformats.org/officeDocument/2006/math">
+                  <m:oMathPara xmlns:m="http://schemas.openxmlformats.org/officeDocument/2006/math" xmlns="">
                     <m:oMathParaPr>
                       <m:jc m:val="centerGroup"/>
                     </m:oMathParaPr>
@@ -27393,9 +27383,8 @@
               </a:bodyPr>
               <a:lstStyle/>
               <a:p>
-                <a:pPr/>
                 <a14:m>
-                  <m:oMathPara xmlns:m="http://schemas.openxmlformats.org/officeDocument/2006/math">
+                  <m:oMathPara xmlns:m="http://schemas.openxmlformats.org/officeDocument/2006/math" xmlns="">
                     <m:oMathParaPr>
                       <m:jc m:val="centerGroup"/>
                     </m:oMathParaPr>
@@ -27538,9 +27527,8 @@
               </a:bodyPr>
               <a:lstStyle/>
               <a:p>
-                <a:pPr/>
                 <a14:m>
-                  <m:oMathPara xmlns:m="http://schemas.openxmlformats.org/officeDocument/2006/math">
+                  <m:oMathPara xmlns:m="http://schemas.openxmlformats.org/officeDocument/2006/math" xmlns="">
                     <m:oMathParaPr>
                       <m:jc m:val="centerGroup"/>
                     </m:oMathParaPr>
@@ -27665,9 +27653,8 @@
               </a:bodyPr>
               <a:lstStyle/>
               <a:p>
-                <a:pPr/>
                 <a14:m>
-                  <m:oMathPara xmlns:m="http://schemas.openxmlformats.org/officeDocument/2006/math">
+                  <m:oMathPara xmlns:m="http://schemas.openxmlformats.org/officeDocument/2006/math" xmlns="">
                     <m:oMathParaPr>
                       <m:jc m:val="centerGroup"/>
                     </m:oMathParaPr>
@@ -27932,9 +27919,8 @@
               </a:bodyPr>
               <a:lstStyle/>
               <a:p>
-                <a:pPr/>
                 <a14:m>
-                  <m:oMathPara xmlns:m="http://schemas.openxmlformats.org/officeDocument/2006/math">
+                  <m:oMathPara xmlns:m="http://schemas.openxmlformats.org/officeDocument/2006/math" xmlns="">
                     <m:oMathParaPr>
                       <m:jc m:val="centerGroup"/>
                     </m:oMathParaPr>
@@ -28040,9 +28026,8 @@
               </a:bodyPr>
               <a:lstStyle/>
               <a:p>
-                <a:pPr/>
                 <a14:m>
-                  <m:oMathPara xmlns:m="http://schemas.openxmlformats.org/officeDocument/2006/math">
+                  <m:oMathPara xmlns:m="http://schemas.openxmlformats.org/officeDocument/2006/math" xmlns="">
                     <m:oMathParaPr>
                       <m:jc m:val="centerGroup"/>
                     </m:oMathParaPr>
@@ -28263,9 +28248,8 @@
               </a:bodyPr>
               <a:lstStyle/>
               <a:p>
-                <a:pPr/>
                 <a14:m>
-                  <m:oMathPara xmlns:m="http://schemas.openxmlformats.org/officeDocument/2006/math">
+                  <m:oMathPara xmlns:m="http://schemas.openxmlformats.org/officeDocument/2006/math" xmlns="">
                     <m:oMathParaPr>
                       <m:jc m:val="centerGroup"/>
                     </m:oMathParaPr>
@@ -28530,7 +28514,7 @@
   <p:timing>
     <p:tnLst>
       <p:par>
-        <p:cTn id="1" dur="indefinite" restart="never" nodeType="tmRoot"/>
+        <p:cTn xmlns:p14="http://schemas.microsoft.com/office/powerpoint/2010/main" id="1" dur="indefinite" restart="never" nodeType="tmRoot"/>
       </p:par>
     </p:tnLst>
   </p:timing>
@@ -28713,7 +28697,7 @@
   <p:timing>
     <p:tnLst>
       <p:par>
-        <p:cTn id="1" dur="indefinite" restart="never" nodeType="tmRoot"/>
+        <p:cTn xmlns:p14="http://schemas.microsoft.com/office/powerpoint/2010/main" id="1" dur="indefinite" restart="never" nodeType="tmRoot"/>
       </p:par>
     </p:tnLst>
   </p:timing>
@@ -28763,7 +28747,7 @@
     </a:clrScheme>
     <a:fontScheme name="Consolas-Verdana">
       <a:majorFont>
-        <a:latin typeface="Consolas" panose="020B0609020204030204"/>
+        <a:latin typeface="Consolas"/>
         <a:ea typeface=""/>
         <a:cs typeface=""/>
         <a:font script="Jpan" typeface="HG丸ｺﾞｼｯｸM-PRO"/>
@@ -28798,7 +28782,7 @@
         <a:font script="Geor" typeface="Sylfaen"/>
       </a:majorFont>
       <a:minorFont>
-        <a:latin typeface="Verdana" panose="020B0604030504040204"/>
+        <a:latin typeface="Verdana"/>
         <a:ea typeface=""/>
         <a:cs typeface=""/>
         <a:font script="Jpan" typeface="ＭＳ ゴシック"/>
@@ -28980,7 +28964,7 @@
   <a:extraClrSchemeLst/>
   <a:extLst>
     <a:ext uri="{05A4C25C-085E-4340-85A3-A5531E510DB2}">
-      <thm15:themeFamily xmlns:thm15="http://schemas.microsoft.com/office/thememl/2012/main" name="Ion" id="{B8441ADB-2E43-4AF7-B97A-BD870242C6A8}" vid="{292E63A9-BB86-4E3D-B92A-7223C6510D2E}"/>
+      <thm15:themeFamily xmlns:thm15="http://schemas.microsoft.com/office/thememl/2012/main" xmlns="" name="Ion" id="{B8441ADB-2E43-4AF7-B97A-BD870242C6A8}" vid="{292E63A9-BB86-4E3D-B92A-7223C6510D2E}"/>
     </a:ext>
   </a:extLst>
 </a:theme>
@@ -29029,7 +29013,7 @@
     </a:clrScheme>
     <a:fontScheme name="Office">
       <a:majorFont>
-        <a:latin typeface="Calibri Light" panose="020F0302020204030204"/>
+        <a:latin typeface="Calibri Light"/>
         <a:ea typeface=""/>
         <a:cs typeface=""/>
         <a:font script="Jpan" typeface="ＭＳ Ｐゴシック"/>
@@ -29064,7 +29048,7 @@
         <a:font script="Geor" typeface="Sylfaen"/>
       </a:majorFont>
       <a:minorFont>
-        <a:latin typeface="Calibri" panose="020F0502020204030204"/>
+        <a:latin typeface="Calibri"/>
         <a:ea typeface=""/>
         <a:cs typeface=""/>
         <a:font script="Jpan" typeface="ＭＳ Ｐゴシック"/>
@@ -29241,7 +29225,7 @@
   <a:extraClrSchemeLst/>
   <a:extLst>
     <a:ext uri="{05A4C25C-085E-4340-85A3-A5531E510DB2}">
-      <thm15:themeFamily xmlns:thm15="http://schemas.microsoft.com/office/thememl/2012/main" name="Office Theme" id="{62F939B6-93AF-4DB8-9C6B-D6C7DFDC589F}" vid="{4A3C46E8-61CC-4603-A589-7422A47A8E4A}"/>
+      <thm15:themeFamily xmlns:thm15="http://schemas.microsoft.com/office/thememl/2012/main" xmlns="" name="Office Theme" id="{62F939B6-93AF-4DB8-9C6B-D6C7DFDC589F}" vid="{4A3C46E8-61CC-4603-A589-7422A47A8E4A}"/>
     </a:ext>
   </a:extLst>
 </a:theme>

</xml_diff>